<commit_message>
Modify the slides as Melanie suggested
</commit_message>
<xml_diff>
--- a/docs/presentations/OBI tutorial July 2011 ICBO/MIREOT-View.pptx
+++ b/docs/presentations/OBI tutorial July 2011 ICBO/MIREOT-View.pptx
@@ -1,6 +1,6 @@
 
 <file path=ppt/presentation.xml><?xml version="1.0" encoding="utf-8"?>
-<p:presentation xmlns:a="http://schemas.openxmlformats.org/drawingml/2006/main" xmlns:r="http://schemas.openxmlformats.org/officeDocument/2006/relationships" xmlns:mc="http://schemas.openxmlformats.org/markup-compatibility/2006" xmlns:mv="urn:schemas-microsoft-com:mac:vml" xmlns:p="http://schemas.openxmlformats.org/presentationml/2006/main" mc:Ignorable="mv" mc:PreserveAttributes="mv:*" saveSubsetFonts="1">
+<p:presentation xmlns:a="http://schemas.openxmlformats.org/drawingml/2006/main" xmlns:r="http://schemas.openxmlformats.org/officeDocument/2006/relationships" xmlns:p="http://schemas.openxmlformats.org/presentationml/2006/main" saveSubsetFonts="1">
   <p:sldMasterIdLst>
     <p:sldMasterId id="2147483648" r:id="rId1"/>
   </p:sldMasterIdLst>
@@ -11,7 +11,7 @@
     <p:sldId id="259" r:id="rId5"/>
     <p:sldId id="260" r:id="rId6"/>
     <p:sldId id="261" r:id="rId7"/>
-    <p:sldId id="262" r:id="rId8"/>
+    <p:sldId id="272" r:id="rId8"/>
     <p:sldId id="263" r:id="rId9"/>
     <p:sldId id="264" r:id="rId10"/>
     <p:sldId id="265" r:id="rId11"/>
@@ -20,7 +20,8 @@
     <p:sldId id="266" r:id="rId14"/>
     <p:sldId id="269" r:id="rId15"/>
     <p:sldId id="270" r:id="rId16"/>
-    <p:sldId id="271" r:id="rId17"/>
+    <p:sldId id="274" r:id="rId17"/>
+    <p:sldId id="271" r:id="rId18"/>
   </p:sldIdLst>
   <p:sldSz cx="9144000" cy="6858000" type="screen4x3"/>
   <p:notesSz cx="6858000" cy="9144000"/>
@@ -153,7 +154,7 @@
 </file>
 
 <file path=ppt/slideLayouts/slideLayout1.xml><?xml version="1.0" encoding="utf-8"?>
-<p:sldLayout xmlns:a="http://schemas.openxmlformats.org/drawingml/2006/main" xmlns:r="http://schemas.openxmlformats.org/officeDocument/2006/relationships" xmlns:mc="http://schemas.openxmlformats.org/markup-compatibility/2006" xmlns:mv="urn:schemas-microsoft-com:mac:vml" xmlns:p="http://schemas.openxmlformats.org/presentationml/2006/main" mc:Ignorable="mv" mc:PreserveAttributes="mv:*" type="title" preserve="1">
+<p:sldLayout xmlns:a="http://schemas.openxmlformats.org/drawingml/2006/main" xmlns:r="http://schemas.openxmlformats.org/officeDocument/2006/relationships" xmlns:p="http://schemas.openxmlformats.org/presentationml/2006/main" type="title" preserve="1">
   <p:cSld name="Title Slide">
     <p:spTree>
       <p:nvGrpSpPr>
@@ -345,7 +346,7 @@
 </file>
 
 <file path=ppt/slideLayouts/slideLayout10.xml><?xml version="1.0" encoding="utf-8"?>
-<p:sldLayout xmlns:a="http://schemas.openxmlformats.org/drawingml/2006/main" xmlns:r="http://schemas.openxmlformats.org/officeDocument/2006/relationships" xmlns:mc="http://schemas.openxmlformats.org/markup-compatibility/2006" xmlns:mv="urn:schemas-microsoft-com:mac:vml" xmlns:p="http://schemas.openxmlformats.org/presentationml/2006/main" mc:Ignorable="mv" mc:PreserveAttributes="mv:*" type="vertTx" preserve="1">
+<p:sldLayout xmlns:a="http://schemas.openxmlformats.org/drawingml/2006/main" xmlns:r="http://schemas.openxmlformats.org/officeDocument/2006/relationships" xmlns:p="http://schemas.openxmlformats.org/presentationml/2006/main" type="vertTx" preserve="1">
   <p:cSld name="Title and Vertical Text">
     <p:spTree>
       <p:nvGrpSpPr>
@@ -519,7 +520,7 @@
 </file>
 
 <file path=ppt/slideLayouts/slideLayout11.xml><?xml version="1.0" encoding="utf-8"?>
-<p:sldLayout xmlns:a="http://schemas.openxmlformats.org/drawingml/2006/main" xmlns:r="http://schemas.openxmlformats.org/officeDocument/2006/relationships" xmlns:mc="http://schemas.openxmlformats.org/markup-compatibility/2006" xmlns:mv="urn:schemas-microsoft-com:mac:vml" xmlns:p="http://schemas.openxmlformats.org/presentationml/2006/main" mc:Ignorable="mv" mc:PreserveAttributes="mv:*" type="vertTitleAndTx" preserve="1">
+<p:sldLayout xmlns:a="http://schemas.openxmlformats.org/drawingml/2006/main" xmlns:r="http://schemas.openxmlformats.org/officeDocument/2006/relationships" xmlns:p="http://schemas.openxmlformats.org/presentationml/2006/main" type="vertTitleAndTx" preserve="1">
   <p:cSld name="Vertical Title and Text">
     <p:spTree>
       <p:nvGrpSpPr>
@@ -703,7 +704,7 @@
 </file>
 
 <file path=ppt/slideLayouts/slideLayout2.xml><?xml version="1.0" encoding="utf-8"?>
-<p:sldLayout xmlns:a="http://schemas.openxmlformats.org/drawingml/2006/main" xmlns:r="http://schemas.openxmlformats.org/officeDocument/2006/relationships" xmlns:mc="http://schemas.openxmlformats.org/markup-compatibility/2006" xmlns:mv="urn:schemas-microsoft-com:mac:vml" xmlns:p="http://schemas.openxmlformats.org/presentationml/2006/main" mc:Ignorable="mv" mc:PreserveAttributes="mv:*" type="obj" preserve="1">
+<p:sldLayout xmlns:a="http://schemas.openxmlformats.org/drawingml/2006/main" xmlns:r="http://schemas.openxmlformats.org/officeDocument/2006/relationships" xmlns:p="http://schemas.openxmlformats.org/presentationml/2006/main" type="obj" preserve="1">
   <p:cSld name="Title and Content">
     <p:spTree>
       <p:nvGrpSpPr>
@@ -924,7 +925,7 @@
 </file>
 
 <file path=ppt/slideLayouts/slideLayout3.xml><?xml version="1.0" encoding="utf-8"?>
-<p:sldLayout xmlns:a="http://schemas.openxmlformats.org/drawingml/2006/main" xmlns:r="http://schemas.openxmlformats.org/officeDocument/2006/relationships" xmlns:mc="http://schemas.openxmlformats.org/markup-compatibility/2006" xmlns:mv="urn:schemas-microsoft-com:mac:vml" xmlns:p="http://schemas.openxmlformats.org/presentationml/2006/main" mc:Ignorable="mv" mc:PreserveAttributes="mv:*" type="secHead" preserve="1">
+<p:sldLayout xmlns:a="http://schemas.openxmlformats.org/drawingml/2006/main" xmlns:r="http://schemas.openxmlformats.org/officeDocument/2006/relationships" xmlns:p="http://schemas.openxmlformats.org/presentationml/2006/main" type="secHead" preserve="1">
   <p:cSld name="Section Header">
     <p:spTree>
       <p:nvGrpSpPr>
@@ -1120,7 +1121,7 @@
 </file>
 
 <file path=ppt/slideLayouts/slideLayout4.xml><?xml version="1.0" encoding="utf-8"?>
-<p:sldLayout xmlns:a="http://schemas.openxmlformats.org/drawingml/2006/main" xmlns:r="http://schemas.openxmlformats.org/officeDocument/2006/relationships" xmlns:mc="http://schemas.openxmlformats.org/markup-compatibility/2006" xmlns:mv="urn:schemas-microsoft-com:mac:vml" xmlns:p="http://schemas.openxmlformats.org/presentationml/2006/main" mc:Ignorable="mv" mc:PreserveAttributes="mv:*" type="twoObj" preserve="1">
+<p:sldLayout xmlns:a="http://schemas.openxmlformats.org/drawingml/2006/main" xmlns:r="http://schemas.openxmlformats.org/officeDocument/2006/relationships" xmlns:p="http://schemas.openxmlformats.org/presentationml/2006/main" type="twoObj" preserve="1">
   <p:cSld name="Two Content">
     <p:spTree>
       <p:nvGrpSpPr>
@@ -1412,7 +1413,7 @@
 </file>
 
 <file path=ppt/slideLayouts/slideLayout5.xml><?xml version="1.0" encoding="utf-8"?>
-<p:sldLayout xmlns:a="http://schemas.openxmlformats.org/drawingml/2006/main" xmlns:r="http://schemas.openxmlformats.org/officeDocument/2006/relationships" xmlns:mc="http://schemas.openxmlformats.org/markup-compatibility/2006" xmlns:mv="urn:schemas-microsoft-com:mac:vml" xmlns:p="http://schemas.openxmlformats.org/presentationml/2006/main" mc:Ignorable="mv" mc:PreserveAttributes="mv:*" type="twoTxTwoObj" preserve="1">
+<p:sldLayout xmlns:a="http://schemas.openxmlformats.org/drawingml/2006/main" xmlns:r="http://schemas.openxmlformats.org/officeDocument/2006/relationships" xmlns:p="http://schemas.openxmlformats.org/presentationml/2006/main" type="twoTxTwoObj" preserve="1">
   <p:cSld name="Comparison">
     <p:spTree>
       <p:nvGrpSpPr>
@@ -1843,7 +1844,7 @@
 </file>
 
 <file path=ppt/slideLayouts/slideLayout6.xml><?xml version="1.0" encoding="utf-8"?>
-<p:sldLayout xmlns:a="http://schemas.openxmlformats.org/drawingml/2006/main" xmlns:r="http://schemas.openxmlformats.org/officeDocument/2006/relationships" xmlns:mc="http://schemas.openxmlformats.org/markup-compatibility/2006" xmlns:mv="urn:schemas-microsoft-com:mac:vml" xmlns:p="http://schemas.openxmlformats.org/presentationml/2006/main" mc:Ignorable="mv" mc:PreserveAttributes="mv:*" type="titleOnly" preserve="1">
+<p:sldLayout xmlns:a="http://schemas.openxmlformats.org/drawingml/2006/main" xmlns:r="http://schemas.openxmlformats.org/officeDocument/2006/relationships" xmlns:p="http://schemas.openxmlformats.org/presentationml/2006/main" type="titleOnly" preserve="1">
   <p:cSld name="Title Only">
     <p:spTree>
       <p:nvGrpSpPr>
@@ -1965,7 +1966,7 @@
 </file>
 
 <file path=ppt/slideLayouts/slideLayout7.xml><?xml version="1.0" encoding="utf-8"?>
-<p:sldLayout xmlns:a="http://schemas.openxmlformats.org/drawingml/2006/main" xmlns:r="http://schemas.openxmlformats.org/officeDocument/2006/relationships" xmlns:mc="http://schemas.openxmlformats.org/markup-compatibility/2006" xmlns:mv="urn:schemas-microsoft-com:mac:vml" xmlns:p="http://schemas.openxmlformats.org/presentationml/2006/main" mc:Ignorable="mv" mc:PreserveAttributes="mv:*" type="blank" preserve="1">
+<p:sldLayout xmlns:a="http://schemas.openxmlformats.org/drawingml/2006/main" xmlns:r="http://schemas.openxmlformats.org/officeDocument/2006/relationships" xmlns:p="http://schemas.openxmlformats.org/presentationml/2006/main" type="blank" preserve="1">
   <p:cSld name="Blank">
     <p:spTree>
       <p:nvGrpSpPr>
@@ -2064,7 +2065,7 @@
 </file>
 
 <file path=ppt/slideLayouts/slideLayout8.xml><?xml version="1.0" encoding="utf-8"?>
-<p:sldLayout xmlns:a="http://schemas.openxmlformats.org/drawingml/2006/main" xmlns:r="http://schemas.openxmlformats.org/officeDocument/2006/relationships" xmlns:mc="http://schemas.openxmlformats.org/markup-compatibility/2006" xmlns:mv="urn:schemas-microsoft-com:mac:vml" xmlns:p="http://schemas.openxmlformats.org/presentationml/2006/main" mc:Ignorable="mv" mc:PreserveAttributes="mv:*" type="objTx" preserve="1">
+<p:sldLayout xmlns:a="http://schemas.openxmlformats.org/drawingml/2006/main" xmlns:r="http://schemas.openxmlformats.org/officeDocument/2006/relationships" xmlns:p="http://schemas.openxmlformats.org/presentationml/2006/main" type="objTx" preserve="1">
   <p:cSld name="Content with Caption">
     <p:spTree>
       <p:nvGrpSpPr>
@@ -2345,7 +2346,7 @@
 </file>
 
 <file path=ppt/slideLayouts/slideLayout9.xml><?xml version="1.0" encoding="utf-8"?>
-<p:sldLayout xmlns:a="http://schemas.openxmlformats.org/drawingml/2006/main" xmlns:r="http://schemas.openxmlformats.org/officeDocument/2006/relationships" xmlns:mc="http://schemas.openxmlformats.org/markup-compatibility/2006" xmlns:mv="urn:schemas-microsoft-com:mac:vml" xmlns:p="http://schemas.openxmlformats.org/presentationml/2006/main" mc:Ignorable="mv" mc:PreserveAttributes="mv:*" type="picTx" preserve="1">
+<p:sldLayout xmlns:a="http://schemas.openxmlformats.org/drawingml/2006/main" xmlns:r="http://schemas.openxmlformats.org/officeDocument/2006/relationships" xmlns:p="http://schemas.openxmlformats.org/presentationml/2006/main" type="picTx" preserve="1">
   <p:cSld name="Picture with Caption">
     <p:spTree>
       <p:nvGrpSpPr>
@@ -2602,7 +2603,7 @@
 </file>
 
 <file path=ppt/slideMasters/slideMaster1.xml><?xml version="1.0" encoding="utf-8"?>
-<p:sldMaster xmlns:a="http://schemas.openxmlformats.org/drawingml/2006/main" xmlns:r="http://schemas.openxmlformats.org/officeDocument/2006/relationships" xmlns:mc="http://schemas.openxmlformats.org/markup-compatibility/2006" xmlns:mv="urn:schemas-microsoft-com:mac:vml" xmlns:p="http://schemas.openxmlformats.org/presentationml/2006/main" mc:Ignorable="mv" mc:PreserveAttributes="mv:*">
+<p:sldMaster xmlns:a="http://schemas.openxmlformats.org/drawingml/2006/main" xmlns:r="http://schemas.openxmlformats.org/officeDocument/2006/relationships" xmlns:p="http://schemas.openxmlformats.org/presentationml/2006/main">
   <p:cSld>
     <p:bg>
       <p:bgPr>
@@ -3308,7 +3309,7 @@
 </file>
 
 <file path=ppt/slides/slide1.xml><?xml version="1.0" encoding="utf-8"?>
-<p:sld xmlns:a="http://schemas.openxmlformats.org/drawingml/2006/main" xmlns:r="http://schemas.openxmlformats.org/officeDocument/2006/relationships" xmlns:mc="http://schemas.openxmlformats.org/markup-compatibility/2006" xmlns:mv="urn:schemas-microsoft-com:mac:vml" xmlns:p="http://schemas.openxmlformats.org/presentationml/2006/main" mc:Ignorable="mv" mc:PreserveAttributes="mv:*">
+<p:sld xmlns:a="http://schemas.openxmlformats.org/drawingml/2006/main" xmlns:r="http://schemas.openxmlformats.org/officeDocument/2006/relationships" xmlns:p="http://schemas.openxmlformats.org/presentationml/2006/main">
   <p:cSld>
     <p:spTree>
       <p:nvGrpSpPr>
@@ -3429,10 +3430,6 @@
           </a:p>
           <a:p>
             <a:r>
-              <a:rPr lang="en-US" dirty="0" smtClean="0"/>
-              <a:t> </a:t>
-            </a:r>
-            <a:r>
               <a:rPr lang="en-US" sz="2800" i="1" dirty="0" smtClean="0"/>
               <a:t>2011 ICBO OBI Tutorial</a:t>
             </a:r>
@@ -3449,7 +3446,7 @@
 </file>
 
 <file path=ppt/slides/slide10.xml><?xml version="1.0" encoding="utf-8"?>
-<p:sld xmlns:a="http://schemas.openxmlformats.org/drawingml/2006/main" xmlns:r="http://schemas.openxmlformats.org/officeDocument/2006/relationships" xmlns:mc="http://schemas.openxmlformats.org/markup-compatibility/2006" xmlns:mv="urn:schemas-microsoft-com:mac:vml" xmlns:p="http://schemas.openxmlformats.org/presentationml/2006/main" mc:Ignorable="mv" mc:PreserveAttributes="mv:*">
+<p:sld xmlns:a="http://schemas.openxmlformats.org/drawingml/2006/main" xmlns:r="http://schemas.openxmlformats.org/officeDocument/2006/relationships" xmlns:p="http://schemas.openxmlformats.org/presentationml/2006/main">
   <p:cSld>
     <p:spTree>
       <p:nvGrpSpPr>
@@ -3543,58 +3540,7 @@
                 <a:ea typeface="ＭＳ Ｐゴシック" pitchFamily="34" charset="-128"/>
                 <a:cs typeface="+mn-cs"/>
               </a:rPr>
-              <a:t>M</a:t>
-            </a:r>
-            <a:r>
-              <a:rPr kumimoji="0" lang="en-US" sz="3000" b="0" i="0" u="none" strike="noStrike" kern="0" cap="none" spc="0" normalizeH="0" baseline="0" noProof="0" dirty="0" err="1" smtClean="0">
-                <a:ln>
-                  <a:noFill/>
-                </a:ln>
-                <a:solidFill>
-                  <a:schemeClr val="tx1"/>
-                </a:solidFill>
-                <a:effectLst/>
-                <a:uLnTx/>
-                <a:uFillTx/>
-                <a:latin typeface="+mn-lt"/>
-                <a:ea typeface="ＭＳ Ｐゴシック" pitchFamily="34" charset="-128"/>
-                <a:cs typeface="+mn-cs"/>
-              </a:rPr>
-              <a:t>é</a:t>
-            </a:r>
-            <a:r>
-              <a:rPr kumimoji="0" lang="en-US" sz="3000" b="0" i="0" u="none" strike="noStrike" kern="0" cap="none" spc="0" normalizeH="0" baseline="0" noProof="0" dirty="0" err="1" smtClean="0">
-                <a:ln>
-                  <a:noFill/>
-                </a:ln>
-                <a:solidFill>
-                  <a:schemeClr val="tx1"/>
-                </a:solidFill>
-                <a:effectLst/>
-                <a:uLnTx/>
-                <a:uFillTx/>
-                <a:latin typeface="+mn-lt"/>
-                <a:ea typeface="ＭＳ Ｐゴシック" pitchFamily="34" charset="-128"/>
-                <a:cs typeface="+mn-cs"/>
-              </a:rPr>
-              <a:t>lanie</a:t>
-            </a:r>
-            <a:r>
-              <a:rPr kumimoji="0" lang="en-US" sz="3000" b="0" i="0" u="none" strike="noStrike" kern="0" cap="none" spc="0" normalizeH="0" baseline="0" noProof="0" dirty="0" smtClean="0">
-                <a:ln>
-                  <a:noFill/>
-                </a:ln>
-                <a:solidFill>
-                  <a:schemeClr val="tx1"/>
-                </a:solidFill>
-                <a:effectLst/>
-                <a:uLnTx/>
-                <a:uFillTx/>
-                <a:latin typeface="+mn-lt"/>
-                <a:ea typeface="ＭＳ Ｐゴシック" pitchFamily="34" charset="-128"/>
-                <a:cs typeface="+mn-cs"/>
-              </a:rPr>
-              <a:t> </a:t>
+              <a:t>Mélanie</a:t>
             </a:r>
             <a:r>
               <a:rPr kumimoji="0" lang="en-US" sz="3000" b="0" i="0" u="none" strike="noStrike" kern="0" cap="none" spc="0" normalizeH="0" baseline="0" noProof="0" dirty="0" smtClean="0">
@@ -3927,12 +3873,6 @@
                 <a:ea typeface="ＭＳ Ｐゴシック" pitchFamily="34" charset="-128"/>
               </a:rPr>
               <a:t>Zuoshuang</a:t>
-            </a:r>
-            <a:r>
-              <a:rPr lang="en-US" sz="3000" kern="0" dirty="0">
-                <a:ea typeface="ＭＳ Ｐゴシック" pitchFamily="34" charset="-128"/>
-              </a:rPr>
-              <a:t> </a:t>
             </a:r>
             <a:r>
               <a:rPr lang="en-US" sz="3000" kern="0" dirty="0" smtClean="0">
@@ -4054,7 +3994,7 @@
 </file>
 
 <file path=ppt/slides/slide11.xml><?xml version="1.0" encoding="utf-8"?>
-<p:sld xmlns:a="http://schemas.openxmlformats.org/drawingml/2006/main" xmlns:r="http://schemas.openxmlformats.org/officeDocument/2006/relationships" xmlns:mc="http://schemas.openxmlformats.org/markup-compatibility/2006" xmlns:mv="urn:schemas-microsoft-com:mac:vml" xmlns:p="http://schemas.openxmlformats.org/presentationml/2006/main" mc:Ignorable="mv" mc:PreserveAttributes="mv:*">
+<p:sld xmlns:a="http://schemas.openxmlformats.org/drawingml/2006/main" xmlns:r="http://schemas.openxmlformats.org/officeDocument/2006/relationships" xmlns:p="http://schemas.openxmlformats.org/presentationml/2006/main">
   <p:cSld>
     <p:spTree>
       <p:nvGrpSpPr>
@@ -4140,7 +4080,7 @@
 </file>
 
 <file path=ppt/slides/slide12.xml><?xml version="1.0" encoding="utf-8"?>
-<p:sld xmlns:a="http://schemas.openxmlformats.org/drawingml/2006/main" xmlns:r="http://schemas.openxmlformats.org/officeDocument/2006/relationships" xmlns:mc="http://schemas.openxmlformats.org/markup-compatibility/2006" xmlns:mv="urn:schemas-microsoft-com:mac:vml" xmlns:p="http://schemas.openxmlformats.org/presentationml/2006/main" mc:Ignorable="mv" mc:PreserveAttributes="mv:*">
+<p:sld xmlns:a="http://schemas.openxmlformats.org/drawingml/2006/main" xmlns:r="http://schemas.openxmlformats.org/officeDocument/2006/relationships" xmlns:p="http://schemas.openxmlformats.org/presentationml/2006/main">
   <p:cSld>
     <p:spTree>
       <p:nvGrpSpPr>
@@ -4225,7 +4165,7 @@
 </file>
 
 <file path=ppt/slides/slide13.xml><?xml version="1.0" encoding="utf-8"?>
-<p:sld xmlns:a="http://schemas.openxmlformats.org/drawingml/2006/main" xmlns:r="http://schemas.openxmlformats.org/officeDocument/2006/relationships" xmlns:mc="http://schemas.openxmlformats.org/markup-compatibility/2006" xmlns:mv="urn:schemas-microsoft-com:mac:vml" xmlns:p="http://schemas.openxmlformats.org/presentationml/2006/main" mc:Ignorable="mv" mc:PreserveAttributes="mv:*">
+<p:sld xmlns:a="http://schemas.openxmlformats.org/drawingml/2006/main" xmlns:r="http://schemas.openxmlformats.org/officeDocument/2006/relationships" xmlns:p="http://schemas.openxmlformats.org/presentationml/2006/main">
   <p:cSld>
     <p:spTree>
       <p:nvGrpSpPr>
@@ -4352,7 +4292,7 @@
 </file>
 
 <file path=ppt/slides/slide14.xml><?xml version="1.0" encoding="utf-8"?>
-<p:sld xmlns:a="http://schemas.openxmlformats.org/drawingml/2006/main" xmlns:r="http://schemas.openxmlformats.org/officeDocument/2006/relationships" xmlns:mc="http://schemas.openxmlformats.org/markup-compatibility/2006" xmlns:mv="urn:schemas-microsoft-com:mac:vml" xmlns:p="http://schemas.openxmlformats.org/presentationml/2006/main" mc:Ignorable="mv" mc:PreserveAttributes="mv:*">
+<p:sld xmlns:a="http://schemas.openxmlformats.org/drawingml/2006/main" xmlns:r="http://schemas.openxmlformats.org/officeDocument/2006/relationships" xmlns:p="http://schemas.openxmlformats.org/presentationml/2006/main">
   <p:cSld>
     <p:spTree>
       <p:nvGrpSpPr>
@@ -4484,7 +4424,7 @@
 </file>
 
 <file path=ppt/slides/slide15.xml><?xml version="1.0" encoding="utf-8"?>
-<p:sld xmlns:a="http://schemas.openxmlformats.org/drawingml/2006/main" xmlns:r="http://schemas.openxmlformats.org/officeDocument/2006/relationships" xmlns:mc="http://schemas.openxmlformats.org/markup-compatibility/2006" xmlns:mv="urn:schemas-microsoft-com:mac:vml" xmlns:p="http://schemas.openxmlformats.org/presentationml/2006/main" mc:Ignorable="mv" mc:PreserveAttributes="mv:*">
+<p:sld xmlns:a="http://schemas.openxmlformats.org/drawingml/2006/main" xmlns:r="http://schemas.openxmlformats.org/officeDocument/2006/relationships" xmlns:p="http://schemas.openxmlformats.org/presentationml/2006/main">
   <p:cSld>
     <p:spTree>
       <p:nvGrpSpPr>
@@ -4500,39 +4440,54 @@
           <a:chExt cx="0" cy="0"/>
         </a:xfrm>
       </p:grpSpPr>
-      <p:pic>
-        <p:nvPicPr>
-          <p:cNvPr id="12291" name="Picture 3"/>
-          <p:cNvPicPr>
-            <a:picLocks noChangeAspect="1" noChangeArrowheads="1"/>
-          </p:cNvPicPr>
+      <p:sp>
+        <p:nvSpPr>
+          <p:cNvPr id="41" name="Flowchart: Magnetic Disk 40"/>
+          <p:cNvSpPr/>
           <p:nvPr/>
-        </p:nvPicPr>
-        <p:blipFill>
-          <a:blip r:embed="rId2"/>
-          <a:srcRect/>
-          <a:stretch>
-            <a:fillRect/>
-          </a:stretch>
-        </p:blipFill>
-        <p:spPr bwMode="auto">
+        </p:nvSpPr>
+        <p:spPr>
           <a:xfrm>
-            <a:off x="76778" y="1295400"/>
-            <a:ext cx="4629150" cy="925830"/>
+            <a:off x="4443268" y="1371600"/>
+            <a:ext cx="1066800" cy="1219200"/>
           </a:xfrm>
-          <a:prstGeom prst="rect">
+          <a:prstGeom prst="flowChartMagneticDisk">
             <a:avLst/>
           </a:prstGeom>
-          <a:noFill/>
-          <a:ln w="9525">
-            <a:noFill/>
-            <a:miter lim="800000"/>
-            <a:headEnd/>
-            <a:tailEnd/>
+          <a:solidFill>
+            <a:srgbClr val="AECFEA"/>
+          </a:solidFill>
+          <a:ln>
+            <a:solidFill>
+              <a:schemeClr val="accent2"/>
+            </a:solidFill>
           </a:ln>
-          <a:effectLst/>
         </p:spPr>
-      </p:pic>
+        <p:style>
+          <a:lnRef idx="2">
+            <a:schemeClr val="accent1">
+              <a:shade val="50000"/>
+            </a:schemeClr>
+          </a:lnRef>
+          <a:fillRef idx="1">
+            <a:schemeClr val="accent1"/>
+          </a:fillRef>
+          <a:effectRef idx="0">
+            <a:schemeClr val="accent1"/>
+          </a:effectRef>
+          <a:fontRef idx="minor">
+            <a:schemeClr val="lt1"/>
+          </a:fontRef>
+        </p:style>
+        <p:txBody>
+          <a:bodyPr rtlCol="0" anchor="ctr"/>
+          <a:lstStyle/>
+          <a:p>
+            <a:pPr algn="ctr"/>
+            <a:endParaRPr lang="en-US"/>
+          </a:p>
+        </p:txBody>
+      </p:sp>
       <p:sp>
         <p:nvSpPr>
           <p:cNvPr id="2" name="Title 1"/>
@@ -4564,7 +4519,7 @@
         </p:nvSpPr>
         <p:spPr>
           <a:xfrm>
-            <a:off x="4316206" y="4034135"/>
+            <a:off x="4175635" y="3212068"/>
             <a:ext cx="1609543" cy="461665"/>
           </a:xfrm>
           <a:prstGeom prst="rect">
@@ -4594,7 +4549,7 @@
         </p:nvGrpSpPr>
         <p:grpSpPr>
           <a:xfrm>
-            <a:off x="76200" y="3276600"/>
+            <a:off x="0" y="1752600"/>
             <a:ext cx="3590636" cy="3505200"/>
             <a:chOff x="76200" y="2819400"/>
             <a:chExt cx="3590636" cy="3505200"/>
@@ -4609,7 +4564,7 @@
             <p:nvPr/>
           </p:nvPicPr>
           <p:blipFill>
-            <a:blip r:embed="rId3"/>
+            <a:blip r:embed="rId2"/>
             <a:srcRect/>
             <a:stretch>
               <a:fillRect/>
@@ -4680,16 +4635,115 @@
           </p:txBody>
         </p:sp>
       </p:grpSp>
-      <p:sp>
-        <p:nvSpPr>
-          <p:cNvPr id="7" name="TextBox 6"/>
+      <p:grpSp>
+        <p:nvGrpSpPr>
+          <p:cNvPr id="19" name="Group 18"/>
+          <p:cNvGrpSpPr/>
+          <p:nvPr/>
+        </p:nvGrpSpPr>
+        <p:grpSpPr>
+          <a:xfrm>
+            <a:off x="3657600" y="4969133"/>
+            <a:ext cx="2931123" cy="1279267"/>
+            <a:chOff x="3810000" y="5029200"/>
+            <a:chExt cx="2931123" cy="1279267"/>
+          </a:xfrm>
+        </p:grpSpPr>
+        <p:sp>
+          <p:nvSpPr>
+            <p:cNvPr id="7" name="TextBox 6"/>
+            <p:cNvSpPr txBox="1"/>
+            <p:nvPr/>
+          </p:nvSpPr>
+          <p:spPr>
+            <a:xfrm>
+              <a:off x="3810000" y="5029200"/>
+              <a:ext cx="2646878" cy="400110"/>
+            </a:xfrm>
+            <a:prstGeom prst="rect">
+              <a:avLst/>
+            </a:prstGeom>
+            <a:noFill/>
+          </p:spPr>
+          <p:txBody>
+            <a:bodyPr wrap="none" rtlCol="0">
+              <a:spAutoFit/>
+            </a:bodyPr>
+            <a:lstStyle/>
+            <a:p>
+              <a:r>
+                <a:rPr lang="en-US" sz="2000" b="1" dirty="0" smtClean="0"/>
+                <a:t>IEDB alternative term</a:t>
+              </a:r>
+              <a:endParaRPr lang="en-US" sz="2000" b="1" dirty="0"/>
+            </a:p>
+          </p:txBody>
+        </p:sp>
+        <p:sp>
+          <p:nvSpPr>
+            <p:cNvPr id="11" name="TextBox 10"/>
+            <p:cNvSpPr txBox="1"/>
+            <p:nvPr/>
+          </p:nvSpPr>
+          <p:spPr>
+            <a:xfrm>
+              <a:off x="3810000" y="5385137"/>
+              <a:ext cx="2931123" cy="923330"/>
+            </a:xfrm>
+            <a:prstGeom prst="rect">
+              <a:avLst/>
+            </a:prstGeom>
+            <a:noFill/>
+          </p:spPr>
+          <p:txBody>
+            <a:bodyPr wrap="none" rtlCol="0">
+              <a:spAutoFit/>
+            </a:bodyPr>
+            <a:lstStyle/>
+            <a:p>
+              <a:r>
+                <a:rPr lang="en-US" sz="1800" dirty="0" smtClean="0"/>
+                <a:t>Extract </a:t>
+              </a:r>
+              <a:r>
+                <a:rPr lang="en-US" sz="1800" dirty="0" smtClean="0"/>
+                <a:t>terms with ‘IEDB </a:t>
+              </a:r>
+            </a:p>
+            <a:p>
+              <a:r>
+                <a:rPr lang="en-US" sz="1800" dirty="0" smtClean="0"/>
+                <a:t>alternative </a:t>
+              </a:r>
+              <a:r>
+                <a:rPr lang="en-US" sz="1800" dirty="0" smtClean="0"/>
+                <a:t>term’ property and</a:t>
+              </a:r>
+            </a:p>
+            <a:p>
+              <a:r>
+                <a:rPr lang="en-US" sz="1800" dirty="0" smtClean="0"/>
+                <a:t>all </a:t>
+              </a:r>
+              <a:r>
+                <a:rPr lang="en-US" sz="1800" dirty="0" smtClean="0"/>
+                <a:t>the axioms related to them</a:t>
+              </a:r>
+              <a:endParaRPr lang="en-US" sz="1800" dirty="0"/>
+            </a:p>
+          </p:txBody>
+        </p:sp>
+      </p:grpSp>
+      <p:sp>
+        <p:nvSpPr>
+          <p:cNvPr id="35" name="TextBox 34"/>
           <p:cNvSpPr txBox="1"/>
           <p:nvPr/>
         </p:nvSpPr>
         <p:spPr>
           <a:xfrm>
-            <a:off x="3810000" y="5029200"/>
-            <a:ext cx="2646878" cy="400110"/>
+            <a:off x="6773467" y="3029629"/>
+            <a:ext cx="2141933" cy="830997"/>
           </a:xfrm>
           <a:prstGeom prst="rect">
             <a:avLst/>
@@ -4703,23 +4757,114 @@
           <a:lstStyle/>
           <a:p>
             <a:r>
-              <a:rPr lang="en-US" sz="2000" b="1" dirty="0" smtClean="0"/>
-              <a:t>IEDB alternative term</a:t>
-            </a:r>
-            <a:endParaRPr lang="en-US" sz="2000" b="1" dirty="0"/>
-          </a:p>
-        </p:txBody>
-      </p:sp>
-      <p:sp>
-        <p:nvSpPr>
-          <p:cNvPr id="9" name="TextBox 8"/>
+              <a:rPr lang="en-US" dirty="0" smtClean="0"/>
+              <a:t>Here will show</a:t>
+            </a:r>
+          </a:p>
+          <a:p>
+            <a:r>
+              <a:rPr lang="en-US" dirty="0"/>
+              <a:t>t</a:t>
+            </a:r>
+            <a:r>
+              <a:rPr lang="en-US" dirty="0" smtClean="0"/>
+              <a:t>he result</a:t>
+            </a:r>
+            <a:endParaRPr lang="en-US" dirty="0"/>
+          </a:p>
+        </p:txBody>
+      </p:sp>
+      <p:cxnSp>
+        <p:nvCxnSpPr>
+          <p:cNvPr id="37" name="Straight Arrow Connector 36"/>
+          <p:cNvCxnSpPr>
+            <a:endCxn id="4" idx="2"/>
+          </p:cNvCxnSpPr>
+          <p:nvPr/>
+        </p:nvCxnSpPr>
+        <p:spPr>
+          <a:xfrm rot="16200000" flipV="1">
+            <a:off x="4333023" y="4321117"/>
+            <a:ext cx="1295400" cy="632"/>
+          </a:xfrm>
+          <a:prstGeom prst="straightConnector1">
+            <a:avLst/>
+          </a:prstGeom>
+          <a:ln w="19050">
+            <a:solidFill>
+              <a:schemeClr val="accent2">
+                <a:lumMod val="50000"/>
+              </a:schemeClr>
+            </a:solidFill>
+            <a:tailEnd type="arrow"/>
+          </a:ln>
+        </p:spPr>
+        <p:style>
+          <a:lnRef idx="1">
+            <a:schemeClr val="accent1"/>
+          </a:lnRef>
+          <a:fillRef idx="0">
+            <a:schemeClr val="accent1"/>
+          </a:fillRef>
+          <a:effectRef idx="0">
+            <a:schemeClr val="accent1"/>
+          </a:effectRef>
+          <a:fontRef idx="minor">
+            <a:schemeClr val="tx1"/>
+          </a:fontRef>
+        </p:style>
+      </p:cxnSp>
+      <p:cxnSp>
+        <p:nvCxnSpPr>
+          <p:cNvPr id="39" name="Straight Arrow Connector 38"/>
+          <p:cNvCxnSpPr>
+            <a:stCxn id="4" idx="3"/>
+            <a:endCxn id="35" idx="1"/>
+          </p:cNvCxnSpPr>
+          <p:nvPr/>
+        </p:nvCxnSpPr>
+        <p:spPr>
+          <a:xfrm>
+            <a:off x="5785178" y="3442901"/>
+            <a:ext cx="988289" cy="2227"/>
+          </a:xfrm>
+          <a:prstGeom prst="straightConnector1">
+            <a:avLst/>
+          </a:prstGeom>
+          <a:ln w="19050">
+            <a:solidFill>
+              <a:schemeClr val="accent2">
+                <a:lumMod val="50000"/>
+              </a:schemeClr>
+            </a:solidFill>
+            <a:tailEnd type="arrow"/>
+          </a:ln>
+        </p:spPr>
+        <p:style>
+          <a:lnRef idx="1">
+            <a:schemeClr val="accent1"/>
+          </a:lnRef>
+          <a:fillRef idx="0">
+            <a:schemeClr val="accent1"/>
+          </a:fillRef>
+          <a:effectRef idx="0">
+            <a:schemeClr val="accent1"/>
+          </a:effectRef>
+          <a:fontRef idx="minor">
+            <a:schemeClr val="tx1"/>
+          </a:fontRef>
+        </p:style>
+      </p:cxnSp>
+      <p:sp>
+        <p:nvSpPr>
+          <p:cNvPr id="40" name="TextBox 39"/>
           <p:cNvSpPr txBox="1"/>
           <p:nvPr/>
         </p:nvSpPr>
         <p:spPr>
           <a:xfrm>
-            <a:off x="3810000" y="2286000"/>
-            <a:ext cx="3219664" cy="1477328"/>
+            <a:off x="4367068" y="1828800"/>
+            <a:ext cx="1245854" cy="707886"/>
           </a:xfrm>
           <a:prstGeom prst="rect">
             <a:avLst/>
@@ -4732,121 +4877,42 @@
           </a:bodyPr>
           <a:lstStyle/>
           <a:p>
-            <a:r>
-              <a:rPr lang="en-US" sz="1800" dirty="0" smtClean="0"/>
-              <a:t>1. Add FGED alternative term</a:t>
-            </a:r>
-          </a:p>
-          <a:p>
-            <a:r>
-              <a:rPr lang="en-US" sz="1800" dirty="0" smtClean="0"/>
-              <a:t>    property to FGED terms</a:t>
-            </a:r>
-          </a:p>
-          <a:p>
-            <a:r>
-              <a:rPr lang="en-US" sz="1800" dirty="0" smtClean="0"/>
-              <a:t>2. Extract terms with ‘FGED </a:t>
-            </a:r>
-          </a:p>
-          <a:p>
-            <a:r>
-              <a:rPr lang="en-US" sz="1800" dirty="0"/>
-              <a:t> </a:t>
-            </a:r>
-            <a:r>
-              <a:rPr lang="en-US" sz="1800" dirty="0" smtClean="0"/>
-              <a:t>    alternative term’ property and</a:t>
-            </a:r>
-          </a:p>
-          <a:p>
-            <a:r>
-              <a:rPr lang="en-US" sz="1800" dirty="0"/>
-              <a:t> </a:t>
-            </a:r>
-            <a:r>
-              <a:rPr lang="en-US" sz="1800" dirty="0" smtClean="0"/>
-              <a:t>    all the axioms related to them</a:t>
-            </a:r>
-            <a:endParaRPr lang="en-US" sz="1800" dirty="0"/>
-          </a:p>
-        </p:txBody>
-      </p:sp>
-      <p:sp>
-        <p:nvSpPr>
-          <p:cNvPr id="11" name="TextBox 10"/>
-          <p:cNvSpPr txBox="1"/>
-          <p:nvPr/>
-        </p:nvSpPr>
-        <p:spPr>
-          <a:xfrm>
-            <a:off x="3810000" y="5385137"/>
-            <a:ext cx="3219664" cy="923330"/>
-          </a:xfrm>
-          <a:prstGeom prst="rect">
-            <a:avLst/>
-          </a:prstGeom>
-          <a:noFill/>
-        </p:spPr>
-        <p:txBody>
-          <a:bodyPr wrap="none" rtlCol="0">
-            <a:spAutoFit/>
-          </a:bodyPr>
-          <a:lstStyle/>
-          <a:p>
-            <a:r>
-              <a:rPr lang="en-US" sz="1800" dirty="0"/>
-              <a:t>1</a:t>
-            </a:r>
-            <a:r>
-              <a:rPr lang="en-US" sz="1800" dirty="0" smtClean="0"/>
-              <a:t>. Extract terms with ‘IEDB </a:t>
-            </a:r>
-          </a:p>
-          <a:p>
-            <a:r>
-              <a:rPr lang="en-US" sz="1800" dirty="0"/>
-              <a:t> </a:t>
-            </a:r>
-            <a:r>
-              <a:rPr lang="en-US" sz="1800" dirty="0" smtClean="0"/>
-              <a:t>    alternative term’ property and</a:t>
-            </a:r>
-          </a:p>
-          <a:p>
-            <a:r>
-              <a:rPr lang="en-US" sz="1800" dirty="0"/>
-              <a:t> </a:t>
-            </a:r>
-            <a:r>
-              <a:rPr lang="en-US" sz="1800" dirty="0" smtClean="0"/>
-              <a:t>    all the axioms related to them</a:t>
-            </a:r>
-            <a:endParaRPr lang="en-US" sz="1800" dirty="0"/>
+            <a:pPr algn="ctr"/>
+            <a:r>
+              <a:rPr lang="en-US" sz="2000" dirty="0" smtClean="0"/>
+              <a:t>RDF store</a:t>
+            </a:r>
+          </a:p>
+          <a:p>
+            <a:pPr algn="ctr"/>
+            <a:r>
+              <a:rPr lang="en-US" sz="2000" dirty="0" smtClean="0"/>
+              <a:t>(obi.owl)</a:t>
+            </a:r>
+            <a:endParaRPr lang="en-US" sz="2000" dirty="0"/>
           </a:p>
         </p:txBody>
       </p:sp>
       <p:cxnSp>
         <p:nvCxnSpPr>
-          <p:cNvPr id="17" name="Shape 16"/>
+          <p:cNvPr id="43" name="Elbow Connector 42"/>
           <p:cNvCxnSpPr>
-            <a:stCxn id="7" idx="1"/>
-            <a:endCxn id="4" idx="2"/>
+            <a:stCxn id="12290" idx="0"/>
+            <a:endCxn id="41" idx="0"/>
           </p:cNvCxnSpPr>
           <p:nvPr/>
         </p:nvCxnSpPr>
         <p:spPr>
-          <a:xfrm rot="10800000" flipH="1">
-            <a:off x="3810000" y="4495801"/>
-            <a:ext cx="1310978" cy="733455"/>
+          <a:xfrm rot="16200000" flipH="1">
+            <a:off x="3368237" y="169570"/>
+            <a:ext cx="25400" cy="3191461"/>
           </a:xfrm>
-          <a:prstGeom prst="bentConnector4">
+          <a:prstGeom prst="bentConnector3">
             <a:avLst>
-              <a:gd name="adj1" fmla="val -10392"/>
-              <a:gd name="adj2" fmla="val 68675"/>
+              <a:gd name="adj1" fmla="val -1754709"/>
             </a:avLst>
           </a:prstGeom>
-          <a:ln>
+          <a:ln w="19050">
             <a:solidFill>
               <a:schemeClr val="tx1"/>
             </a:solidFill>
@@ -4870,14 +4936,14 @@
       </p:cxnSp>
       <p:sp>
         <p:nvSpPr>
-          <p:cNvPr id="8" name="TextBox 7"/>
+          <p:cNvPr id="50" name="TextBox 49"/>
           <p:cNvSpPr txBox="1"/>
           <p:nvPr/>
         </p:nvSpPr>
         <p:spPr>
           <a:xfrm>
-            <a:off x="3810000" y="1905000"/>
-            <a:ext cx="2731838" cy="400110"/>
+            <a:off x="3124200" y="1230868"/>
+            <a:ext cx="582211" cy="369332"/>
           </a:xfrm>
           <a:prstGeom prst="rect">
             <a:avLst/>
@@ -4891,121 +4957,62 @@
           <a:lstStyle/>
           <a:p>
             <a:r>
-              <a:rPr lang="en-US" sz="2000" b="1" dirty="0" smtClean="0"/>
-              <a:t>FGED alternative term</a:t>
-            </a:r>
-            <a:endParaRPr lang="en-US" sz="2000" b="1" dirty="0"/>
-          </a:p>
-        </p:txBody>
-      </p:sp>
-      <p:grpSp>
-        <p:nvGrpSpPr>
-          <p:cNvPr id="34" name="Group 33"/>
-          <p:cNvGrpSpPr/>
+              <a:rPr lang="en-US" sz="1800" dirty="0" smtClean="0"/>
+              <a:t>load</a:t>
+            </a:r>
+            <a:endParaRPr lang="en-US" sz="1800" dirty="0"/>
+          </a:p>
+        </p:txBody>
+      </p:sp>
+      <p:cxnSp>
+        <p:nvCxnSpPr>
+          <p:cNvPr id="52" name="Straight Arrow Connector 51"/>
+          <p:cNvCxnSpPr>
+            <a:stCxn id="4" idx="0"/>
+            <a:endCxn id="41" idx="3"/>
+          </p:cNvCxnSpPr>
           <p:nvPr/>
-        </p:nvGrpSpPr>
-        <p:grpSpPr>
-          <a:xfrm>
-            <a:off x="2391353" y="2105055"/>
-            <a:ext cx="2729625" cy="1929080"/>
-            <a:chOff x="2391353" y="2105055"/>
-            <a:chExt cx="2729625" cy="1929080"/>
+        </p:nvCxnSpPr>
+        <p:spPr>
+          <a:xfrm rot="16200000" flipV="1">
+            <a:off x="4667904" y="2899564"/>
+            <a:ext cx="621268" cy="3739"/>
           </a:xfrm>
-        </p:grpSpPr>
-        <p:cxnSp>
-          <p:nvCxnSpPr>
-            <p:cNvPr id="23" name="Shape 22"/>
-            <p:cNvCxnSpPr>
-              <a:stCxn id="8" idx="1"/>
-              <a:endCxn id="4" idx="0"/>
-            </p:cNvCxnSpPr>
-            <p:nvPr/>
-          </p:nvCxnSpPr>
-          <p:spPr>
-            <a:xfrm rot="10800000" flipH="1" flipV="1">
-              <a:off x="3810000" y="2105055"/>
-              <a:ext cx="1310978" cy="1929080"/>
-            </a:xfrm>
-            <a:prstGeom prst="bentConnector4">
-              <a:avLst>
-                <a:gd name="adj1" fmla="val -8278"/>
-                <a:gd name="adj2" fmla="val 88222"/>
-              </a:avLst>
-            </a:prstGeom>
-            <a:ln>
-              <a:solidFill>
-                <a:schemeClr val="tx1"/>
-              </a:solidFill>
-              <a:tailEnd type="arrow"/>
-            </a:ln>
-          </p:spPr>
-          <p:style>
-            <a:lnRef idx="1">
-              <a:schemeClr val="accent1"/>
-            </a:lnRef>
-            <a:fillRef idx="0">
-              <a:schemeClr val="accent1"/>
-            </a:fillRef>
-            <a:effectRef idx="0">
-              <a:schemeClr val="accent1"/>
-            </a:effectRef>
-            <a:fontRef idx="minor">
+          <a:prstGeom prst="straightConnector1">
+            <a:avLst/>
+          </a:prstGeom>
+          <a:ln w="19050">
+            <a:solidFill>
               <a:schemeClr val="tx1"/>
-            </a:fontRef>
-          </p:style>
-        </p:cxnSp>
-        <p:cxnSp>
-          <p:nvCxnSpPr>
-            <p:cNvPr id="31" name="Elbow Connector 30"/>
-            <p:cNvCxnSpPr>
-              <a:stCxn id="12291" idx="2"/>
-              <a:endCxn id="4" idx="0"/>
-            </p:cNvCxnSpPr>
-            <p:nvPr/>
-          </p:nvCxnSpPr>
-          <p:spPr>
-            <a:xfrm rot="16200000" flipH="1">
-              <a:off x="2849713" y="1762869"/>
-              <a:ext cx="1812905" cy="2729625"/>
-            </a:xfrm>
-            <a:prstGeom prst="bentConnector3">
-              <a:avLst>
-                <a:gd name="adj1" fmla="val 88211"/>
-              </a:avLst>
-            </a:prstGeom>
-            <a:ln>
-              <a:solidFill>
-                <a:schemeClr val="tx1"/>
-              </a:solidFill>
-              <a:tailEnd type="arrow"/>
-            </a:ln>
-          </p:spPr>
-          <p:style>
-            <a:lnRef idx="1">
-              <a:schemeClr val="accent1"/>
-            </a:lnRef>
-            <a:fillRef idx="0">
-              <a:schemeClr val="accent1"/>
-            </a:fillRef>
-            <a:effectRef idx="0">
-              <a:schemeClr val="accent1"/>
-            </a:effectRef>
-            <a:fontRef idx="minor">
-              <a:schemeClr val="tx1"/>
-            </a:fontRef>
-          </p:style>
-        </p:cxnSp>
-      </p:grpSp>
-      <p:sp>
-        <p:nvSpPr>
-          <p:cNvPr id="35" name="TextBox 34"/>
+            </a:solidFill>
+            <a:tailEnd type="arrow"/>
+          </a:ln>
+        </p:spPr>
+        <p:style>
+          <a:lnRef idx="1">
+            <a:schemeClr val="accent1"/>
+          </a:lnRef>
+          <a:fillRef idx="0">
+            <a:schemeClr val="accent1"/>
+          </a:fillRef>
+          <a:effectRef idx="0">
+            <a:schemeClr val="accent1"/>
+          </a:effectRef>
+          <a:fontRef idx="minor">
+            <a:schemeClr val="tx1"/>
+          </a:fontRef>
+        </p:style>
+      </p:cxnSp>
+      <p:sp>
+        <p:nvSpPr>
+          <p:cNvPr id="55" name="TextBox 54"/>
           <p:cNvSpPr txBox="1"/>
           <p:nvPr/>
         </p:nvSpPr>
         <p:spPr>
           <a:xfrm>
-            <a:off x="6781800" y="3733800"/>
-            <a:ext cx="2141933" cy="830997"/>
+            <a:off x="5105400" y="2678668"/>
+            <a:ext cx="671979" cy="369332"/>
           </a:xfrm>
           <a:prstGeom prst="rect">
             <a:avLst/>
@@ -5019,18 +5026,42 @@
           <a:lstStyle/>
           <a:p>
             <a:r>
+              <a:rPr lang="en-US" sz="1800" dirty="0" err="1" smtClean="0"/>
+              <a:t>acess</a:t>
+            </a:r>
+            <a:endParaRPr lang="en-US" sz="1800" dirty="0"/>
+          </a:p>
+        </p:txBody>
+      </p:sp>
+      <p:sp>
+        <p:nvSpPr>
+          <p:cNvPr id="57" name="TextBox 56"/>
+          <p:cNvSpPr txBox="1"/>
+          <p:nvPr/>
+        </p:nvSpPr>
+        <p:spPr>
+          <a:xfrm>
+            <a:off x="1219200" y="5334000"/>
+            <a:ext cx="1116011" cy="461665"/>
+          </a:xfrm>
+          <a:prstGeom prst="rect">
+            <a:avLst/>
+          </a:prstGeom>
+          <a:noFill/>
+        </p:spPr>
+        <p:txBody>
+          <a:bodyPr wrap="none" rtlCol="0">
+            <a:spAutoFit/>
+          </a:bodyPr>
+          <a:lstStyle/>
+          <a:p>
+            <a:r>
               <a:rPr lang="en-US" dirty="0" smtClean="0"/>
-              <a:t>Here will show</a:t>
-            </a:r>
-          </a:p>
-          <a:p>
-            <a:r>
-              <a:rPr lang="en-US" dirty="0"/>
-              <a:t>t</a:t>
+              <a:t>o</a:t>
             </a:r>
             <a:r>
               <a:rPr lang="en-US" dirty="0" smtClean="0"/>
-              <a:t>he result</a:t>
+              <a:t>bi.owl</a:t>
             </a:r>
             <a:endParaRPr lang="en-US" dirty="0"/>
           </a:p>
@@ -5044,314 +5075,548 @@
   <p:timing>
     <p:tnLst>
       <p:par>
-        <p:cTn id="1" dur="indefinite" restart="never" nodeType="tmRoot">
-          <p:childTnLst>
-            <p:seq concurrent="1" nextAc="seek">
-              <p:cTn id="2" dur="indefinite" nodeType="mainSeq">
-                <p:childTnLst>
-                  <p:par>
-                    <p:cTn id="3" fill="hold">
-                      <p:stCondLst>
-                        <p:cond delay="indefinite"/>
-                      </p:stCondLst>
-                      <p:childTnLst>
-                        <p:par>
-                          <p:cTn id="4" fill="hold">
-                            <p:stCondLst>
-                              <p:cond delay="0"/>
-                            </p:stCondLst>
-                            <p:childTnLst>
-                              <p:par>
-                                <p:cTn id="5" presetID="1" presetClass="entr" presetSubtype="0" fill="hold" grpId="0" nodeType="clickEffect">
-                                  <p:stCondLst>
-                                    <p:cond delay="0"/>
-                                  </p:stCondLst>
-                                  <p:childTnLst>
-                                    <p:set>
-                                      <p:cBhvr>
-                                        <p:cTn id="6" dur="1" fill="hold">
-                                          <p:stCondLst>
-                                            <p:cond delay="0"/>
-                                          </p:stCondLst>
-                                        </p:cTn>
-                                        <p:tgtEl>
-                                          <p:spTgt spid="8"/>
-                                        </p:tgtEl>
-                                        <p:attrNameLst>
-                                          <p:attrName>style.visibility</p:attrName>
-                                        </p:attrNameLst>
-                                      </p:cBhvr>
-                                      <p:to>
-                                        <p:strVal val="visible"/>
-                                      </p:to>
-                                    </p:set>
-                                  </p:childTnLst>
-                                </p:cTn>
-                              </p:par>
-                            </p:childTnLst>
-                          </p:cTn>
-                        </p:par>
-                      </p:childTnLst>
-                    </p:cTn>
-                  </p:par>
-                  <p:par>
-                    <p:cTn id="7" fill="hold">
-                      <p:stCondLst>
-                        <p:cond delay="indefinite"/>
-                      </p:stCondLst>
-                      <p:childTnLst>
-                        <p:par>
-                          <p:cTn id="8" fill="hold">
-                            <p:stCondLst>
-                              <p:cond delay="0"/>
-                            </p:stCondLst>
-                            <p:childTnLst>
-                              <p:par>
-                                <p:cTn id="9" presetID="1" presetClass="entr" presetSubtype="0" fill="hold" nodeType="clickEffect">
-                                  <p:stCondLst>
-                                    <p:cond delay="0"/>
-                                  </p:stCondLst>
-                                  <p:childTnLst>
-                                    <p:set>
-                                      <p:cBhvr>
-                                        <p:cTn id="10" dur="1" fill="hold">
-                                          <p:stCondLst>
-                                            <p:cond delay="0"/>
-                                          </p:stCondLst>
-                                        </p:cTn>
-                                        <p:tgtEl>
-                                          <p:spTgt spid="34"/>
-                                        </p:tgtEl>
-                                        <p:attrNameLst>
-                                          <p:attrName>style.visibility</p:attrName>
-                                        </p:attrNameLst>
-                                      </p:cBhvr>
-                                      <p:to>
-                                        <p:strVal val="visible"/>
-                                      </p:to>
-                                    </p:set>
-                                  </p:childTnLst>
-                                </p:cTn>
-                              </p:par>
-                            </p:childTnLst>
-                          </p:cTn>
-                        </p:par>
-                      </p:childTnLst>
-                    </p:cTn>
-                  </p:par>
-                  <p:par>
-                    <p:cTn id="11" fill="hold">
-                      <p:stCondLst>
-                        <p:cond delay="indefinite"/>
-                      </p:stCondLst>
-                      <p:childTnLst>
-                        <p:par>
-                          <p:cTn id="12" fill="hold">
-                            <p:stCondLst>
-                              <p:cond delay="0"/>
-                            </p:stCondLst>
-                            <p:childTnLst>
-                              <p:par>
-                                <p:cTn id="13" presetID="1" presetClass="entr" presetSubtype="0" fill="hold" grpId="0" nodeType="clickEffect">
-                                  <p:stCondLst>
-                                    <p:cond delay="0"/>
-                                  </p:stCondLst>
-                                  <p:childTnLst>
-                                    <p:set>
-                                      <p:cBhvr>
-                                        <p:cTn id="14" dur="1" fill="hold">
-                                          <p:stCondLst>
-                                            <p:cond delay="0"/>
-                                          </p:stCondLst>
-                                        </p:cTn>
-                                        <p:tgtEl>
-                                          <p:spTgt spid="7"/>
-                                        </p:tgtEl>
-                                        <p:attrNameLst>
-                                          <p:attrName>style.visibility</p:attrName>
-                                        </p:attrNameLst>
-                                      </p:cBhvr>
-                                      <p:to>
-                                        <p:strVal val="visible"/>
-                                      </p:to>
-                                    </p:set>
-                                  </p:childTnLst>
-                                </p:cTn>
-                              </p:par>
-                            </p:childTnLst>
-                          </p:cTn>
-                        </p:par>
-                      </p:childTnLst>
-                    </p:cTn>
-                  </p:par>
-                  <p:par>
-                    <p:cTn id="15" fill="hold">
-                      <p:stCondLst>
-                        <p:cond delay="indefinite"/>
-                      </p:stCondLst>
-                      <p:childTnLst>
-                        <p:par>
-                          <p:cTn id="16" fill="hold">
-                            <p:stCondLst>
-                              <p:cond delay="0"/>
-                            </p:stCondLst>
-                            <p:childTnLst>
-                              <p:par>
-                                <p:cTn id="17" presetID="1" presetClass="entr" presetSubtype="0" fill="hold" nodeType="clickEffect">
-                                  <p:stCondLst>
-                                    <p:cond delay="0"/>
-                                  </p:stCondLst>
-                                  <p:childTnLst>
-                                    <p:set>
-                                      <p:cBhvr>
-                                        <p:cTn id="18" dur="1" fill="hold">
-                                          <p:stCondLst>
-                                            <p:cond delay="0"/>
-                                          </p:stCondLst>
-                                        </p:cTn>
-                                        <p:tgtEl>
-                                          <p:spTgt spid="17"/>
-                                        </p:tgtEl>
-                                        <p:attrNameLst>
-                                          <p:attrName>style.visibility</p:attrName>
-                                        </p:attrNameLst>
-                                      </p:cBhvr>
-                                      <p:to>
-                                        <p:strVal val="visible"/>
-                                      </p:to>
-                                    </p:set>
-                                  </p:childTnLst>
-                                </p:cTn>
-                              </p:par>
-                            </p:childTnLst>
-                          </p:cTn>
-                        </p:par>
-                      </p:childTnLst>
-                    </p:cTn>
-                  </p:par>
-                  <p:par>
-                    <p:cTn id="19" fill="hold">
-                      <p:stCondLst>
-                        <p:cond delay="indefinite"/>
-                      </p:stCondLst>
-                      <p:childTnLst>
-                        <p:par>
-                          <p:cTn id="20" fill="hold">
-                            <p:stCondLst>
-                              <p:cond delay="0"/>
-                            </p:stCondLst>
-                            <p:childTnLst>
-                              <p:par>
-                                <p:cTn id="21" presetID="1" presetClass="entr" presetSubtype="0" fill="hold" grpId="0" nodeType="clickEffect">
-                                  <p:stCondLst>
-                                    <p:cond delay="0"/>
-                                  </p:stCondLst>
-                                  <p:childTnLst>
-                                    <p:set>
-                                      <p:cBhvr>
-                                        <p:cTn id="22" dur="1" fill="hold">
-                                          <p:stCondLst>
-                                            <p:cond delay="0"/>
-                                          </p:stCondLst>
-                                        </p:cTn>
-                                        <p:tgtEl>
-                                          <p:spTgt spid="9"/>
-                                        </p:tgtEl>
-                                        <p:attrNameLst>
-                                          <p:attrName>style.visibility</p:attrName>
-                                        </p:attrNameLst>
-                                      </p:cBhvr>
-                                      <p:to>
-                                        <p:strVal val="visible"/>
-                                      </p:to>
-                                    </p:set>
-                                  </p:childTnLst>
-                                </p:cTn>
-                              </p:par>
-                            </p:childTnLst>
-                          </p:cTn>
-                        </p:par>
-                      </p:childTnLst>
-                    </p:cTn>
-                  </p:par>
-                  <p:par>
-                    <p:cTn id="23" fill="hold">
-                      <p:stCondLst>
-                        <p:cond delay="indefinite"/>
-                      </p:stCondLst>
-                      <p:childTnLst>
-                        <p:par>
-                          <p:cTn id="24" fill="hold">
-                            <p:stCondLst>
-                              <p:cond delay="0"/>
-                            </p:stCondLst>
-                            <p:childTnLst>
-                              <p:par>
-                                <p:cTn id="25" presetID="1" presetClass="entr" presetSubtype="0" fill="hold" grpId="0" nodeType="clickEffect">
-                                  <p:stCondLst>
-                                    <p:cond delay="0"/>
-                                  </p:stCondLst>
-                                  <p:childTnLst>
-                                    <p:set>
-                                      <p:cBhvr>
-                                        <p:cTn id="26" dur="1" fill="hold">
-                                          <p:stCondLst>
-                                            <p:cond delay="0"/>
-                                          </p:stCondLst>
-                                        </p:cTn>
-                                        <p:tgtEl>
-                                          <p:spTgt spid="11"/>
-                                        </p:tgtEl>
-                                        <p:attrNameLst>
-                                          <p:attrName>style.visibility</p:attrName>
-                                        </p:attrNameLst>
-                                      </p:cBhvr>
-                                      <p:to>
-                                        <p:strVal val="visible"/>
-                                      </p:to>
-                                    </p:set>
-                                  </p:childTnLst>
-                                </p:cTn>
-                              </p:par>
-                            </p:childTnLst>
-                          </p:cTn>
-                        </p:par>
-                      </p:childTnLst>
-                    </p:cTn>
-                  </p:par>
-                </p:childTnLst>
-              </p:cTn>
-              <p:prevCondLst>
-                <p:cond evt="onPrev" delay="0">
-                  <p:tgtEl>
-                    <p:sldTgt/>
-                  </p:tgtEl>
-                </p:cond>
-              </p:prevCondLst>
-              <p:nextCondLst>
-                <p:cond evt="onNext" delay="0">
-                  <p:tgtEl>
-                    <p:sldTgt/>
-                  </p:tgtEl>
-                </p:cond>
-              </p:nextCondLst>
-            </p:seq>
-          </p:childTnLst>
-        </p:cTn>
+        <p:cTn id="1" dur="indefinite" restart="never" nodeType="tmRoot"/>
       </p:par>
     </p:tnLst>
-    <p:bldLst>
-      <p:bldP spid="7" grpId="0"/>
-      <p:bldP spid="9" grpId="0"/>
-      <p:bldP spid="11" grpId="0"/>
-      <p:bldP spid="8" grpId="0"/>
-    </p:bldLst>
   </p:timing>
 </p:sld>
 </file>
 
 <file path=ppt/slides/slide16.xml><?xml version="1.0" encoding="utf-8"?>
-<p:sld xmlns:a="http://schemas.openxmlformats.org/drawingml/2006/main" xmlns:r="http://schemas.openxmlformats.org/officeDocument/2006/relationships" xmlns:mc="http://schemas.openxmlformats.org/markup-compatibility/2006" xmlns:mv="urn:schemas-microsoft-com:mac:vml" xmlns:p="http://schemas.openxmlformats.org/presentationml/2006/main" mc:Ignorable="mv" mc:PreserveAttributes="mv:*">
+<p:sld xmlns:a="http://schemas.openxmlformats.org/drawingml/2006/main" xmlns:r="http://schemas.openxmlformats.org/officeDocument/2006/relationships" xmlns:p="http://schemas.openxmlformats.org/presentationml/2006/main">
+  <p:cSld>
+    <p:spTree>
+      <p:nvGrpSpPr>
+        <p:cNvPr id="1" name=""/>
+        <p:cNvGrpSpPr/>
+        <p:nvPr/>
+      </p:nvGrpSpPr>
+      <p:grpSpPr>
+        <a:xfrm>
+          <a:off x="0" y="0"/>
+          <a:ext cx="0" cy="0"/>
+          <a:chOff x="0" y="0"/>
+          <a:chExt cx="0" cy="0"/>
+        </a:xfrm>
+      </p:grpSpPr>
+      <p:pic>
+        <p:nvPicPr>
+          <p:cNvPr id="20" name="Picture 3"/>
+          <p:cNvPicPr>
+            <a:picLocks noChangeAspect="1" noChangeArrowheads="1"/>
+          </p:cNvPicPr>
+          <p:nvPr/>
+        </p:nvPicPr>
+        <p:blipFill>
+          <a:blip r:embed="rId2"/>
+          <a:srcRect/>
+          <a:stretch>
+            <a:fillRect/>
+          </a:stretch>
+        </p:blipFill>
+        <p:spPr bwMode="auto">
+          <a:xfrm>
+            <a:off x="19050" y="2426970"/>
+            <a:ext cx="4629150" cy="925830"/>
+          </a:xfrm>
+          <a:prstGeom prst="rect">
+            <a:avLst/>
+          </a:prstGeom>
+          <a:noFill/>
+          <a:ln w="9525">
+            <a:noFill/>
+            <a:miter lim="800000"/>
+            <a:headEnd/>
+            <a:tailEnd/>
+          </a:ln>
+          <a:effectLst/>
+        </p:spPr>
+      </p:pic>
+      <p:sp>
+        <p:nvSpPr>
+          <p:cNvPr id="41" name="Flowchart: Magnetic Disk 40"/>
+          <p:cNvSpPr/>
+          <p:nvPr/>
+        </p:nvSpPr>
+        <p:spPr>
+          <a:xfrm>
+            <a:off x="4443268" y="1371600"/>
+            <a:ext cx="1066800" cy="1219200"/>
+          </a:xfrm>
+          <a:prstGeom prst="flowChartMagneticDisk">
+            <a:avLst/>
+          </a:prstGeom>
+          <a:solidFill>
+            <a:srgbClr val="AECFEA"/>
+          </a:solidFill>
+          <a:ln>
+            <a:solidFill>
+              <a:schemeClr val="accent2"/>
+            </a:solidFill>
+          </a:ln>
+        </p:spPr>
+        <p:style>
+          <a:lnRef idx="2">
+            <a:schemeClr val="accent1">
+              <a:shade val="50000"/>
+            </a:schemeClr>
+          </a:lnRef>
+          <a:fillRef idx="1">
+            <a:schemeClr val="accent1"/>
+          </a:fillRef>
+          <a:effectRef idx="0">
+            <a:schemeClr val="accent1"/>
+          </a:effectRef>
+          <a:fontRef idx="minor">
+            <a:schemeClr val="lt1"/>
+          </a:fontRef>
+        </p:style>
+        <p:txBody>
+          <a:bodyPr rtlCol="0" anchor="ctr"/>
+          <a:lstStyle/>
+          <a:p>
+            <a:pPr algn="ctr"/>
+            <a:endParaRPr lang="en-US"/>
+          </a:p>
+        </p:txBody>
+      </p:sp>
+      <p:sp>
+        <p:nvSpPr>
+          <p:cNvPr id="2" name="Title 1"/>
+          <p:cNvSpPr>
+            <a:spLocks noGrp="1"/>
+          </p:cNvSpPr>
+          <p:nvPr>
+            <p:ph type="title"/>
+          </p:nvPr>
+        </p:nvSpPr>
+        <p:spPr/>
+        <p:txBody>
+          <a:bodyPr/>
+          <a:lstStyle/>
+          <a:p>
+            <a:r>
+              <a:rPr lang="en-US" dirty="0" smtClean="0"/>
+              <a:t>Onto-View</a:t>
+            </a:r>
+            <a:endParaRPr lang="en-US" dirty="0"/>
+          </a:p>
+        </p:txBody>
+      </p:sp>
+      <p:sp>
+        <p:nvSpPr>
+          <p:cNvPr id="4" name="TextBox 3"/>
+          <p:cNvSpPr txBox="1"/>
+          <p:nvPr/>
+        </p:nvSpPr>
+        <p:spPr>
+          <a:xfrm>
+            <a:off x="4175635" y="3393214"/>
+            <a:ext cx="1609543" cy="461665"/>
+          </a:xfrm>
+          <a:prstGeom prst="rect">
+            <a:avLst/>
+          </a:prstGeom>
+          <a:noFill/>
+        </p:spPr>
+        <p:txBody>
+          <a:bodyPr wrap="none" rtlCol="0">
+            <a:spAutoFit/>
+          </a:bodyPr>
+          <a:lstStyle/>
+          <a:p>
+            <a:r>
+              <a:rPr lang="en-US" b="1" dirty="0" smtClean="0"/>
+              <a:t>Onto-View</a:t>
+            </a:r>
+            <a:endParaRPr lang="en-US" b="1" dirty="0"/>
+          </a:p>
+        </p:txBody>
+      </p:sp>
+      <p:grpSp>
+        <p:nvGrpSpPr>
+          <p:cNvPr id="5" name="Group 18"/>
+          <p:cNvGrpSpPr/>
+          <p:nvPr/>
+        </p:nvGrpSpPr>
+        <p:grpSpPr>
+          <a:xfrm>
+            <a:off x="3614470" y="4343400"/>
+            <a:ext cx="3161956" cy="1833265"/>
+            <a:chOff x="3810000" y="5029200"/>
+            <a:chExt cx="3161956" cy="1833265"/>
+          </a:xfrm>
+        </p:grpSpPr>
+        <p:sp>
+          <p:nvSpPr>
+            <p:cNvPr id="7" name="TextBox 6"/>
+            <p:cNvSpPr txBox="1"/>
+            <p:nvPr/>
+          </p:nvSpPr>
+          <p:spPr>
+            <a:xfrm>
+              <a:off x="3810000" y="5029200"/>
+              <a:ext cx="2731838" cy="400110"/>
+            </a:xfrm>
+            <a:prstGeom prst="rect">
+              <a:avLst/>
+            </a:prstGeom>
+            <a:noFill/>
+          </p:spPr>
+          <p:txBody>
+            <a:bodyPr wrap="none" rtlCol="0">
+              <a:spAutoFit/>
+            </a:bodyPr>
+            <a:lstStyle/>
+            <a:p>
+              <a:r>
+                <a:rPr lang="en-US" sz="2000" b="1" dirty="0" smtClean="0"/>
+                <a:t>FGED alternative term</a:t>
+              </a:r>
+              <a:endParaRPr lang="en-US" sz="2000" b="1" dirty="0"/>
+            </a:p>
+          </p:txBody>
+        </p:sp>
+        <p:sp>
+          <p:nvSpPr>
+            <p:cNvPr id="11" name="TextBox 10"/>
+            <p:cNvSpPr txBox="1"/>
+            <p:nvPr/>
+          </p:nvSpPr>
+          <p:spPr>
+            <a:xfrm>
+              <a:off x="3810000" y="5385137"/>
+              <a:ext cx="3161956" cy="1477328"/>
+            </a:xfrm>
+            <a:prstGeom prst="rect">
+              <a:avLst/>
+            </a:prstGeom>
+            <a:noFill/>
+          </p:spPr>
+          <p:txBody>
+            <a:bodyPr wrap="none" rtlCol="0">
+              <a:spAutoFit/>
+            </a:bodyPr>
+            <a:lstStyle/>
+            <a:p>
+              <a:r>
+                <a:rPr lang="en-US" sz="1800" dirty="0" smtClean="0"/>
+                <a:t>1. Add FGED alternative term</a:t>
+              </a:r>
+            </a:p>
+            <a:p>
+              <a:r>
+                <a:rPr lang="en-US" sz="1800" dirty="0" smtClean="0"/>
+                <a:t>    property to FGED terms</a:t>
+              </a:r>
+            </a:p>
+            <a:p>
+              <a:r>
+                <a:rPr lang="en-US" sz="1800" dirty="0" smtClean="0"/>
+                <a:t>2. Extract terms with ‘FGED </a:t>
+              </a:r>
+            </a:p>
+            <a:p>
+              <a:r>
+                <a:rPr lang="en-US" sz="1800" dirty="0" smtClean="0"/>
+                <a:t>    alternative term’ property and</a:t>
+              </a:r>
+            </a:p>
+            <a:p>
+              <a:r>
+                <a:rPr lang="en-US" sz="1800" dirty="0" smtClean="0"/>
+                <a:t>    all the axioms related to them</a:t>
+              </a:r>
+              <a:endParaRPr lang="en-US" sz="1800" dirty="0"/>
+            </a:p>
+          </p:txBody>
+        </p:sp>
+      </p:grpSp>
+      <p:sp>
+        <p:nvSpPr>
+          <p:cNvPr id="35" name="TextBox 34"/>
+          <p:cNvSpPr txBox="1"/>
+          <p:nvPr/>
+        </p:nvSpPr>
+        <p:spPr>
+          <a:xfrm>
+            <a:off x="6773467" y="3209026"/>
+            <a:ext cx="2141933" cy="830997"/>
+          </a:xfrm>
+          <a:prstGeom prst="rect">
+            <a:avLst/>
+          </a:prstGeom>
+          <a:noFill/>
+        </p:spPr>
+        <p:txBody>
+          <a:bodyPr wrap="none" rtlCol="0">
+            <a:spAutoFit/>
+          </a:bodyPr>
+          <a:lstStyle/>
+          <a:p>
+            <a:r>
+              <a:rPr lang="en-US" dirty="0" smtClean="0"/>
+              <a:t>Here will show</a:t>
+            </a:r>
+          </a:p>
+          <a:p>
+            <a:r>
+              <a:rPr lang="en-US" dirty="0"/>
+              <a:t>t</a:t>
+            </a:r>
+            <a:r>
+              <a:rPr lang="en-US" dirty="0" smtClean="0"/>
+              <a:t>he result</a:t>
+            </a:r>
+            <a:endParaRPr lang="en-US" dirty="0"/>
+          </a:p>
+        </p:txBody>
+      </p:sp>
+      <p:cxnSp>
+        <p:nvCxnSpPr>
+          <p:cNvPr id="37" name="Straight Arrow Connector 36"/>
+          <p:cNvCxnSpPr>
+            <a:stCxn id="7" idx="0"/>
+            <a:endCxn id="4" idx="2"/>
+          </p:cNvCxnSpPr>
+          <p:nvPr/>
+        </p:nvCxnSpPr>
+        <p:spPr>
+          <a:xfrm rot="5400000" flipH="1" flipV="1">
+            <a:off x="4736138" y="4099131"/>
+            <a:ext cx="488521" cy="18"/>
+          </a:xfrm>
+          <a:prstGeom prst="straightConnector1">
+            <a:avLst/>
+          </a:prstGeom>
+          <a:ln w="19050">
+            <a:solidFill>
+              <a:schemeClr val="accent2">
+                <a:lumMod val="50000"/>
+              </a:schemeClr>
+            </a:solidFill>
+            <a:tailEnd type="arrow"/>
+          </a:ln>
+        </p:spPr>
+        <p:style>
+          <a:lnRef idx="1">
+            <a:schemeClr val="accent1"/>
+          </a:lnRef>
+          <a:fillRef idx="0">
+            <a:schemeClr val="accent1"/>
+          </a:fillRef>
+          <a:effectRef idx="0">
+            <a:schemeClr val="accent1"/>
+          </a:effectRef>
+          <a:fontRef idx="minor">
+            <a:schemeClr val="tx1"/>
+          </a:fontRef>
+        </p:style>
+      </p:cxnSp>
+      <p:cxnSp>
+        <p:nvCxnSpPr>
+          <p:cNvPr id="39" name="Straight Arrow Connector 38"/>
+          <p:cNvCxnSpPr>
+            <a:stCxn id="4" idx="3"/>
+            <a:endCxn id="35" idx="1"/>
+          </p:cNvCxnSpPr>
+          <p:nvPr/>
+        </p:nvCxnSpPr>
+        <p:spPr>
+          <a:xfrm>
+            <a:off x="5785178" y="3624047"/>
+            <a:ext cx="988289" cy="478"/>
+          </a:xfrm>
+          <a:prstGeom prst="straightConnector1">
+            <a:avLst/>
+          </a:prstGeom>
+          <a:ln w="19050">
+            <a:solidFill>
+              <a:schemeClr val="accent2">
+                <a:lumMod val="50000"/>
+              </a:schemeClr>
+            </a:solidFill>
+            <a:tailEnd type="arrow"/>
+          </a:ln>
+        </p:spPr>
+        <p:style>
+          <a:lnRef idx="1">
+            <a:schemeClr val="accent1"/>
+          </a:lnRef>
+          <a:fillRef idx="0">
+            <a:schemeClr val="accent1"/>
+          </a:fillRef>
+          <a:effectRef idx="0">
+            <a:schemeClr val="accent1"/>
+          </a:effectRef>
+          <a:fontRef idx="minor">
+            <a:schemeClr val="tx1"/>
+          </a:fontRef>
+        </p:style>
+      </p:cxnSp>
+      <p:sp>
+        <p:nvSpPr>
+          <p:cNvPr id="40" name="TextBox 39"/>
+          <p:cNvSpPr txBox="1"/>
+          <p:nvPr/>
+        </p:nvSpPr>
+        <p:spPr>
+          <a:xfrm>
+            <a:off x="4367068" y="1828800"/>
+            <a:ext cx="1245854" cy="707886"/>
+          </a:xfrm>
+          <a:prstGeom prst="rect">
+            <a:avLst/>
+          </a:prstGeom>
+          <a:noFill/>
+        </p:spPr>
+        <p:txBody>
+          <a:bodyPr wrap="none" rtlCol="0">
+            <a:spAutoFit/>
+          </a:bodyPr>
+          <a:lstStyle/>
+          <a:p>
+            <a:pPr algn="ctr"/>
+            <a:r>
+              <a:rPr lang="en-US" sz="2000" dirty="0" smtClean="0"/>
+              <a:t>RDF store</a:t>
+            </a:r>
+          </a:p>
+          <a:p>
+            <a:pPr algn="ctr"/>
+            <a:r>
+              <a:rPr lang="en-US" sz="2000" dirty="0" smtClean="0"/>
+              <a:t>(obi.owl)</a:t>
+            </a:r>
+            <a:endParaRPr lang="en-US" sz="2000" dirty="0"/>
+          </a:p>
+        </p:txBody>
+      </p:sp>
+      <p:cxnSp>
+        <p:nvCxnSpPr>
+          <p:cNvPr id="52" name="Straight Arrow Connector 51"/>
+          <p:cNvCxnSpPr>
+            <a:stCxn id="4" idx="0"/>
+            <a:endCxn id="41" idx="3"/>
+          </p:cNvCxnSpPr>
+          <p:nvPr/>
+        </p:nvCxnSpPr>
+        <p:spPr>
+          <a:xfrm rot="16200000" flipV="1">
+            <a:off x="4577331" y="2990137"/>
+            <a:ext cx="802414" cy="3739"/>
+          </a:xfrm>
+          <a:prstGeom prst="straightConnector1">
+            <a:avLst/>
+          </a:prstGeom>
+          <a:ln w="19050">
+            <a:solidFill>
+              <a:schemeClr val="tx1"/>
+            </a:solidFill>
+            <a:tailEnd type="arrow"/>
+          </a:ln>
+        </p:spPr>
+        <p:style>
+          <a:lnRef idx="1">
+            <a:schemeClr val="accent1"/>
+          </a:lnRef>
+          <a:fillRef idx="0">
+            <a:schemeClr val="accent1"/>
+          </a:fillRef>
+          <a:effectRef idx="0">
+            <a:schemeClr val="accent1"/>
+          </a:effectRef>
+          <a:fontRef idx="minor">
+            <a:schemeClr val="tx1"/>
+          </a:fontRef>
+        </p:style>
+      </p:cxnSp>
+      <p:sp>
+        <p:nvSpPr>
+          <p:cNvPr id="55" name="TextBox 54"/>
+          <p:cNvSpPr txBox="1"/>
+          <p:nvPr/>
+        </p:nvSpPr>
+        <p:spPr>
+          <a:xfrm>
+            <a:off x="5105400" y="2678668"/>
+            <a:ext cx="671979" cy="369332"/>
+          </a:xfrm>
+          <a:prstGeom prst="rect">
+            <a:avLst/>
+          </a:prstGeom>
+          <a:noFill/>
+        </p:spPr>
+        <p:txBody>
+          <a:bodyPr wrap="none" rtlCol="0">
+            <a:spAutoFit/>
+          </a:bodyPr>
+          <a:lstStyle/>
+          <a:p>
+            <a:r>
+              <a:rPr lang="en-US" sz="1800" dirty="0" err="1" smtClean="0"/>
+              <a:t>acess</a:t>
+            </a:r>
+            <a:endParaRPr lang="en-US" sz="1800" dirty="0"/>
+          </a:p>
+        </p:txBody>
+      </p:sp>
+      <p:cxnSp>
+        <p:nvCxnSpPr>
+          <p:cNvPr id="22" name="Shape 21"/>
+          <p:cNvCxnSpPr>
+            <a:stCxn id="20" idx="2"/>
+            <a:endCxn id="4" idx="1"/>
+          </p:cNvCxnSpPr>
+          <p:nvPr/>
+        </p:nvCxnSpPr>
+        <p:spPr>
+          <a:xfrm rot="16200000" flipH="1">
+            <a:off x="3119007" y="2567418"/>
+            <a:ext cx="271247" cy="1842010"/>
+          </a:xfrm>
+          <a:prstGeom prst="bentConnector2">
+            <a:avLst/>
+          </a:prstGeom>
+          <a:ln w="19050">
+            <a:solidFill>
+              <a:schemeClr val="tx1"/>
+            </a:solidFill>
+            <a:tailEnd type="arrow"/>
+          </a:ln>
+        </p:spPr>
+        <p:style>
+          <a:lnRef idx="1">
+            <a:schemeClr val="accent1"/>
+          </a:lnRef>
+          <a:fillRef idx="0">
+            <a:schemeClr val="accent1"/>
+          </a:fillRef>
+          <a:effectRef idx="0">
+            <a:schemeClr val="accent1"/>
+          </a:effectRef>
+          <a:fontRef idx="minor">
+            <a:schemeClr val="tx1"/>
+          </a:fontRef>
+        </p:style>
+      </p:cxnSp>
+    </p:spTree>
+  </p:cSld>
+  <p:clrMapOvr>
+    <a:masterClrMapping/>
+  </p:clrMapOvr>
+  <p:timing>
+    <p:tnLst>
+      <p:par>
+        <p:cTn id="1" dur="indefinite" restart="never" nodeType="tmRoot"/>
+      </p:par>
+    </p:tnLst>
+  </p:timing>
+</p:sld>
+</file>
+
+<file path=ppt/slides/slide17.xml><?xml version="1.0" encoding="utf-8"?>
+<p:sld xmlns:a="http://schemas.openxmlformats.org/drawingml/2006/main" xmlns:r="http://schemas.openxmlformats.org/officeDocument/2006/relationships" xmlns:p="http://schemas.openxmlformats.org/presentationml/2006/main">
   <p:cSld>
     <p:spTree>
       <p:nvGrpSpPr>
@@ -5501,25 +5766,7 @@
               <a:rPr lang="en-US" sz="3000" kern="0" smtClean="0">
                 <a:ea typeface="ＭＳ Ｐゴシック" pitchFamily="34" charset="-128"/>
               </a:rPr>
-              <a:t>M</a:t>
-            </a:r>
-            <a:r>
-              <a:rPr lang="en-US" sz="3000" kern="0" smtClean="0">
-                <a:ea typeface="ＭＳ Ｐゴシック" pitchFamily="34" charset="-128"/>
-              </a:rPr>
-              <a:t>é</a:t>
-            </a:r>
-            <a:r>
-              <a:rPr lang="en-US" sz="3000" kern="0" smtClean="0">
-                <a:ea typeface="ＭＳ Ｐゴシック" pitchFamily="34" charset="-128"/>
-              </a:rPr>
-              <a:t>lanie</a:t>
-            </a:r>
-            <a:r>
-              <a:rPr lang="en-US" sz="3000" kern="0" dirty="0" smtClean="0">
-                <a:ea typeface="ＭＳ Ｐゴシック" pitchFamily="34" charset="-128"/>
-              </a:rPr>
-              <a:t> </a:t>
+              <a:t>Mélanie</a:t>
             </a:r>
             <a:r>
               <a:rPr lang="en-US" sz="3000" kern="0" dirty="0">
@@ -5683,12 +5930,6 @@
                 <a:ea typeface="ＭＳ Ｐゴシック" pitchFamily="34" charset="-128"/>
               </a:rPr>
               <a:t>Zuoshuang</a:t>
-            </a:r>
-            <a:r>
-              <a:rPr lang="en-US" sz="3000" kern="0" dirty="0">
-                <a:ea typeface="ＭＳ Ｐゴシック" pitchFamily="34" charset="-128"/>
-              </a:rPr>
-              <a:t> </a:t>
             </a:r>
             <a:r>
               <a:rPr lang="en-US" sz="3000" kern="0" dirty="0" smtClean="0">
@@ -5810,7 +6051,7 @@
 </file>
 
 <file path=ppt/slides/slide2.xml><?xml version="1.0" encoding="utf-8"?>
-<p:sld xmlns:a="http://schemas.openxmlformats.org/drawingml/2006/main" xmlns:r="http://schemas.openxmlformats.org/officeDocument/2006/relationships" xmlns:mc="http://schemas.openxmlformats.org/markup-compatibility/2006" xmlns:mv="urn:schemas-microsoft-com:mac:vml" xmlns:p="http://schemas.openxmlformats.org/presentationml/2006/main" mc:Ignorable="mv" mc:PreserveAttributes="mv:*">
+<p:sld xmlns:a="http://schemas.openxmlformats.org/drawingml/2006/main" xmlns:r="http://schemas.openxmlformats.org/officeDocument/2006/relationships" xmlns:p="http://schemas.openxmlformats.org/presentationml/2006/main">
   <p:cSld>
     <p:spTree>
       <p:nvGrpSpPr>
@@ -5944,7 +6185,7 @@
 </file>
 
 <file path=ppt/slides/slide3.xml><?xml version="1.0" encoding="utf-8"?>
-<p:sld xmlns:a="http://schemas.openxmlformats.org/drawingml/2006/main" xmlns:r="http://schemas.openxmlformats.org/officeDocument/2006/relationships" xmlns:mc="http://schemas.openxmlformats.org/markup-compatibility/2006" xmlns:mv="urn:schemas-microsoft-com:mac:vml" xmlns:p="http://schemas.openxmlformats.org/presentationml/2006/main" mc:Ignorable="mv" mc:PreserveAttributes="mv:*">
+<p:sld xmlns:a="http://schemas.openxmlformats.org/drawingml/2006/main" xmlns:r="http://schemas.openxmlformats.org/officeDocument/2006/relationships" xmlns:p="http://schemas.openxmlformats.org/presentationml/2006/main">
   <p:cSld>
     <p:spTree>
       <p:nvGrpSpPr>
@@ -6040,7 +6281,7 @@
 </file>
 
 <file path=ppt/slides/slide4.xml><?xml version="1.0" encoding="utf-8"?>
-<p:sld xmlns:a="http://schemas.openxmlformats.org/drawingml/2006/main" xmlns:r="http://schemas.openxmlformats.org/officeDocument/2006/relationships" xmlns:mc="http://schemas.openxmlformats.org/markup-compatibility/2006" xmlns:mv="urn:schemas-microsoft-com:mac:vml" xmlns:p="http://schemas.openxmlformats.org/presentationml/2006/main" mc:Ignorable="mv" mc:PreserveAttributes="mv:*">
+<p:sld xmlns:a="http://schemas.openxmlformats.org/drawingml/2006/main" xmlns:r="http://schemas.openxmlformats.org/officeDocument/2006/relationships" xmlns:p="http://schemas.openxmlformats.org/presentationml/2006/main">
   <p:cSld>
     <p:spTree>
       <p:nvGrpSpPr>
@@ -6148,14 +6389,6 @@
               <a:buFont typeface="Symbol" pitchFamily="18" charset="2"/>
               <a:buNone/>
             </a:pPr>
-            <a:r>
-              <a:rPr lang="en-US" dirty="0"/>
-              <a:t> 	</a:t>
-            </a:r>
-            <a:r>
-              <a:rPr lang="en-US" dirty="0" smtClean="0"/>
-              <a:t>	</a:t>
-            </a:r>
             <a:endParaRPr lang="en-US" sz="2400" i="1" dirty="0"/>
           </a:p>
         </p:txBody>
@@ -6169,7 +6402,7 @@
 </file>
 
 <file path=ppt/slides/slide5.xml><?xml version="1.0" encoding="utf-8"?>
-<p:sld xmlns:a="http://schemas.openxmlformats.org/drawingml/2006/main" xmlns:r="http://schemas.openxmlformats.org/officeDocument/2006/relationships" xmlns:mc="http://schemas.openxmlformats.org/markup-compatibility/2006" xmlns:mv="urn:schemas-microsoft-com:mac:vml" xmlns:p="http://schemas.openxmlformats.org/presentationml/2006/main" mc:Ignorable="mv" mc:PreserveAttributes="mv:*">
+<p:sld xmlns:a="http://schemas.openxmlformats.org/drawingml/2006/main" xmlns:r="http://schemas.openxmlformats.org/officeDocument/2006/relationships" xmlns:p="http://schemas.openxmlformats.org/presentationml/2006/main">
   <p:cSld>
     <p:spTree>
       <p:nvGrpSpPr>
@@ -6257,7 +6490,7 @@
 </file>
 
 <file path=ppt/slides/slide6.xml><?xml version="1.0" encoding="utf-8"?>
-<p:sld xmlns:a="http://schemas.openxmlformats.org/drawingml/2006/main" xmlns:r="http://schemas.openxmlformats.org/officeDocument/2006/relationships" xmlns:mc="http://schemas.openxmlformats.org/markup-compatibility/2006" xmlns:mv="urn:schemas-microsoft-com:mac:vml" xmlns:p="http://schemas.openxmlformats.org/presentationml/2006/main" mc:Ignorable="mv" mc:PreserveAttributes="mv:*">
+<p:sld xmlns:a="http://schemas.openxmlformats.org/drawingml/2006/main" xmlns:r="http://schemas.openxmlformats.org/officeDocument/2006/relationships" xmlns:p="http://schemas.openxmlformats.org/presentationml/2006/main">
   <p:cSld>
     <p:spTree>
       <p:nvGrpSpPr>
@@ -6289,8 +6522,16 @@
           <a:lstStyle/>
           <a:p>
             <a:r>
-              <a:rPr lang="en-US"/>
-              <a:t>MIREOT automatically</a:t>
+              <a:rPr lang="en-US" dirty="0" err="1" smtClean="0"/>
+              <a:t>MIREOTing</a:t>
+            </a:r>
+            <a:r>
+              <a:rPr lang="en-US" dirty="0" smtClean="0"/>
+              <a:t> </a:t>
+            </a:r>
+            <a:r>
+              <a:rPr lang="en-US" dirty="0"/>
+              <a:t>automatically</a:t>
             </a:r>
           </a:p>
         </p:txBody>
@@ -6311,15 +6552,31 @@
           <a:lstStyle/>
           <a:p>
             <a:r>
-              <a:rPr lang="en-US"/>
-              <a:t>Perl + Lisp scripts used in OBI</a:t>
-            </a:r>
-          </a:p>
-          <a:p>
-            <a:r>
-              <a:rPr lang="en-US"/>
+              <a:rPr lang="en-US" dirty="0" smtClean="0"/>
+              <a:t>Perl + Lisp scripts </a:t>
+            </a:r>
+          </a:p>
+          <a:p>
+            <a:pPr lvl="1"/>
+            <a:r>
+              <a:rPr lang="en-US" dirty="0" smtClean="0"/>
+              <a:t>used by OBI developers</a:t>
+            </a:r>
+          </a:p>
+          <a:p>
+            <a:r>
+              <a:rPr lang="en-US" dirty="0" err="1" smtClean="0"/>
               <a:t>OntoFox</a:t>
             </a:r>
+            <a:endParaRPr lang="en-US" dirty="0" smtClean="0"/>
+          </a:p>
+          <a:p>
+            <a:pPr lvl="1"/>
+            <a:r>
+              <a:rPr lang="en-US" dirty="0" smtClean="0"/>
+              <a:t>Web-based tool that can be easily used by all developers (compare to OBI implementations)</a:t>
+            </a:r>
+            <a:endParaRPr lang="en-US" dirty="0"/>
           </a:p>
         </p:txBody>
       </p:sp>
@@ -6332,7 +6589,7 @@
 </file>
 
 <file path=ppt/slides/slide7.xml><?xml version="1.0" encoding="utf-8"?>
-<p:sld xmlns:a="http://schemas.openxmlformats.org/drawingml/2006/main" xmlns:r="http://schemas.openxmlformats.org/officeDocument/2006/relationships" xmlns:mc="http://schemas.openxmlformats.org/markup-compatibility/2006" xmlns:mv="urn:schemas-microsoft-com:mac:vml" xmlns:p="http://schemas.openxmlformats.org/presentationml/2006/main" mc:Ignorable="mv" mc:PreserveAttributes="mv:*">
+<p:sld xmlns:a="http://schemas.openxmlformats.org/drawingml/2006/main" xmlns:r="http://schemas.openxmlformats.org/officeDocument/2006/relationships" xmlns:p="http://schemas.openxmlformats.org/presentationml/2006/main">
   <p:cSld>
     <p:spTree>
       <p:nvGrpSpPr>
@@ -6350,9 +6607,9 @@
       </p:grpSpPr>
       <p:sp>
         <p:nvSpPr>
-          <p:cNvPr id="9218" name="Rectangle 2"/>
-          <p:cNvSpPr>
-            <a:spLocks noGrp="1" noChangeArrowheads="1"/>
+          <p:cNvPr id="2" name="Title 1"/>
+          <p:cNvSpPr>
+            <a:spLocks noGrp="1"/>
           </p:cNvSpPr>
           <p:nvPr>
             <p:ph type="title"/>
@@ -6364,63 +6621,152 @@
           <a:lstStyle/>
           <a:p>
             <a:r>
-              <a:rPr lang="en-US"/>
+              <a:rPr lang="en-US" dirty="0" smtClean="0"/>
               <a:t>Scripts used by OBI</a:t>
             </a:r>
-          </a:p>
-        </p:txBody>
-      </p:sp>
-      <p:sp>
-        <p:nvSpPr>
-          <p:cNvPr id="9219" name="Rectangle 3"/>
-          <p:cNvSpPr>
-            <a:spLocks noGrp="1" noChangeArrowheads="1"/>
-          </p:cNvSpPr>
-          <p:nvPr>
-            <p:ph type="body" idx="1"/>
-          </p:nvPr>
+            <a:endParaRPr lang="en-US" dirty="0"/>
+          </a:p>
+        </p:txBody>
+      </p:sp>
+      <p:pic>
+        <p:nvPicPr>
+          <p:cNvPr id="1025" name="Picture 1" descr="https://docs.google.com/File?id=dzprnmw_26hqg2m4vp_b"/>
+          <p:cNvPicPr>
+            <a:picLocks noChangeAspect="1" noChangeArrowheads="1"/>
+          </p:cNvPicPr>
+          <p:nvPr/>
+        </p:nvPicPr>
+        <p:blipFill>
+          <a:blip r:embed="rId2"/>
+          <a:srcRect/>
+          <a:stretch>
+            <a:fillRect/>
+          </a:stretch>
+        </p:blipFill>
+        <p:spPr bwMode="auto">
+          <a:xfrm>
+            <a:off x="1143000" y="1066800"/>
+            <a:ext cx="6858000" cy="5143500"/>
+          </a:xfrm>
+          <a:prstGeom prst="rect">
+            <a:avLst/>
+          </a:prstGeom>
+          <a:noFill/>
+        </p:spPr>
+      </p:pic>
+      <p:sp>
+        <p:nvSpPr>
+          <p:cNvPr id="5" name="TextBox 4"/>
+          <p:cNvSpPr txBox="1"/>
+          <p:nvPr/>
         </p:nvSpPr>
         <p:spPr>
           <a:xfrm>
-            <a:off x="533400" y="1447800"/>
-            <a:ext cx="8077200" cy="4648200"/>
+            <a:off x="1676400" y="5943600"/>
+            <a:ext cx="1228221" cy="400110"/>
           </a:xfrm>
+          <a:prstGeom prst="rect">
+            <a:avLst/>
+          </a:prstGeom>
+          <a:noFill/>
         </p:spPr>
         <p:txBody>
-          <a:bodyPr/>
+          <a:bodyPr wrap="none" rtlCol="0">
+            <a:spAutoFit/>
+          </a:bodyPr>
           <a:lstStyle/>
           <a:p>
-            <a:pPr marL="609600" indent="-609600">
-              <a:buFontTx/>
-              <a:buAutoNum type="arabicPeriod"/>
-            </a:pPr>
-            <a:r>
-              <a:rPr lang="en-US" dirty="0"/>
-              <a:t>Add minimal information of import terms in external.owl – using Perl script</a:t>
-            </a:r>
-          </a:p>
-          <a:p>
-            <a:pPr marL="609600" indent="-609600">
-              <a:buFontTx/>
-              <a:buAutoNum type="arabicPeriod"/>
-            </a:pPr>
-            <a:r>
-              <a:rPr lang="en-US" dirty="0"/>
-              <a:t>Add additional information of import terms using external.owl in a separate owl file, externalDerived.owl – using Lisp script</a:t>
-            </a:r>
-          </a:p>
-          <a:p>
-            <a:pPr marL="609600" indent="-609600">
-              <a:buFontTx/>
-              <a:buAutoNum type="arabicPeriod"/>
-            </a:pPr>
-            <a:r>
-              <a:rPr lang="en-US" dirty="0"/>
-              <a:t>In obi.owl import external.owl and externalDerived.owl</a:t>
-            </a:r>
-          </a:p>
-        </p:txBody>
-      </p:sp>
+            <a:r>
+              <a:rPr lang="en-US" sz="2000" dirty="0" smtClean="0">
+                <a:solidFill>
+                  <a:srgbClr val="C00000"/>
+                </a:solidFill>
+              </a:rPr>
+              <a:t>Perl script</a:t>
+            </a:r>
+            <a:endParaRPr lang="en-US" sz="2000" dirty="0">
+              <a:solidFill>
+                <a:srgbClr val="C00000"/>
+              </a:solidFill>
+            </a:endParaRPr>
+          </a:p>
+        </p:txBody>
+      </p:sp>
+      <p:sp>
+        <p:nvSpPr>
+          <p:cNvPr id="6" name="TextBox 5"/>
+          <p:cNvSpPr txBox="1"/>
+          <p:nvPr/>
+        </p:nvSpPr>
+        <p:spPr>
+          <a:xfrm>
+            <a:off x="5815098" y="5943600"/>
+            <a:ext cx="1271502" cy="400110"/>
+          </a:xfrm>
+          <a:prstGeom prst="rect">
+            <a:avLst/>
+          </a:prstGeom>
+          <a:noFill/>
+        </p:spPr>
+        <p:txBody>
+          <a:bodyPr wrap="none" rtlCol="0">
+            <a:spAutoFit/>
+          </a:bodyPr>
+          <a:lstStyle/>
+          <a:p>
+            <a:r>
+              <a:rPr lang="en-US" sz="2000" dirty="0" smtClean="0">
+                <a:solidFill>
+                  <a:srgbClr val="C00000"/>
+                </a:solidFill>
+              </a:rPr>
+              <a:t>Lisp script</a:t>
+            </a:r>
+            <a:endParaRPr lang="en-US" sz="2000" dirty="0">
+              <a:solidFill>
+                <a:srgbClr val="C00000"/>
+              </a:solidFill>
+            </a:endParaRPr>
+          </a:p>
+        </p:txBody>
+      </p:sp>
+      <p:cxnSp>
+        <p:nvCxnSpPr>
+          <p:cNvPr id="8" name="Straight Connector 7"/>
+          <p:cNvCxnSpPr/>
+          <p:nvPr/>
+        </p:nvCxnSpPr>
+        <p:spPr>
+          <a:xfrm>
+            <a:off x="0" y="1219200"/>
+            <a:ext cx="9144000" cy="1588"/>
+          </a:xfrm>
+          <a:prstGeom prst="line">
+            <a:avLst/>
+          </a:prstGeom>
+          <a:ln>
+            <a:solidFill>
+              <a:schemeClr val="accent2">
+                <a:lumMod val="50000"/>
+              </a:schemeClr>
+            </a:solidFill>
+          </a:ln>
+        </p:spPr>
+        <p:style>
+          <a:lnRef idx="1">
+            <a:schemeClr val="accent1"/>
+          </a:lnRef>
+          <a:fillRef idx="0">
+            <a:schemeClr val="accent1"/>
+          </a:fillRef>
+          <a:effectRef idx="0">
+            <a:schemeClr val="accent1"/>
+          </a:effectRef>
+          <a:fontRef idx="minor">
+            <a:schemeClr val="tx1"/>
+          </a:fontRef>
+        </p:style>
+      </p:cxnSp>
     </p:spTree>
   </p:cSld>
   <p:clrMapOvr>
@@ -6430,7 +6776,7 @@
 </file>
 
 <file path=ppt/slides/slide8.xml><?xml version="1.0" encoding="utf-8"?>
-<p:sld xmlns:a="http://schemas.openxmlformats.org/drawingml/2006/main" xmlns:r="http://schemas.openxmlformats.org/officeDocument/2006/relationships" xmlns:mc="http://schemas.openxmlformats.org/markup-compatibility/2006" xmlns:mv="urn:schemas-microsoft-com:mac:vml" xmlns:p="http://schemas.openxmlformats.org/presentationml/2006/main" mc:Ignorable="mv" mc:PreserveAttributes="mv:*">
+<p:sld xmlns:a="http://schemas.openxmlformats.org/drawingml/2006/main" xmlns:r="http://schemas.openxmlformats.org/officeDocument/2006/relationships" xmlns:p="http://schemas.openxmlformats.org/presentationml/2006/main">
   <p:cSld>
     <p:spTree>
       <p:nvGrpSpPr>
@@ -6579,10 +6925,6 @@
               </a:rPr>
               <a:t>http://obi-ontology.org/page/Tutorials#MIREOT</a:t>
             </a:r>
-            <a:r>
-              <a:rPr lang="en-US" sz="2400" dirty="0"/>
-              <a:t> </a:t>
-            </a:r>
           </a:p>
         </p:txBody>
       </p:sp>
@@ -6595,7 +6937,7 @@
 </file>
 
 <file path=ppt/slides/slide9.xml><?xml version="1.0" encoding="utf-8"?>
-<p:sld xmlns:a="http://schemas.openxmlformats.org/drawingml/2006/main" xmlns:r="http://schemas.openxmlformats.org/officeDocument/2006/relationships" xmlns:mc="http://schemas.openxmlformats.org/markup-compatibility/2006" xmlns:mv="urn:schemas-microsoft-com:mac:vml" xmlns:p="http://schemas.openxmlformats.org/presentationml/2006/main" mc:Ignorable="mv" mc:PreserveAttributes="mv:*">
+<p:sld xmlns:a="http://schemas.openxmlformats.org/drawingml/2006/main" xmlns:r="http://schemas.openxmlformats.org/officeDocument/2006/relationships" xmlns:p="http://schemas.openxmlformats.org/presentationml/2006/main">
   <p:cSld>
     <p:spTree>
       <p:nvGrpSpPr>
@@ -6742,17 +7084,8 @@
               <a:rPr lang="en-US" sz="2800" dirty="0" smtClean="0">
                 <a:latin typeface="Calibri" pitchFamily="34" charset="0"/>
               </a:rPr>
-              <a:t>No programming needed for </a:t>
-            </a:r>
-            <a:r>
-              <a:rPr lang="en-US" sz="2800" dirty="0" smtClean="0">
-                <a:latin typeface="Calibri" pitchFamily="34" charset="0"/>
-              </a:rPr>
-              <a:t>users</a:t>
-            </a:r>
-            <a:endParaRPr lang="en-US" sz="2800" dirty="0" smtClean="0">
-              <a:latin typeface="Calibri" pitchFamily="34" charset="0"/>
-            </a:endParaRPr>
+              <a:t>No programming needed for users</a:t>
+            </a:r>
           </a:p>
         </p:txBody>
       </p:sp>
@@ -6816,7 +7149,7 @@
           <a:blip r:embed="rId3" cstate="print">
             <a:extLst>
               <a:ext uri="{28A0092B-C50C-407E-A947-70E740481C1C}">
-                <a14:useLocalDpi xmlns:a14="http://schemas.microsoft.com/office/drawing/2010/main" xmlns:p="http://schemas.openxmlformats.org/presentationml/2006/main" xmlns:r="http://schemas.openxmlformats.org/officeDocument/2006/relationships" xmlns:a="http://schemas.openxmlformats.org/drawingml/2006/main" xmlns="" val="0"/>
+                <a14:useLocalDpi xmlns="" xmlns:a14="http://schemas.microsoft.com/office/drawing/2010/main" xmlns:mv="urn:schemas-microsoft-com:mac:vml" xmlns:mc="http://schemas.openxmlformats.org/markup-compatibility/2006" val="0"/>
               </a:ext>
             </a:extLst>
           </a:blip>
@@ -6843,14 +7176,14 @@
           <a:effectLst/>
           <a:extLst>
             <a:ext uri="{909E8E84-426E-40DD-AFC4-6F175D3DCCD1}">
-              <a14:hiddenFill xmlns:a14="http://schemas.microsoft.com/office/drawing/2010/main" xmlns:p="http://schemas.openxmlformats.org/presentationml/2006/main" xmlns:r="http://schemas.openxmlformats.org/officeDocument/2006/relationships" xmlns:a="http://schemas.openxmlformats.org/drawingml/2006/main" xmlns="">
+              <a14:hiddenFill xmlns="" xmlns:a14="http://schemas.microsoft.com/office/drawing/2010/main" xmlns:mv="urn:schemas-microsoft-com:mac:vml" xmlns:mc="http://schemas.openxmlformats.org/markup-compatibility/2006">
                 <a:solidFill>
                   <a:schemeClr val="accent1"/>
                 </a:solidFill>
               </a14:hiddenFill>
             </a:ext>
             <a:ext uri="{AF507438-7753-43E0-B8FC-AC1667EBCBE1}">
-              <a14:hiddenEffects xmlns:a14="http://schemas.microsoft.com/office/drawing/2010/main" xmlns:p="http://schemas.openxmlformats.org/presentationml/2006/main" xmlns:r="http://schemas.openxmlformats.org/officeDocument/2006/relationships" xmlns:a="http://schemas.openxmlformats.org/drawingml/2006/main" xmlns="">
+              <a14:hiddenEffects xmlns="" xmlns:a14="http://schemas.microsoft.com/office/drawing/2010/main" xmlns:mv="urn:schemas-microsoft-com:mac:vml" xmlns:mc="http://schemas.openxmlformats.org/markup-compatibility/2006">
                 <a:effectLst>
                   <a:outerShdw dist="35921" dir="2700000" algn="ctr" rotWithShape="0">
                     <a:schemeClr val="bg2"/>
@@ -6873,7 +7206,7 @@
           <a:blip r:embed="rId3" cstate="print">
             <a:extLst>
               <a:ext uri="{28A0092B-C50C-407E-A947-70E740481C1C}">
-                <a14:useLocalDpi xmlns:a14="http://schemas.microsoft.com/office/drawing/2010/main" xmlns:p="http://schemas.openxmlformats.org/presentationml/2006/main" xmlns:r="http://schemas.openxmlformats.org/officeDocument/2006/relationships" xmlns:a="http://schemas.openxmlformats.org/drawingml/2006/main" xmlns="" val="0"/>
+                <a14:useLocalDpi xmlns="" xmlns:a14="http://schemas.microsoft.com/office/drawing/2010/main" xmlns:mv="urn:schemas-microsoft-com:mac:vml" xmlns:mc="http://schemas.openxmlformats.org/markup-compatibility/2006" val="0"/>
               </a:ext>
             </a:extLst>
           </a:blip>
@@ -6895,14 +7228,14 @@
           <a:effectLst/>
           <a:extLst>
             <a:ext uri="{909E8E84-426E-40DD-AFC4-6F175D3DCCD1}">
-              <a14:hiddenFill xmlns:a14="http://schemas.microsoft.com/office/drawing/2010/main" xmlns:p="http://schemas.openxmlformats.org/presentationml/2006/main" xmlns:r="http://schemas.openxmlformats.org/officeDocument/2006/relationships" xmlns:a="http://schemas.openxmlformats.org/drawingml/2006/main" xmlns="">
+              <a14:hiddenFill xmlns="" xmlns:a14="http://schemas.microsoft.com/office/drawing/2010/main" xmlns:mv="urn:schemas-microsoft-com:mac:vml" xmlns:mc="http://schemas.openxmlformats.org/markup-compatibility/2006">
                 <a:solidFill>
                   <a:schemeClr val="accent1"/>
                 </a:solidFill>
               </a14:hiddenFill>
             </a:ext>
             <a:ext uri="{91240B29-F687-4F45-9708-019B960494DF}">
-              <a14:hiddenLine xmlns:a14="http://schemas.microsoft.com/office/drawing/2010/main" xmlns:p="http://schemas.openxmlformats.org/presentationml/2006/main" xmlns:r="http://schemas.openxmlformats.org/officeDocument/2006/relationships" xmlns:a="http://schemas.openxmlformats.org/drawingml/2006/main" xmlns="" w="9525">
+              <a14:hiddenLine xmlns="" xmlns:a14="http://schemas.microsoft.com/office/drawing/2010/main" xmlns:mv="urn:schemas-microsoft-com:mac:vml" xmlns:mc="http://schemas.openxmlformats.org/markup-compatibility/2006" w="9525">
                 <a:solidFill>
                   <a:schemeClr val="tx1"/>
                 </a:solidFill>
@@ -6912,7 +7245,7 @@
               </a14:hiddenLine>
             </a:ext>
             <a:ext uri="{AF507438-7753-43E0-B8FC-AC1667EBCBE1}">
-              <a14:hiddenEffects xmlns:a14="http://schemas.microsoft.com/office/drawing/2010/main" xmlns:p="http://schemas.openxmlformats.org/presentationml/2006/main" xmlns:r="http://schemas.openxmlformats.org/officeDocument/2006/relationships" xmlns:a="http://schemas.openxmlformats.org/drawingml/2006/main" xmlns="">
+              <a14:hiddenEffects xmlns="" xmlns:a14="http://schemas.microsoft.com/office/drawing/2010/main" xmlns:mv="urn:schemas-microsoft-com:mac:vml" xmlns:mc="http://schemas.openxmlformats.org/markup-compatibility/2006">
                 <a:effectLst>
                   <a:outerShdw dist="35921" dir="2700000" algn="ctr" rotWithShape="0">
                     <a:schemeClr val="bg2"/>

</xml_diff>

<commit_message>
minor changes based on the comments of Chris and Allen
</commit_message>
<xml_diff>
--- a/docs/presentations/OBI tutorial July 2011 ICBO/MIREOT-View.pptx
+++ b/docs/presentations/OBI tutorial July 2011 ICBO/MIREOT-View.pptx
@@ -1,6 +1,6 @@
 
 <file path=ppt/presentation.xml><?xml version="1.0" encoding="utf-8"?>
-<p:presentation xmlns:a="http://schemas.openxmlformats.org/drawingml/2006/main" xmlns:r="http://schemas.openxmlformats.org/officeDocument/2006/relationships" xmlns:mc="http://schemas.openxmlformats.org/markup-compatibility/2006" xmlns:mv="urn:schemas-microsoft-com:mac:vml" xmlns:p="http://schemas.openxmlformats.org/presentationml/2006/main" mc:Ignorable="mv" mc:PreserveAttributes="mv:*" saveSubsetFonts="1">
+<p:presentation xmlns:a="http://schemas.openxmlformats.org/drawingml/2006/main" xmlns:r="http://schemas.openxmlformats.org/officeDocument/2006/relationships" xmlns:p="http://schemas.openxmlformats.org/presentationml/2006/main" saveSubsetFonts="1">
   <p:sldMasterIdLst>
     <p:sldMasterId id="2147483648" r:id="rId1"/>
   </p:sldMasterIdLst>
@@ -154,7 +154,7 @@
 </file>
 
 <file path=ppt/slideLayouts/slideLayout1.xml><?xml version="1.0" encoding="utf-8"?>
-<p:sldLayout xmlns:a="http://schemas.openxmlformats.org/drawingml/2006/main" xmlns:r="http://schemas.openxmlformats.org/officeDocument/2006/relationships" xmlns:mc="http://schemas.openxmlformats.org/markup-compatibility/2006" xmlns:mv="urn:schemas-microsoft-com:mac:vml" xmlns:p="http://schemas.openxmlformats.org/presentationml/2006/main" mc:Ignorable="mv" mc:PreserveAttributes="mv:*" type="title" preserve="1">
+<p:sldLayout xmlns:a="http://schemas.openxmlformats.org/drawingml/2006/main" xmlns:r="http://schemas.openxmlformats.org/officeDocument/2006/relationships" xmlns:p="http://schemas.openxmlformats.org/presentationml/2006/main" type="title" preserve="1">
   <p:cSld name="Title Slide">
     <p:spTree>
       <p:nvGrpSpPr>
@@ -346,7 +346,7 @@
 </file>
 
 <file path=ppt/slideLayouts/slideLayout10.xml><?xml version="1.0" encoding="utf-8"?>
-<p:sldLayout xmlns:a="http://schemas.openxmlformats.org/drawingml/2006/main" xmlns:r="http://schemas.openxmlformats.org/officeDocument/2006/relationships" xmlns:mc="http://schemas.openxmlformats.org/markup-compatibility/2006" xmlns:mv="urn:schemas-microsoft-com:mac:vml" xmlns:p="http://schemas.openxmlformats.org/presentationml/2006/main" mc:Ignorable="mv" mc:PreserveAttributes="mv:*" type="vertTx" preserve="1">
+<p:sldLayout xmlns:a="http://schemas.openxmlformats.org/drawingml/2006/main" xmlns:r="http://schemas.openxmlformats.org/officeDocument/2006/relationships" xmlns:p="http://schemas.openxmlformats.org/presentationml/2006/main" type="vertTx" preserve="1">
   <p:cSld name="Title and Vertical Text">
     <p:spTree>
       <p:nvGrpSpPr>
@@ -520,7 +520,7 @@
 </file>
 
 <file path=ppt/slideLayouts/slideLayout11.xml><?xml version="1.0" encoding="utf-8"?>
-<p:sldLayout xmlns:a="http://schemas.openxmlformats.org/drawingml/2006/main" xmlns:r="http://schemas.openxmlformats.org/officeDocument/2006/relationships" xmlns:mc="http://schemas.openxmlformats.org/markup-compatibility/2006" xmlns:mv="urn:schemas-microsoft-com:mac:vml" xmlns:p="http://schemas.openxmlformats.org/presentationml/2006/main" mc:Ignorable="mv" mc:PreserveAttributes="mv:*" type="vertTitleAndTx" preserve="1">
+<p:sldLayout xmlns:a="http://schemas.openxmlformats.org/drawingml/2006/main" xmlns:r="http://schemas.openxmlformats.org/officeDocument/2006/relationships" xmlns:p="http://schemas.openxmlformats.org/presentationml/2006/main" type="vertTitleAndTx" preserve="1">
   <p:cSld name="Vertical Title and Text">
     <p:spTree>
       <p:nvGrpSpPr>
@@ -704,7 +704,7 @@
 </file>
 
 <file path=ppt/slideLayouts/slideLayout2.xml><?xml version="1.0" encoding="utf-8"?>
-<p:sldLayout xmlns:a="http://schemas.openxmlformats.org/drawingml/2006/main" xmlns:r="http://schemas.openxmlformats.org/officeDocument/2006/relationships" xmlns:mc="http://schemas.openxmlformats.org/markup-compatibility/2006" xmlns:mv="urn:schemas-microsoft-com:mac:vml" xmlns:p="http://schemas.openxmlformats.org/presentationml/2006/main" mc:Ignorable="mv" mc:PreserveAttributes="mv:*" type="obj" preserve="1">
+<p:sldLayout xmlns:a="http://schemas.openxmlformats.org/drawingml/2006/main" xmlns:r="http://schemas.openxmlformats.org/officeDocument/2006/relationships" xmlns:p="http://schemas.openxmlformats.org/presentationml/2006/main" type="obj" preserve="1">
   <p:cSld name="Title and Content">
     <p:spTree>
       <p:nvGrpSpPr>
@@ -925,7 +925,7 @@
 </file>
 
 <file path=ppt/slideLayouts/slideLayout3.xml><?xml version="1.0" encoding="utf-8"?>
-<p:sldLayout xmlns:a="http://schemas.openxmlformats.org/drawingml/2006/main" xmlns:r="http://schemas.openxmlformats.org/officeDocument/2006/relationships" xmlns:mc="http://schemas.openxmlformats.org/markup-compatibility/2006" xmlns:mv="urn:schemas-microsoft-com:mac:vml" xmlns:p="http://schemas.openxmlformats.org/presentationml/2006/main" mc:Ignorable="mv" mc:PreserveAttributes="mv:*" type="secHead" preserve="1">
+<p:sldLayout xmlns:a="http://schemas.openxmlformats.org/drawingml/2006/main" xmlns:r="http://schemas.openxmlformats.org/officeDocument/2006/relationships" xmlns:p="http://schemas.openxmlformats.org/presentationml/2006/main" type="secHead" preserve="1">
   <p:cSld name="Section Header">
     <p:spTree>
       <p:nvGrpSpPr>
@@ -1121,7 +1121,7 @@
 </file>
 
 <file path=ppt/slideLayouts/slideLayout4.xml><?xml version="1.0" encoding="utf-8"?>
-<p:sldLayout xmlns:a="http://schemas.openxmlformats.org/drawingml/2006/main" xmlns:r="http://schemas.openxmlformats.org/officeDocument/2006/relationships" xmlns:mc="http://schemas.openxmlformats.org/markup-compatibility/2006" xmlns:mv="urn:schemas-microsoft-com:mac:vml" xmlns:p="http://schemas.openxmlformats.org/presentationml/2006/main" mc:Ignorable="mv" mc:PreserveAttributes="mv:*" type="twoObj" preserve="1">
+<p:sldLayout xmlns:a="http://schemas.openxmlformats.org/drawingml/2006/main" xmlns:r="http://schemas.openxmlformats.org/officeDocument/2006/relationships" xmlns:p="http://schemas.openxmlformats.org/presentationml/2006/main" type="twoObj" preserve="1">
   <p:cSld name="Two Content">
     <p:spTree>
       <p:nvGrpSpPr>
@@ -1413,7 +1413,7 @@
 </file>
 
 <file path=ppt/slideLayouts/slideLayout5.xml><?xml version="1.0" encoding="utf-8"?>
-<p:sldLayout xmlns:a="http://schemas.openxmlformats.org/drawingml/2006/main" xmlns:r="http://schemas.openxmlformats.org/officeDocument/2006/relationships" xmlns:mc="http://schemas.openxmlformats.org/markup-compatibility/2006" xmlns:mv="urn:schemas-microsoft-com:mac:vml" xmlns:p="http://schemas.openxmlformats.org/presentationml/2006/main" mc:Ignorable="mv" mc:PreserveAttributes="mv:*" type="twoTxTwoObj" preserve="1">
+<p:sldLayout xmlns:a="http://schemas.openxmlformats.org/drawingml/2006/main" xmlns:r="http://schemas.openxmlformats.org/officeDocument/2006/relationships" xmlns:p="http://schemas.openxmlformats.org/presentationml/2006/main" type="twoTxTwoObj" preserve="1">
   <p:cSld name="Comparison">
     <p:spTree>
       <p:nvGrpSpPr>
@@ -1844,7 +1844,7 @@
 </file>
 
 <file path=ppt/slideLayouts/slideLayout6.xml><?xml version="1.0" encoding="utf-8"?>
-<p:sldLayout xmlns:a="http://schemas.openxmlformats.org/drawingml/2006/main" xmlns:r="http://schemas.openxmlformats.org/officeDocument/2006/relationships" xmlns:mc="http://schemas.openxmlformats.org/markup-compatibility/2006" xmlns:mv="urn:schemas-microsoft-com:mac:vml" xmlns:p="http://schemas.openxmlformats.org/presentationml/2006/main" mc:Ignorable="mv" mc:PreserveAttributes="mv:*" type="titleOnly" preserve="1">
+<p:sldLayout xmlns:a="http://schemas.openxmlformats.org/drawingml/2006/main" xmlns:r="http://schemas.openxmlformats.org/officeDocument/2006/relationships" xmlns:p="http://schemas.openxmlformats.org/presentationml/2006/main" type="titleOnly" preserve="1">
   <p:cSld name="Title Only">
     <p:spTree>
       <p:nvGrpSpPr>
@@ -1966,7 +1966,7 @@
 </file>
 
 <file path=ppt/slideLayouts/slideLayout7.xml><?xml version="1.0" encoding="utf-8"?>
-<p:sldLayout xmlns:a="http://schemas.openxmlformats.org/drawingml/2006/main" xmlns:r="http://schemas.openxmlformats.org/officeDocument/2006/relationships" xmlns:mc="http://schemas.openxmlformats.org/markup-compatibility/2006" xmlns:mv="urn:schemas-microsoft-com:mac:vml" xmlns:p="http://schemas.openxmlformats.org/presentationml/2006/main" mc:Ignorable="mv" mc:PreserveAttributes="mv:*" type="blank" preserve="1">
+<p:sldLayout xmlns:a="http://schemas.openxmlformats.org/drawingml/2006/main" xmlns:r="http://schemas.openxmlformats.org/officeDocument/2006/relationships" xmlns:p="http://schemas.openxmlformats.org/presentationml/2006/main" type="blank" preserve="1">
   <p:cSld name="Blank">
     <p:spTree>
       <p:nvGrpSpPr>
@@ -2065,7 +2065,7 @@
 </file>
 
 <file path=ppt/slideLayouts/slideLayout8.xml><?xml version="1.0" encoding="utf-8"?>
-<p:sldLayout xmlns:a="http://schemas.openxmlformats.org/drawingml/2006/main" xmlns:r="http://schemas.openxmlformats.org/officeDocument/2006/relationships" xmlns:mc="http://schemas.openxmlformats.org/markup-compatibility/2006" xmlns:mv="urn:schemas-microsoft-com:mac:vml" xmlns:p="http://schemas.openxmlformats.org/presentationml/2006/main" mc:Ignorable="mv" mc:PreserveAttributes="mv:*" type="objTx" preserve="1">
+<p:sldLayout xmlns:a="http://schemas.openxmlformats.org/drawingml/2006/main" xmlns:r="http://schemas.openxmlformats.org/officeDocument/2006/relationships" xmlns:p="http://schemas.openxmlformats.org/presentationml/2006/main" type="objTx" preserve="1">
   <p:cSld name="Content with Caption">
     <p:spTree>
       <p:nvGrpSpPr>
@@ -2346,7 +2346,7 @@
 </file>
 
 <file path=ppt/slideLayouts/slideLayout9.xml><?xml version="1.0" encoding="utf-8"?>
-<p:sldLayout xmlns:a="http://schemas.openxmlformats.org/drawingml/2006/main" xmlns:r="http://schemas.openxmlformats.org/officeDocument/2006/relationships" xmlns:mc="http://schemas.openxmlformats.org/markup-compatibility/2006" xmlns:mv="urn:schemas-microsoft-com:mac:vml" xmlns:p="http://schemas.openxmlformats.org/presentationml/2006/main" mc:Ignorable="mv" mc:PreserveAttributes="mv:*" type="picTx" preserve="1">
+<p:sldLayout xmlns:a="http://schemas.openxmlformats.org/drawingml/2006/main" xmlns:r="http://schemas.openxmlformats.org/officeDocument/2006/relationships" xmlns:p="http://schemas.openxmlformats.org/presentationml/2006/main" type="picTx" preserve="1">
   <p:cSld name="Picture with Caption">
     <p:spTree>
       <p:nvGrpSpPr>
@@ -2603,7 +2603,7 @@
 </file>
 
 <file path=ppt/slideMasters/slideMaster1.xml><?xml version="1.0" encoding="utf-8"?>
-<p:sldMaster xmlns:a="http://schemas.openxmlformats.org/drawingml/2006/main" xmlns:r="http://schemas.openxmlformats.org/officeDocument/2006/relationships" xmlns:mc="http://schemas.openxmlformats.org/markup-compatibility/2006" xmlns:mv="urn:schemas-microsoft-com:mac:vml" xmlns:p="http://schemas.openxmlformats.org/presentationml/2006/main" mc:Ignorable="mv" mc:PreserveAttributes="mv:*">
+<p:sldMaster xmlns:a="http://schemas.openxmlformats.org/drawingml/2006/main" xmlns:r="http://schemas.openxmlformats.org/officeDocument/2006/relationships" xmlns:p="http://schemas.openxmlformats.org/presentationml/2006/main">
   <p:cSld>
     <p:bg>
       <p:bgPr>
@@ -3309,7 +3309,7 @@
 </file>
 
 <file path=ppt/slides/slide1.xml><?xml version="1.0" encoding="utf-8"?>
-<p:sld xmlns:a="http://schemas.openxmlformats.org/drawingml/2006/main" xmlns:r="http://schemas.openxmlformats.org/officeDocument/2006/relationships" xmlns:mc="http://schemas.openxmlformats.org/markup-compatibility/2006" xmlns:mv="urn:schemas-microsoft-com:mac:vml" xmlns:p="http://schemas.openxmlformats.org/presentationml/2006/main" mc:Ignorable="mv" mc:PreserveAttributes="mv:*">
+<p:sld xmlns:a="http://schemas.openxmlformats.org/drawingml/2006/main" xmlns:r="http://schemas.openxmlformats.org/officeDocument/2006/relationships" xmlns:p="http://schemas.openxmlformats.org/presentationml/2006/main">
   <p:cSld>
     <p:spTree>
       <p:nvGrpSpPr>
@@ -3446,7 +3446,7 @@
 </file>
 
 <file path=ppt/slides/slide10.xml><?xml version="1.0" encoding="utf-8"?>
-<p:sld xmlns:a="http://schemas.openxmlformats.org/drawingml/2006/main" xmlns:r="http://schemas.openxmlformats.org/officeDocument/2006/relationships" xmlns:mc="http://schemas.openxmlformats.org/markup-compatibility/2006" xmlns:mv="urn:schemas-microsoft-com:mac:vml" xmlns:p="http://schemas.openxmlformats.org/presentationml/2006/main" mc:Ignorable="mv" mc:PreserveAttributes="mv:*">
+<p:sld xmlns:a="http://schemas.openxmlformats.org/drawingml/2006/main" xmlns:r="http://schemas.openxmlformats.org/officeDocument/2006/relationships" xmlns:p="http://schemas.openxmlformats.org/presentationml/2006/main">
   <p:cSld>
     <p:spTree>
       <p:nvGrpSpPr>
@@ -3994,7 +3994,7 @@
 </file>
 
 <file path=ppt/slides/slide11.xml><?xml version="1.0" encoding="utf-8"?>
-<p:sld xmlns:a="http://schemas.openxmlformats.org/drawingml/2006/main" xmlns:r="http://schemas.openxmlformats.org/officeDocument/2006/relationships" xmlns:mc="http://schemas.openxmlformats.org/markup-compatibility/2006" xmlns:mv="urn:schemas-microsoft-com:mac:vml" xmlns:p="http://schemas.openxmlformats.org/presentationml/2006/main" mc:Ignorable="mv" mc:PreserveAttributes="mv:*">
+<p:sld xmlns:a="http://schemas.openxmlformats.org/drawingml/2006/main" xmlns:r="http://schemas.openxmlformats.org/officeDocument/2006/relationships" xmlns:p="http://schemas.openxmlformats.org/presentationml/2006/main">
   <p:cSld>
     <p:spTree>
       <p:nvGrpSpPr>
@@ -4080,7 +4080,7 @@
 </file>
 
 <file path=ppt/slides/slide12.xml><?xml version="1.0" encoding="utf-8"?>
-<p:sld xmlns:a="http://schemas.openxmlformats.org/drawingml/2006/main" xmlns:r="http://schemas.openxmlformats.org/officeDocument/2006/relationships" xmlns:mc="http://schemas.openxmlformats.org/markup-compatibility/2006" xmlns:mv="urn:schemas-microsoft-com:mac:vml" xmlns:p="http://schemas.openxmlformats.org/presentationml/2006/main" mc:Ignorable="mv" mc:PreserveAttributes="mv:*">
+<p:sld xmlns:a="http://schemas.openxmlformats.org/drawingml/2006/main" xmlns:r="http://schemas.openxmlformats.org/officeDocument/2006/relationships" xmlns:p="http://schemas.openxmlformats.org/presentationml/2006/main">
   <p:cSld>
     <p:spTree>
       <p:nvGrpSpPr>
@@ -4136,15 +4136,7 @@
           <a:p>
             <a:r>
               <a:rPr lang="en-US" dirty="0" smtClean="0"/>
-              <a:t>Over 20 different communities involved </a:t>
-            </a:r>
-            <a:r>
-              <a:rPr lang="en-US" dirty="0" smtClean="0"/>
-              <a:t>in OBI </a:t>
-            </a:r>
-            <a:r>
-              <a:rPr lang="en-US" dirty="0" smtClean="0"/>
-              <a:t>development</a:t>
+              <a:t>Over 20 different communities involved in OBI development</a:t>
             </a:r>
           </a:p>
           <a:p>
@@ -4156,11 +4148,7 @@
           <a:p>
             <a:r>
               <a:rPr lang="en-US" dirty="0" smtClean="0"/>
-              <a:t>Each community may have its own community preferred </a:t>
-            </a:r>
-            <a:r>
-              <a:rPr lang="en-US" dirty="0" smtClean="0"/>
-              <a:t>labels</a:t>
+              <a:t>Each community may have its own community preferred labels</a:t>
             </a:r>
           </a:p>
           <a:p>
@@ -4177,7 +4165,7 @@
 </file>
 
 <file path=ppt/slides/slide13.xml><?xml version="1.0" encoding="utf-8"?>
-<p:sld xmlns:a="http://schemas.openxmlformats.org/drawingml/2006/main" xmlns:r="http://schemas.openxmlformats.org/officeDocument/2006/relationships" xmlns:mc="http://schemas.openxmlformats.org/markup-compatibility/2006" xmlns:mv="urn:schemas-microsoft-com:mac:vml" xmlns:p="http://schemas.openxmlformats.org/presentationml/2006/main" mc:Ignorable="mv" mc:PreserveAttributes="mv:*">
+<p:sld xmlns:a="http://schemas.openxmlformats.org/drawingml/2006/main" xmlns:r="http://schemas.openxmlformats.org/officeDocument/2006/relationships" xmlns:p="http://schemas.openxmlformats.org/presentationml/2006/main">
   <p:cSld>
     <p:spTree>
       <p:nvGrpSpPr>
@@ -4233,11 +4221,7 @@
           <a:p>
             <a:r>
               <a:rPr lang="en-US" dirty="0" smtClean="0"/>
-              <a:t>A</a:t>
-            </a:r>
-            <a:r>
-              <a:rPr lang="en-US" dirty="0" smtClean="0"/>
-              <a:t>nnotation property approach </a:t>
+              <a:t>Annotation property approach </a:t>
             </a:r>
             <a:endParaRPr lang="en-US" dirty="0"/>
           </a:p>
@@ -4249,23 +4233,7 @@
             </a:r>
             <a:r>
               <a:rPr lang="en-US" dirty="0" smtClean="0"/>
-              <a:t>ag the terms</a:t>
-            </a:r>
-            <a:r>
-              <a:rPr lang="en-US" dirty="0" smtClean="0"/>
-              <a:t> </a:t>
-            </a:r>
-            <a:r>
-              <a:rPr lang="en-US" dirty="0" smtClean="0"/>
-              <a:t>for</a:t>
-            </a:r>
-            <a:r>
-              <a:rPr lang="en-US" dirty="0" smtClean="0"/>
-              <a:t> </a:t>
-            </a:r>
-            <a:r>
-              <a:rPr lang="en-US" dirty="0" smtClean="0"/>
-              <a:t>which </a:t>
+              <a:t>ag the termsforwhich </a:t>
             </a:r>
             <a:r>
               <a:rPr lang="en-US" dirty="0"/>
@@ -4286,20 +4254,11 @@
               <a:rPr lang="en-US" dirty="0" smtClean="0"/>
               <a:t>rovide community-preferred labels</a:t>
             </a:r>
-            <a:endParaRPr lang="en-US" dirty="0" smtClean="0"/>
           </a:p>
           <a:p>
             <a:r>
               <a:rPr lang="en-US" dirty="0" smtClean="0"/>
-              <a:t>Example usage of a</a:t>
-            </a:r>
-            <a:r>
-              <a:rPr lang="en-US" dirty="0" smtClean="0"/>
-              <a:t>nnotation </a:t>
-            </a:r>
-            <a:r>
-              <a:rPr lang="en-US" dirty="0" smtClean="0"/>
-              <a:t>property ‘alternative term’</a:t>
+              <a:t>Example usage of annotation property ‘alternative term’</a:t>
             </a:r>
           </a:p>
           <a:p>
@@ -4333,7 +4292,7 @@
 </file>
 
 <file path=ppt/slides/slide14.xml><?xml version="1.0" encoding="utf-8"?>
-<p:sld xmlns:a="http://schemas.openxmlformats.org/drawingml/2006/main" xmlns:r="http://schemas.openxmlformats.org/officeDocument/2006/relationships" xmlns:mc="http://schemas.openxmlformats.org/markup-compatibility/2006" xmlns:mv="urn:schemas-microsoft-com:mac:vml" xmlns:p="http://schemas.openxmlformats.org/presentationml/2006/main" mc:Ignorable="mv" mc:PreserveAttributes="mv:*">
+<p:sld xmlns:a="http://schemas.openxmlformats.org/drawingml/2006/main" xmlns:r="http://schemas.openxmlformats.org/officeDocument/2006/relationships" xmlns:p="http://schemas.openxmlformats.org/presentationml/2006/main">
   <p:cSld>
     <p:spTree>
       <p:nvGrpSpPr>
@@ -4394,57 +4353,27 @@
           <a:p>
             <a:r>
               <a:rPr lang="en-US" dirty="0" smtClean="0"/>
-              <a:t>Tag </a:t>
-            </a:r>
+              <a:t>Tag terms using community-specific annotation property</a:t>
+            </a:r>
+          </a:p>
+          <a:p>
+            <a:pPr lvl="1"/>
+            <a:r>
+              <a:rPr lang="en-US" sz="2400" dirty="0" smtClean="0"/>
+              <a:t>Option 1: Add annotation property in the terms in obi.owl directly</a:t>
+            </a:r>
+          </a:p>
+          <a:p>
+            <a:pPr lvl="1"/>
+            <a:r>
+              <a:rPr lang="en-US" sz="2400" dirty="0" smtClean="0"/>
+              <a:t>Option 2: Mark the terms in a spread sheet</a:t>
+            </a:r>
+          </a:p>
+          <a:p>
             <a:r>
               <a:rPr lang="en-US" dirty="0" smtClean="0"/>
-              <a:t>terms using community-specific annotation property</a:t>
-            </a:r>
-            <a:endParaRPr lang="en-US" dirty="0" smtClean="0"/>
-          </a:p>
-          <a:p>
-            <a:pPr lvl="1"/>
-            <a:r>
-              <a:rPr lang="en-US" sz="2400" dirty="0" smtClean="0"/>
-              <a:t>Option 1: Add </a:t>
-            </a:r>
-            <a:r>
-              <a:rPr lang="en-US" sz="2400" dirty="0" smtClean="0"/>
-              <a:t>annotation property in the terms in obi.owl directly</a:t>
-            </a:r>
-            <a:endParaRPr lang="en-US" sz="2400" dirty="0" smtClean="0"/>
-          </a:p>
-          <a:p>
-            <a:pPr lvl="1"/>
-            <a:r>
-              <a:rPr lang="en-US" sz="2400" dirty="0" smtClean="0"/>
-              <a:t>Option 2: Mark </a:t>
-            </a:r>
-            <a:r>
-              <a:rPr lang="en-US" sz="2400" dirty="0" smtClean="0"/>
-              <a:t>the terms in a spread sheet</a:t>
-            </a:r>
-          </a:p>
-          <a:p>
-            <a:r>
-              <a:rPr lang="en-US" dirty="0" smtClean="0"/>
-              <a:t>Extract the</a:t>
-            </a:r>
-            <a:r>
-              <a:rPr lang="en-US" dirty="0" smtClean="0"/>
-              <a:t> tagged subset </a:t>
-            </a:r>
-            <a:r>
-              <a:rPr lang="en-US" dirty="0" smtClean="0"/>
-              <a:t>of obi.owl including all related terms and axioms based on</a:t>
-            </a:r>
-            <a:r>
-              <a:rPr lang="en-US" dirty="0" smtClean="0"/>
-              <a:t> community-specific </a:t>
-            </a:r>
-            <a:r>
-              <a:rPr lang="en-US" dirty="0" smtClean="0"/>
-              <a:t>annotation property</a:t>
+              <a:t>Extract the tagged subset of obi.owl including all related terms and axioms based on community-specific annotation property</a:t>
             </a:r>
           </a:p>
           <a:p>
@@ -4462,25 +4391,8 @@
             </a:r>
             <a:r>
               <a:rPr lang="en-US" dirty="0" smtClean="0"/>
-              <a:t>-based community view </a:t>
-            </a:r>
-            <a:r>
-              <a:rPr lang="en-US" dirty="0" smtClean="0"/>
-              <a:t>generator</a:t>
-            </a:r>
-            <a:r>
-              <a:rPr lang="en-US" dirty="0" smtClean="0"/>
-              <a:t> (under</a:t>
-            </a:r>
-            <a:r>
-              <a:rPr lang="en-US" dirty="0" smtClean="0"/>
-              <a:t> development)</a:t>
-            </a:r>
-            <a:r>
-              <a:rPr lang="en-US" dirty="0" smtClean="0"/>
-              <a:t> </a:t>
-            </a:r>
-            <a:endParaRPr lang="en-US" dirty="0" smtClean="0"/>
+              <a:t>-based community view generator (under development)</a:t>
+            </a:r>
           </a:p>
           <a:p>
             <a:pPr lvl="1"/>
@@ -4512,7 +4424,7 @@
 </file>
 
 <file path=ppt/slides/slide15.xml><?xml version="1.0" encoding="utf-8"?>
-<p:sld xmlns:a="http://schemas.openxmlformats.org/drawingml/2006/main" xmlns:r="http://schemas.openxmlformats.org/officeDocument/2006/relationships" xmlns:mc="http://schemas.openxmlformats.org/markup-compatibility/2006" xmlns:mv="urn:schemas-microsoft-com:mac:vml" xmlns:p="http://schemas.openxmlformats.org/presentationml/2006/main" mc:Ignorable="mv" mc:PreserveAttributes="mv:*">
+<p:sld xmlns:a="http://schemas.openxmlformats.org/drawingml/2006/main" xmlns:r="http://schemas.openxmlformats.org/officeDocument/2006/relationships" xmlns:p="http://schemas.openxmlformats.org/presentationml/2006/main">
   <p:cSld>
     <p:spTree>
       <p:nvGrpSpPr>
@@ -4822,8 +4734,8 @@
         </p:nvSpPr>
         <p:spPr>
           <a:xfrm>
-            <a:off x="6773467" y="3029629"/>
-            <a:ext cx="2141933" cy="830997"/>
+            <a:off x="6773467" y="3084862"/>
+            <a:ext cx="2145139" cy="707886"/>
           </a:xfrm>
           <a:prstGeom prst="rect">
             <a:avLst/>
@@ -4837,20 +4749,21 @@
           <a:lstStyle/>
           <a:p>
             <a:r>
-              <a:rPr lang="en-US" dirty="0" smtClean="0"/>
-              <a:t>Here will show</a:t>
-            </a:r>
-          </a:p>
-          <a:p>
-            <a:r>
-              <a:rPr lang="en-US" dirty="0"/>
-              <a:t>t</a:t>
-            </a:r>
-            <a:r>
-              <a:rPr lang="en-US" dirty="0" smtClean="0"/>
-              <a:t>he result</a:t>
-            </a:r>
-            <a:endParaRPr lang="en-US" dirty="0"/>
+              <a:rPr lang="en-US" sz="2000" dirty="0" smtClean="0"/>
+              <a:t>OWL(RDF/XML) </a:t>
+            </a:r>
+            <a:endParaRPr lang="en-US" sz="2000" dirty="0" smtClean="0"/>
+          </a:p>
+          <a:p>
+            <a:r>
+              <a:rPr lang="en-US" sz="2000" dirty="0" smtClean="0"/>
+              <a:t>output </a:t>
+            </a:r>
+            <a:r>
+              <a:rPr lang="en-US" sz="2000" dirty="0" smtClean="0"/>
+              <a:t>file</a:t>
+            </a:r>
+            <a:endParaRPr lang="en-US" sz="2000" dirty="0"/>
           </a:p>
         </p:txBody>
       </p:sp>
@@ -4904,9 +4817,9 @@
           <p:nvPr/>
         </p:nvCxnSpPr>
         <p:spPr>
-          <a:xfrm>
-            <a:off x="5785178" y="3442901"/>
-            <a:ext cx="988289" cy="2227"/>
+          <a:xfrm flipV="1">
+            <a:off x="5785178" y="3438805"/>
+            <a:ext cx="988289" cy="4096"/>
           </a:xfrm>
           <a:prstGeom prst="straightConnector1">
             <a:avLst/>
@@ -5092,7 +5005,7 @@
         <p:spPr>
           <a:xfrm>
             <a:off x="5105400" y="2678668"/>
-            <a:ext cx="774145" cy="369332"/>
+            <a:ext cx="1661737" cy="369332"/>
           </a:xfrm>
           <a:prstGeom prst="rect">
             <a:avLst/>
@@ -5107,7 +5020,7 @@
           <a:p>
             <a:r>
               <a:rPr lang="en-US" sz="1800" dirty="0" smtClean="0"/>
-              <a:t>access</a:t>
+              <a:t>SPARQL quires</a:t>
             </a:r>
             <a:endParaRPr lang="en-US" sz="1800" dirty="0"/>
           </a:p>
@@ -5159,7 +5072,7 @@
 </file>
 
 <file path=ppt/slides/slide16.xml><?xml version="1.0" encoding="utf-8"?>
-<p:sld xmlns:a="http://schemas.openxmlformats.org/drawingml/2006/main" xmlns:r="http://schemas.openxmlformats.org/officeDocument/2006/relationships" xmlns:mc="http://schemas.openxmlformats.org/markup-compatibility/2006" xmlns:mv="urn:schemas-microsoft-com:mac:vml" xmlns:p="http://schemas.openxmlformats.org/presentationml/2006/main" mc:Ignorable="mv" mc:PreserveAttributes="mv:*">
+<p:sld xmlns:a="http://schemas.openxmlformats.org/drawingml/2006/main" xmlns:r="http://schemas.openxmlformats.org/officeDocument/2006/relationships" xmlns:p="http://schemas.openxmlformats.org/presentationml/2006/main">
   <p:cSld>
     <p:spTree>
       <p:nvGrpSpPr>
@@ -5420,8 +5333,8 @@
         </p:nvSpPr>
         <p:spPr>
           <a:xfrm>
-            <a:off x="6773467" y="3209026"/>
-            <a:ext cx="2141933" cy="830997"/>
+            <a:off x="6773467" y="3271766"/>
+            <a:ext cx="2081019" cy="707886"/>
           </a:xfrm>
           <a:prstGeom prst="rect">
             <a:avLst/>
@@ -5435,20 +5348,24 @@
           <a:lstStyle/>
           <a:p>
             <a:r>
-              <a:rPr lang="en-US" dirty="0" smtClean="0"/>
-              <a:t>Here will show</a:t>
-            </a:r>
-          </a:p>
-          <a:p>
-            <a:r>
-              <a:rPr lang="en-US" dirty="0"/>
-              <a:t>t</a:t>
-            </a:r>
-            <a:r>
-              <a:rPr lang="en-US" dirty="0" smtClean="0"/>
-              <a:t>he result</a:t>
-            </a:r>
-            <a:endParaRPr lang="en-US" dirty="0"/>
+              <a:rPr lang="en-US" sz="2000" dirty="0" smtClean="0"/>
+              <a:t>OWL(RDF/XML</a:t>
+            </a:r>
+            <a:r>
+              <a:rPr lang="en-US" sz="2000" dirty="0" smtClean="0"/>
+              <a:t>)</a:t>
+            </a:r>
+          </a:p>
+          <a:p>
+            <a:r>
+              <a:rPr lang="en-US" sz="2000" dirty="0" smtClean="0"/>
+              <a:t>output </a:t>
+            </a:r>
+            <a:r>
+              <a:rPr lang="en-US" sz="2000" dirty="0" smtClean="0"/>
+              <a:t>file</a:t>
+            </a:r>
+            <a:endParaRPr lang="en-US" sz="2000" dirty="0"/>
           </a:p>
         </p:txBody>
       </p:sp>
@@ -5505,7 +5422,7 @@
         <p:spPr>
           <a:xfrm>
             <a:off x="5785178" y="3624047"/>
-            <a:ext cx="988289" cy="478"/>
+            <a:ext cx="988289" cy="1662"/>
           </a:xfrm>
           <a:prstGeom prst="straightConnector1">
             <a:avLst/>
@@ -5620,7 +5537,7 @@
         <p:spPr>
           <a:xfrm>
             <a:off x="5105400" y="2678668"/>
-            <a:ext cx="774145" cy="369332"/>
+            <a:ext cx="1661737" cy="369332"/>
           </a:xfrm>
           <a:prstGeom prst="rect">
             <a:avLst/>
@@ -5635,7 +5552,7 @@
           <a:p>
             <a:r>
               <a:rPr lang="en-US" sz="1800" dirty="0" smtClean="0"/>
-              <a:t>access</a:t>
+              <a:t>SPARQL quires</a:t>
             </a:r>
             <a:endParaRPr lang="en-US" sz="1800" dirty="0"/>
           </a:p>
@@ -5696,7 +5613,7 @@
 </file>
 
 <file path=ppt/slides/slide17.xml><?xml version="1.0" encoding="utf-8"?>
-<p:sld xmlns:a="http://schemas.openxmlformats.org/drawingml/2006/main" xmlns:r="http://schemas.openxmlformats.org/officeDocument/2006/relationships" xmlns:mc="http://schemas.openxmlformats.org/markup-compatibility/2006" xmlns:mv="urn:schemas-microsoft-com:mac:vml" xmlns:p="http://schemas.openxmlformats.org/presentationml/2006/main" mc:Ignorable="mv" mc:PreserveAttributes="mv:*">
+<p:sld xmlns:a="http://schemas.openxmlformats.org/drawingml/2006/main" xmlns:r="http://schemas.openxmlformats.org/officeDocument/2006/relationships" xmlns:p="http://schemas.openxmlformats.org/presentationml/2006/main">
   <p:cSld>
     <p:spTree>
       <p:nvGrpSpPr>
@@ -6131,7 +6048,7 @@
 </file>
 
 <file path=ppt/slides/slide2.xml><?xml version="1.0" encoding="utf-8"?>
-<p:sld xmlns:a="http://schemas.openxmlformats.org/drawingml/2006/main" xmlns:r="http://schemas.openxmlformats.org/officeDocument/2006/relationships" xmlns:mc="http://schemas.openxmlformats.org/markup-compatibility/2006" xmlns:mv="urn:schemas-microsoft-com:mac:vml" xmlns:p="http://schemas.openxmlformats.org/presentationml/2006/main" mc:Ignorable="mv" mc:PreserveAttributes="mv:*">
+<p:sld xmlns:a="http://schemas.openxmlformats.org/drawingml/2006/main" xmlns:r="http://schemas.openxmlformats.org/officeDocument/2006/relationships" xmlns:p="http://schemas.openxmlformats.org/presentationml/2006/main">
   <p:cSld>
     <p:spTree>
       <p:nvGrpSpPr>
@@ -6265,7 +6182,7 @@
 </file>
 
 <file path=ppt/slides/slide3.xml><?xml version="1.0" encoding="utf-8"?>
-<p:sld xmlns:a="http://schemas.openxmlformats.org/drawingml/2006/main" xmlns:r="http://schemas.openxmlformats.org/officeDocument/2006/relationships" xmlns:mc="http://schemas.openxmlformats.org/markup-compatibility/2006" xmlns:mv="urn:schemas-microsoft-com:mac:vml" xmlns:p="http://schemas.openxmlformats.org/presentationml/2006/main" mc:Ignorable="mv" mc:PreserveAttributes="mv:*">
+<p:sld xmlns:a="http://schemas.openxmlformats.org/drawingml/2006/main" xmlns:r="http://schemas.openxmlformats.org/officeDocument/2006/relationships" xmlns:p="http://schemas.openxmlformats.org/presentationml/2006/main">
   <p:cSld>
     <p:spTree>
       <p:nvGrpSpPr>
@@ -6357,23 +6274,7 @@
             </a:r>
             <a:r>
               <a:rPr lang="en-US" dirty="0" smtClean="0"/>
-              <a:t> leads to </a:t>
-            </a:r>
-            <a:r>
-              <a:rPr lang="en-US" dirty="0" smtClean="0"/>
-              <a:t>redundant</a:t>
-            </a:r>
-            <a:r>
-              <a:rPr lang="en-US" dirty="0" smtClean="0"/>
-              <a:t> effort and </a:t>
-            </a:r>
-            <a:r>
-              <a:rPr lang="en-US" dirty="0" smtClean="0"/>
-              <a:t>terms</a:t>
-            </a:r>
-            <a:r>
-              <a:rPr lang="en-US" dirty="0" smtClean="0"/>
-              <a:t>.</a:t>
+              <a:t> leads to redundant effort and terms.</a:t>
             </a:r>
           </a:p>
           <a:p>
@@ -6454,7 +6355,7 @@
 </file>
 
 <file path=ppt/slides/slide4.xml><?xml version="1.0" encoding="utf-8"?>
-<p:sld xmlns:a="http://schemas.openxmlformats.org/drawingml/2006/main" xmlns:r="http://schemas.openxmlformats.org/officeDocument/2006/relationships" xmlns:mc="http://schemas.openxmlformats.org/markup-compatibility/2006" xmlns:mv="urn:schemas-microsoft-com:mac:vml" xmlns:p="http://schemas.openxmlformats.org/presentationml/2006/main" mc:Ignorable="mv" mc:PreserveAttributes="mv:*">
+<p:sld xmlns:a="http://schemas.openxmlformats.org/drawingml/2006/main" xmlns:r="http://schemas.openxmlformats.org/officeDocument/2006/relationships" xmlns:p="http://schemas.openxmlformats.org/presentationml/2006/main">
   <p:cSld>
     <p:spTree>
       <p:nvGrpSpPr>
@@ -6504,23 +6405,7 @@
             </a:r>
             <a:r>
               <a:rPr lang="en-US" sz="4000" dirty="0" smtClean="0"/>
-              <a:t> required to </a:t>
-            </a:r>
-            <a:r>
-              <a:rPr lang="en-US" sz="4000" dirty="0" smtClean="0"/>
-              <a:t>refer to</a:t>
-            </a:r>
-            <a:r>
-              <a:rPr lang="en-US" sz="4000" dirty="0" smtClean="0"/>
-              <a:t> </a:t>
-            </a:r>
-            <a:r>
-              <a:rPr lang="en-US" sz="4000" dirty="0" smtClean="0"/>
-              <a:t>a</a:t>
-            </a:r>
-            <a:r>
-              <a:rPr lang="en-US" sz="4000" dirty="0" smtClean="0"/>
-              <a:t> </a:t>
+              <a:t> required to refer toa</a:t>
             </a:r>
             <a:r>
               <a:rPr lang="en-US" sz="4000" dirty="0"/>
@@ -6528,15 +6413,7 @@
             </a:r>
             <a:r>
               <a:rPr lang="en-US" sz="4000" dirty="0" smtClean="0"/>
-              <a:t> </a:t>
-            </a:r>
-            <a:r>
-              <a:rPr lang="en-US" sz="4000" dirty="0" smtClean="0"/>
               <a:t>an</a:t>
-            </a:r>
-            <a:r>
-              <a:rPr lang="en-US" sz="4000" dirty="0" smtClean="0"/>
-              <a:t> </a:t>
             </a:r>
             <a:r>
               <a:rPr lang="en-US" sz="4000" dirty="0"/>
@@ -6638,7 +6515,7 @@
 </file>
 
 <file path=ppt/slides/slide5.xml><?xml version="1.0" encoding="utf-8"?>
-<p:sld xmlns:a="http://schemas.openxmlformats.org/drawingml/2006/main" xmlns:r="http://schemas.openxmlformats.org/officeDocument/2006/relationships" xmlns:mc="http://schemas.openxmlformats.org/markup-compatibility/2006" xmlns:mv="urn:schemas-microsoft-com:mac:vml" xmlns:p="http://schemas.openxmlformats.org/presentationml/2006/main" mc:Ignorable="mv" mc:PreserveAttributes="mv:*">
+<p:sld xmlns:a="http://schemas.openxmlformats.org/drawingml/2006/main" xmlns:r="http://schemas.openxmlformats.org/officeDocument/2006/relationships" xmlns:p="http://schemas.openxmlformats.org/presentationml/2006/main">
   <p:cSld>
     <p:spTree>
       <p:nvGrpSpPr>
@@ -6726,7 +6603,7 @@
 </file>
 
 <file path=ppt/slides/slide6.xml><?xml version="1.0" encoding="utf-8"?>
-<p:sld xmlns:a="http://schemas.openxmlformats.org/drawingml/2006/main" xmlns:r="http://schemas.openxmlformats.org/officeDocument/2006/relationships" xmlns:mc="http://schemas.openxmlformats.org/markup-compatibility/2006" xmlns:mv="urn:schemas-microsoft-com:mac:vml" xmlns:p="http://schemas.openxmlformats.org/presentationml/2006/main" mc:Ignorable="mv" mc:PreserveAttributes="mv:*">
+<p:sld xmlns:a="http://schemas.openxmlformats.org/drawingml/2006/main" xmlns:r="http://schemas.openxmlformats.org/officeDocument/2006/relationships" xmlns:p="http://schemas.openxmlformats.org/presentationml/2006/main">
   <p:cSld>
     <p:spTree>
       <p:nvGrpSpPr>
@@ -6762,10 +6639,6 @@
               <a:t>MIREOTing</a:t>
             </a:r>
             <a:r>
-              <a:rPr lang="en-US" dirty="0" smtClean="0"/>
-              <a:t> </a:t>
-            </a:r>
-            <a:r>
               <a:rPr lang="en-US" dirty="0"/>
               <a:t>automatically</a:t>
             </a:r>
@@ -6810,11 +6683,7 @@
             <a:pPr lvl="1"/>
             <a:r>
               <a:rPr lang="en-US" dirty="0" smtClean="0"/>
-              <a:t>Web-based tool that can be easily used by all developers (compare to OBI </a:t>
-            </a:r>
-            <a:r>
-              <a:rPr lang="en-US" dirty="0" smtClean="0"/>
-              <a:t>implementation)</a:t>
+              <a:t>Web-based tool that can be easily used by all developers (compare to OBI implementation)</a:t>
             </a:r>
             <a:endParaRPr lang="en-US" dirty="0"/>
           </a:p>
@@ -6829,7 +6698,7 @@
 </file>
 
 <file path=ppt/slides/slide7.xml><?xml version="1.0" encoding="utf-8"?>
-<p:sld xmlns:a="http://schemas.openxmlformats.org/drawingml/2006/main" xmlns:r="http://schemas.openxmlformats.org/officeDocument/2006/relationships" xmlns:mc="http://schemas.openxmlformats.org/markup-compatibility/2006" xmlns:mv="urn:schemas-microsoft-com:mac:vml" xmlns:p="http://schemas.openxmlformats.org/presentationml/2006/main" mc:Ignorable="mv" mc:PreserveAttributes="mv:*">
+<p:sld xmlns:a="http://schemas.openxmlformats.org/drawingml/2006/main" xmlns:r="http://schemas.openxmlformats.org/officeDocument/2006/relationships" xmlns:p="http://schemas.openxmlformats.org/presentationml/2006/main">
   <p:cSld>
     <p:spTree>
       <p:nvGrpSpPr>
@@ -6984,7 +6853,7 @@
           <a:prstGeom prst="line">
             <a:avLst/>
           </a:prstGeom>
-          <a:ln>
+          <a:ln w="19050">
             <a:solidFill>
               <a:schemeClr val="accent2">
                 <a:lumMod val="50000"/>
@@ -7007,6 +6876,613 @@
           </a:fontRef>
         </p:style>
       </p:cxnSp>
+      <p:pic>
+        <p:nvPicPr>
+          <p:cNvPr id="1027" name="Picture 3"/>
+          <p:cNvPicPr>
+            <a:picLocks noChangeAspect="1" noChangeArrowheads="1"/>
+          </p:cNvPicPr>
+          <p:nvPr/>
+        </p:nvPicPr>
+        <p:blipFill>
+          <a:blip r:embed="rId3"/>
+          <a:srcRect/>
+          <a:stretch>
+            <a:fillRect/>
+          </a:stretch>
+        </p:blipFill>
+        <p:spPr bwMode="auto">
+          <a:xfrm>
+            <a:off x="76200" y="1295400"/>
+            <a:ext cx="4176992" cy="1600200"/>
+          </a:xfrm>
+          <a:prstGeom prst="rect">
+            <a:avLst/>
+          </a:prstGeom>
+          <a:noFill/>
+          <a:ln w="9525">
+            <a:noFill/>
+            <a:miter lim="800000"/>
+            <a:headEnd/>
+            <a:tailEnd/>
+          </a:ln>
+          <a:effectLst/>
+        </p:spPr>
+      </p:pic>
+      <p:cxnSp>
+        <p:nvCxnSpPr>
+          <p:cNvPr id="10" name="Straight Connector 9"/>
+          <p:cNvCxnSpPr/>
+          <p:nvPr/>
+        </p:nvCxnSpPr>
+        <p:spPr>
+          <a:xfrm>
+            <a:off x="296174" y="2608052"/>
+            <a:ext cx="3581400" cy="1588"/>
+          </a:xfrm>
+          <a:prstGeom prst="line">
+            <a:avLst/>
+          </a:prstGeom>
+          <a:ln>
+            <a:solidFill>
+              <a:srgbClr val="C00000"/>
+            </a:solidFill>
+          </a:ln>
+        </p:spPr>
+        <p:style>
+          <a:lnRef idx="1">
+            <a:schemeClr val="accent1"/>
+          </a:lnRef>
+          <a:fillRef idx="0">
+            <a:schemeClr val="accent1"/>
+          </a:fillRef>
+          <a:effectRef idx="0">
+            <a:schemeClr val="accent1"/>
+          </a:effectRef>
+          <a:fontRef idx="minor">
+            <a:schemeClr val="tx1"/>
+          </a:fontRef>
+        </p:style>
+      </p:cxnSp>
+      <p:cxnSp>
+        <p:nvCxnSpPr>
+          <p:cNvPr id="11" name="Straight Connector 10"/>
+          <p:cNvCxnSpPr/>
+          <p:nvPr/>
+        </p:nvCxnSpPr>
+        <p:spPr>
+          <a:xfrm>
+            <a:off x="288982" y="2717322"/>
+            <a:ext cx="3886200" cy="1588"/>
+          </a:xfrm>
+          <a:prstGeom prst="line">
+            <a:avLst/>
+          </a:prstGeom>
+          <a:ln>
+            <a:solidFill>
+              <a:srgbClr val="C00000"/>
+            </a:solidFill>
+          </a:ln>
+        </p:spPr>
+        <p:style>
+          <a:lnRef idx="1">
+            <a:schemeClr val="accent1"/>
+          </a:lnRef>
+          <a:fillRef idx="0">
+            <a:schemeClr val="accent1"/>
+          </a:fillRef>
+          <a:effectRef idx="0">
+            <a:schemeClr val="accent1"/>
+          </a:effectRef>
+          <a:fontRef idx="minor">
+            <a:schemeClr val="tx1"/>
+          </a:fontRef>
+        </p:style>
+      </p:cxnSp>
+      <p:pic>
+        <p:nvPicPr>
+          <p:cNvPr id="1031" name="Picture 7"/>
+          <p:cNvPicPr>
+            <a:picLocks noChangeAspect="1" noChangeArrowheads="1"/>
+          </p:cNvPicPr>
+          <p:nvPr/>
+        </p:nvPicPr>
+        <p:blipFill>
+          <a:blip r:embed="rId4"/>
+          <a:srcRect/>
+          <a:stretch>
+            <a:fillRect/>
+          </a:stretch>
+        </p:blipFill>
+        <p:spPr bwMode="auto">
+          <a:xfrm>
+            <a:off x="33070" y="4114800"/>
+            <a:ext cx="3429000" cy="1096638"/>
+          </a:xfrm>
+          <a:prstGeom prst="rect">
+            <a:avLst/>
+          </a:prstGeom>
+          <a:noFill/>
+          <a:ln w="9525">
+            <a:noFill/>
+            <a:miter lim="800000"/>
+            <a:headEnd/>
+            <a:tailEnd/>
+          </a:ln>
+          <a:effectLst/>
+        </p:spPr>
+      </p:pic>
+      <p:grpSp>
+        <p:nvGrpSpPr>
+          <p:cNvPr id="28" name="Group 27"/>
+          <p:cNvGrpSpPr/>
+          <p:nvPr/>
+        </p:nvGrpSpPr>
+        <p:grpSpPr>
+          <a:xfrm>
+            <a:off x="2021358" y="3505200"/>
+            <a:ext cx="2245842" cy="1572399"/>
+            <a:chOff x="2021358" y="3505200"/>
+            <a:chExt cx="2245842" cy="1572399"/>
+          </a:xfrm>
+        </p:grpSpPr>
+        <p:sp>
+          <p:nvSpPr>
+            <p:cNvPr id="18" name="TextBox 17"/>
+            <p:cNvSpPr txBox="1"/>
+            <p:nvPr/>
+          </p:nvSpPr>
+          <p:spPr>
+            <a:xfrm>
+              <a:off x="2021358" y="3505200"/>
+              <a:ext cx="1560042" cy="276999"/>
+            </a:xfrm>
+            <a:prstGeom prst="rect">
+              <a:avLst/>
+            </a:prstGeom>
+          </p:spPr>
+          <p:style>
+            <a:lnRef idx="1">
+              <a:schemeClr val="dk1"/>
+            </a:lnRef>
+            <a:fillRef idx="2">
+              <a:schemeClr val="dk1"/>
+            </a:fillRef>
+            <a:effectRef idx="1">
+              <a:schemeClr val="dk1"/>
+            </a:effectRef>
+            <a:fontRef idx="minor">
+              <a:schemeClr val="dk1"/>
+            </a:fontRef>
+          </p:style>
+          <p:txBody>
+            <a:bodyPr wrap="none" rtlCol="0">
+              <a:spAutoFit/>
+            </a:bodyPr>
+            <a:lstStyle/>
+            <a:p>
+              <a:r>
+                <a:rPr lang="en-US" sz="1200" dirty="0" smtClean="0">
+                  <a:latin typeface="Arial" pitchFamily="34" charset="0"/>
+                  <a:cs typeface="Arial" pitchFamily="34" charset="0"/>
+                </a:rPr>
+                <a:t>URI of </a:t>
+              </a:r>
+              <a:r>
+                <a:rPr lang="en-US" sz="1200" dirty="0" smtClean="0">
+                  <a:latin typeface="Arial" pitchFamily="34" charset="0"/>
+                  <a:cs typeface="Arial" pitchFamily="34" charset="0"/>
+                </a:rPr>
+                <a:t>e</a:t>
+              </a:r>
+              <a:r>
+                <a:rPr lang="en-US" sz="1200" dirty="0" smtClean="0">
+                  <a:latin typeface="Arial" pitchFamily="34" charset="0"/>
+                  <a:cs typeface="Arial" pitchFamily="34" charset="0"/>
+                </a:rPr>
+                <a:t>xternal term</a:t>
+              </a:r>
+              <a:endParaRPr lang="en-US" sz="1200" dirty="0">
+                <a:latin typeface="Arial" pitchFamily="34" charset="0"/>
+                <a:cs typeface="Arial" pitchFamily="34" charset="0"/>
+              </a:endParaRPr>
+            </a:p>
+          </p:txBody>
+        </p:sp>
+        <p:sp>
+          <p:nvSpPr>
+            <p:cNvPr id="19" name="TextBox 18"/>
+            <p:cNvSpPr txBox="1"/>
+            <p:nvPr/>
+          </p:nvSpPr>
+          <p:spPr>
+            <a:xfrm>
+              <a:off x="3067833" y="3844504"/>
+              <a:ext cx="1199367" cy="461665"/>
+            </a:xfrm>
+            <a:prstGeom prst="rect">
+              <a:avLst/>
+            </a:prstGeom>
+          </p:spPr>
+          <p:style>
+            <a:lnRef idx="1">
+              <a:schemeClr val="dk1"/>
+            </a:lnRef>
+            <a:fillRef idx="2">
+              <a:schemeClr val="dk1"/>
+            </a:fillRef>
+            <a:effectRef idx="1">
+              <a:schemeClr val="dk1"/>
+            </a:effectRef>
+            <a:fontRef idx="minor">
+              <a:schemeClr val="dk1"/>
+            </a:fontRef>
+          </p:style>
+          <p:txBody>
+            <a:bodyPr wrap="none" rtlCol="0">
+              <a:spAutoFit/>
+            </a:bodyPr>
+            <a:lstStyle/>
+            <a:p>
+              <a:r>
+                <a:rPr lang="en-US" sz="1200" dirty="0" smtClean="0">
+                  <a:latin typeface="Arial" pitchFamily="34" charset="0"/>
+                  <a:cs typeface="Arial" pitchFamily="34" charset="0"/>
+                </a:rPr>
+                <a:t>Position in the </a:t>
+              </a:r>
+            </a:p>
+            <a:p>
+              <a:r>
+                <a:rPr lang="en-US" sz="1200" dirty="0" smtClean="0">
+                  <a:latin typeface="Arial" pitchFamily="34" charset="0"/>
+                  <a:cs typeface="Arial" pitchFamily="34" charset="0"/>
+                </a:rPr>
+                <a:t>target ontology</a:t>
+              </a:r>
+              <a:endParaRPr lang="en-US" sz="1200" dirty="0">
+                <a:latin typeface="Arial" pitchFamily="34" charset="0"/>
+                <a:cs typeface="Arial" pitchFamily="34" charset="0"/>
+              </a:endParaRPr>
+            </a:p>
+          </p:txBody>
+        </p:sp>
+        <p:sp>
+          <p:nvSpPr>
+            <p:cNvPr id="20" name="TextBox 19"/>
+            <p:cNvSpPr txBox="1"/>
+            <p:nvPr/>
+          </p:nvSpPr>
+          <p:spPr>
+            <a:xfrm>
+              <a:off x="2133600" y="4800600"/>
+              <a:ext cx="2002471" cy="276999"/>
+            </a:xfrm>
+            <a:prstGeom prst="rect">
+              <a:avLst/>
+            </a:prstGeom>
+          </p:spPr>
+          <p:style>
+            <a:lnRef idx="1">
+              <a:schemeClr val="dk1"/>
+            </a:lnRef>
+            <a:fillRef idx="2">
+              <a:schemeClr val="dk1"/>
+            </a:fillRef>
+            <a:effectRef idx="1">
+              <a:schemeClr val="dk1"/>
+            </a:effectRef>
+            <a:fontRef idx="minor">
+              <a:schemeClr val="dk1"/>
+            </a:fontRef>
+          </p:style>
+          <p:txBody>
+            <a:bodyPr wrap="none" rtlCol="0">
+              <a:spAutoFit/>
+            </a:bodyPr>
+            <a:lstStyle/>
+            <a:p>
+              <a:r>
+                <a:rPr lang="en-US" sz="1200" dirty="0" smtClean="0">
+                  <a:latin typeface="Arial" pitchFamily="34" charset="0"/>
+                  <a:cs typeface="Arial" pitchFamily="34" charset="0"/>
+                </a:rPr>
+                <a:t>URI of the source ontology</a:t>
+              </a:r>
+              <a:endParaRPr lang="en-US" sz="1200" dirty="0">
+                <a:latin typeface="Arial" pitchFamily="34" charset="0"/>
+                <a:cs typeface="Arial" pitchFamily="34" charset="0"/>
+              </a:endParaRPr>
+            </a:p>
+          </p:txBody>
+        </p:sp>
+      </p:grpSp>
+      <p:grpSp>
+        <p:nvGrpSpPr>
+          <p:cNvPr id="29" name="Group 28"/>
+          <p:cNvGrpSpPr/>
+          <p:nvPr/>
+        </p:nvGrpSpPr>
+        <p:grpSpPr>
+          <a:xfrm>
+            <a:off x="2286000" y="3810000"/>
+            <a:ext cx="1381518" cy="990600"/>
+            <a:chOff x="2286000" y="3810000"/>
+            <a:chExt cx="1381518" cy="990600"/>
+          </a:xfrm>
+        </p:grpSpPr>
+        <p:cxnSp>
+          <p:nvCxnSpPr>
+            <p:cNvPr id="22" name="Straight Arrow Connector 21"/>
+            <p:cNvCxnSpPr/>
+            <p:nvPr/>
+          </p:nvCxnSpPr>
+          <p:spPr>
+            <a:xfrm rot="5400000">
+              <a:off x="2133600" y="3962400"/>
+              <a:ext cx="457200" cy="152400"/>
+            </a:xfrm>
+            <a:prstGeom prst="straightConnector1">
+              <a:avLst/>
+            </a:prstGeom>
+            <a:ln>
+              <a:solidFill>
+                <a:schemeClr val="tx1"/>
+              </a:solidFill>
+              <a:tailEnd type="arrow"/>
+            </a:ln>
+          </p:spPr>
+          <p:style>
+            <a:lnRef idx="1">
+              <a:schemeClr val="accent1"/>
+            </a:lnRef>
+            <a:fillRef idx="0">
+              <a:schemeClr val="accent1"/>
+            </a:fillRef>
+            <a:effectRef idx="0">
+              <a:schemeClr val="accent1"/>
+            </a:effectRef>
+            <a:fontRef idx="minor">
+              <a:schemeClr val="tx1"/>
+            </a:fontRef>
+          </p:style>
+        </p:cxnSp>
+        <p:cxnSp>
+          <p:nvCxnSpPr>
+            <p:cNvPr id="25" name="Straight Arrow Connector 24"/>
+            <p:cNvCxnSpPr>
+              <a:stCxn id="19" idx="2"/>
+            </p:cNvCxnSpPr>
+            <p:nvPr/>
+          </p:nvCxnSpPr>
+          <p:spPr>
+            <a:xfrm rot="5400000">
+              <a:off x="3491544" y="4243626"/>
+              <a:ext cx="113431" cy="238517"/>
+            </a:xfrm>
+            <a:prstGeom prst="straightConnector1">
+              <a:avLst/>
+            </a:prstGeom>
+            <a:ln>
+              <a:solidFill>
+                <a:schemeClr val="tx1"/>
+              </a:solidFill>
+              <a:tailEnd type="arrow"/>
+            </a:ln>
+          </p:spPr>
+          <p:style>
+            <a:lnRef idx="1">
+              <a:schemeClr val="accent1"/>
+            </a:lnRef>
+            <a:fillRef idx="0">
+              <a:schemeClr val="accent1"/>
+            </a:fillRef>
+            <a:effectRef idx="0">
+              <a:schemeClr val="accent1"/>
+            </a:effectRef>
+            <a:fontRef idx="minor">
+              <a:schemeClr val="tx1"/>
+            </a:fontRef>
+          </p:style>
+        </p:cxnSp>
+        <p:cxnSp>
+          <p:nvCxnSpPr>
+            <p:cNvPr id="27" name="Straight Arrow Connector 26"/>
+            <p:cNvCxnSpPr>
+              <a:stCxn id="20" idx="0"/>
+            </p:cNvCxnSpPr>
+            <p:nvPr/>
+          </p:nvCxnSpPr>
+          <p:spPr>
+            <a:xfrm rot="16200000" flipV="1">
+              <a:off x="2824718" y="4490482"/>
+              <a:ext cx="228600" cy="391636"/>
+            </a:xfrm>
+            <a:prstGeom prst="straightConnector1">
+              <a:avLst/>
+            </a:prstGeom>
+            <a:ln>
+              <a:solidFill>
+                <a:schemeClr val="tx1"/>
+              </a:solidFill>
+              <a:tailEnd type="arrow"/>
+            </a:ln>
+          </p:spPr>
+          <p:style>
+            <a:lnRef idx="1">
+              <a:schemeClr val="accent1"/>
+            </a:lnRef>
+            <a:fillRef idx="0">
+              <a:schemeClr val="accent1"/>
+            </a:fillRef>
+            <a:effectRef idx="0">
+              <a:schemeClr val="accent1"/>
+            </a:effectRef>
+            <a:fontRef idx="minor">
+              <a:schemeClr val="tx1"/>
+            </a:fontRef>
+          </p:style>
+        </p:cxnSp>
+      </p:grpSp>
+      <p:pic>
+        <p:nvPicPr>
+          <p:cNvPr id="1033" name="Picture 9"/>
+          <p:cNvPicPr>
+            <a:picLocks noChangeAspect="1" noChangeArrowheads="1"/>
+          </p:cNvPicPr>
+          <p:nvPr/>
+        </p:nvPicPr>
+        <p:blipFill>
+          <a:blip r:embed="rId5"/>
+          <a:srcRect/>
+          <a:stretch>
+            <a:fillRect/>
+          </a:stretch>
+        </p:blipFill>
+        <p:spPr bwMode="auto">
+          <a:xfrm>
+            <a:off x="5122652" y="4095750"/>
+            <a:ext cx="3976159" cy="1238250"/>
+          </a:xfrm>
+          <a:prstGeom prst="rect">
+            <a:avLst/>
+          </a:prstGeom>
+          <a:noFill/>
+          <a:ln w="9525">
+            <a:noFill/>
+            <a:miter lim="800000"/>
+            <a:headEnd/>
+            <a:tailEnd/>
+          </a:ln>
+          <a:effectLst/>
+        </p:spPr>
+      </p:pic>
+      <p:sp>
+        <p:nvSpPr>
+          <p:cNvPr id="33" name="Oval 32"/>
+          <p:cNvSpPr/>
+          <p:nvPr/>
+        </p:nvSpPr>
+        <p:spPr>
+          <a:xfrm>
+            <a:off x="990600" y="5410200"/>
+            <a:ext cx="304800" cy="304800"/>
+          </a:xfrm>
+          <a:prstGeom prst="ellipse">
+            <a:avLst/>
+          </a:prstGeom>
+        </p:spPr>
+        <p:style>
+          <a:lnRef idx="0">
+            <a:schemeClr val="accent2"/>
+          </a:lnRef>
+          <a:fillRef idx="3">
+            <a:schemeClr val="accent2"/>
+          </a:fillRef>
+          <a:effectRef idx="3">
+            <a:schemeClr val="accent2"/>
+          </a:effectRef>
+          <a:fontRef idx="minor">
+            <a:schemeClr val="lt1"/>
+          </a:fontRef>
+        </p:style>
+        <p:txBody>
+          <a:bodyPr rtlCol="0" anchor="ctr"/>
+          <a:lstStyle/>
+          <a:p>
+            <a:pPr algn="ctr"/>
+            <a:r>
+              <a:rPr lang="en-US" dirty="0" smtClean="0"/>
+              <a:t>1</a:t>
+            </a:r>
+            <a:endParaRPr lang="en-US" dirty="0"/>
+          </a:p>
+        </p:txBody>
+      </p:sp>
+      <p:sp>
+        <p:nvSpPr>
+          <p:cNvPr id="34" name="Oval 33"/>
+          <p:cNvSpPr/>
+          <p:nvPr/>
+        </p:nvSpPr>
+        <p:spPr>
+          <a:xfrm>
+            <a:off x="4876800" y="5410200"/>
+            <a:ext cx="304800" cy="304800"/>
+          </a:xfrm>
+          <a:prstGeom prst="ellipse">
+            <a:avLst/>
+          </a:prstGeom>
+        </p:spPr>
+        <p:style>
+          <a:lnRef idx="0">
+            <a:schemeClr val="accent2"/>
+          </a:lnRef>
+          <a:fillRef idx="3">
+            <a:schemeClr val="accent2"/>
+          </a:fillRef>
+          <a:effectRef idx="3">
+            <a:schemeClr val="accent2"/>
+          </a:effectRef>
+          <a:fontRef idx="minor">
+            <a:schemeClr val="lt1"/>
+          </a:fontRef>
+        </p:style>
+        <p:txBody>
+          <a:bodyPr rtlCol="0" anchor="ctr"/>
+          <a:lstStyle/>
+          <a:p>
+            <a:pPr algn="ctr"/>
+            <a:r>
+              <a:rPr lang="en-US" dirty="0" smtClean="0"/>
+              <a:t>2</a:t>
+            </a:r>
+            <a:endParaRPr lang="en-US" dirty="0"/>
+          </a:p>
+        </p:txBody>
+      </p:sp>
+      <p:sp>
+        <p:nvSpPr>
+          <p:cNvPr id="35" name="Oval 34"/>
+          <p:cNvSpPr/>
+          <p:nvPr/>
+        </p:nvSpPr>
+        <p:spPr>
+          <a:xfrm>
+            <a:off x="4114800" y="1447800"/>
+            <a:ext cx="304800" cy="304800"/>
+          </a:xfrm>
+          <a:prstGeom prst="ellipse">
+            <a:avLst/>
+          </a:prstGeom>
+        </p:spPr>
+        <p:style>
+          <a:lnRef idx="0">
+            <a:schemeClr val="accent2"/>
+          </a:lnRef>
+          <a:fillRef idx="3">
+            <a:schemeClr val="accent2"/>
+          </a:fillRef>
+          <a:effectRef idx="3">
+            <a:schemeClr val="accent2"/>
+          </a:effectRef>
+          <a:fontRef idx="minor">
+            <a:schemeClr val="lt1"/>
+          </a:fontRef>
+        </p:style>
+        <p:txBody>
+          <a:bodyPr rtlCol="0" anchor="ctr"/>
+          <a:lstStyle/>
+          <a:p>
+            <a:pPr algn="ctr"/>
+            <a:r>
+              <a:rPr lang="en-US" dirty="0" smtClean="0"/>
+              <a:t>3</a:t>
+            </a:r>
+            <a:endParaRPr lang="en-US" dirty="0"/>
+          </a:p>
+        </p:txBody>
+      </p:sp>
     </p:spTree>
   </p:cSld>
   <p:clrMapOvr>
@@ -7015,7 +7491,234 @@
   <p:timing>
     <p:tnLst>
       <p:par>
-        <p:cTn id="1" dur="indefinite" restart="never" nodeType="tmRoot"/>
+        <p:cTn id="1" dur="indefinite" restart="never" nodeType="tmRoot">
+          <p:childTnLst>
+            <p:seq concurrent="1" nextAc="seek">
+              <p:cTn id="2" dur="indefinite" nodeType="mainSeq">
+                <p:childTnLst>
+                  <p:par>
+                    <p:cTn id="3" fill="hold">
+                      <p:stCondLst>
+                        <p:cond delay="indefinite"/>
+                      </p:stCondLst>
+                      <p:childTnLst>
+                        <p:par>
+                          <p:cTn id="4" fill="hold">
+                            <p:stCondLst>
+                              <p:cond delay="0"/>
+                            </p:stCondLst>
+                            <p:childTnLst>
+                              <p:par>
+                                <p:cTn id="5" presetID="1" presetClass="entr" presetSubtype="0" fill="hold" nodeType="clickEffect">
+                                  <p:stCondLst>
+                                    <p:cond delay="0"/>
+                                  </p:stCondLst>
+                                  <p:childTnLst>
+                                    <p:set>
+                                      <p:cBhvr>
+                                        <p:cTn id="6" dur="1" fill="hold">
+                                          <p:stCondLst>
+                                            <p:cond delay="0"/>
+                                          </p:stCondLst>
+                                        </p:cTn>
+                                        <p:tgtEl>
+                                          <p:spTgt spid="28"/>
+                                        </p:tgtEl>
+                                        <p:attrNameLst>
+                                          <p:attrName>style.visibility</p:attrName>
+                                        </p:attrNameLst>
+                                      </p:cBhvr>
+                                      <p:to>
+                                        <p:strVal val="visible"/>
+                                      </p:to>
+                                    </p:set>
+                                  </p:childTnLst>
+                                </p:cTn>
+                              </p:par>
+                            </p:childTnLst>
+                          </p:cTn>
+                        </p:par>
+                      </p:childTnLst>
+                    </p:cTn>
+                  </p:par>
+                  <p:par>
+                    <p:cTn id="7" fill="hold">
+                      <p:stCondLst>
+                        <p:cond delay="indefinite"/>
+                      </p:stCondLst>
+                      <p:childTnLst>
+                        <p:par>
+                          <p:cTn id="8" fill="hold">
+                            <p:stCondLst>
+                              <p:cond delay="0"/>
+                            </p:stCondLst>
+                            <p:childTnLst>
+                              <p:par>
+                                <p:cTn id="9" presetID="18" presetClass="entr" presetSubtype="12" fill="hold" nodeType="clickEffect">
+                                  <p:stCondLst>
+                                    <p:cond delay="0"/>
+                                  </p:stCondLst>
+                                  <p:childTnLst>
+                                    <p:set>
+                                      <p:cBhvr>
+                                        <p:cTn id="10" dur="1" fill="hold">
+                                          <p:stCondLst>
+                                            <p:cond delay="0"/>
+                                          </p:stCondLst>
+                                        </p:cTn>
+                                        <p:tgtEl>
+                                          <p:spTgt spid="29"/>
+                                        </p:tgtEl>
+                                        <p:attrNameLst>
+                                          <p:attrName>style.visibility</p:attrName>
+                                        </p:attrNameLst>
+                                      </p:cBhvr>
+                                      <p:to>
+                                        <p:strVal val="visible"/>
+                                      </p:to>
+                                    </p:set>
+                                    <p:animEffect transition="in" filter="strips(downLeft)">
+                                      <p:cBhvr>
+                                        <p:cTn id="11" dur="500"/>
+                                        <p:tgtEl>
+                                          <p:spTgt spid="29"/>
+                                        </p:tgtEl>
+                                      </p:cBhvr>
+                                    </p:animEffect>
+                                  </p:childTnLst>
+                                </p:cTn>
+                              </p:par>
+                            </p:childTnLst>
+                          </p:cTn>
+                        </p:par>
+                      </p:childTnLst>
+                    </p:cTn>
+                  </p:par>
+                  <p:par>
+                    <p:cTn id="12" fill="hold">
+                      <p:stCondLst>
+                        <p:cond delay="indefinite"/>
+                      </p:stCondLst>
+                      <p:childTnLst>
+                        <p:par>
+                          <p:cTn id="13" fill="hold">
+                            <p:stCondLst>
+                              <p:cond delay="0"/>
+                            </p:stCondLst>
+                            <p:childTnLst>
+                              <p:par>
+                                <p:cTn id="14" presetID="22" presetClass="entr" presetSubtype="4" fill="hold" nodeType="clickEffect">
+                                  <p:stCondLst>
+                                    <p:cond delay="0"/>
+                                  </p:stCondLst>
+                                  <p:childTnLst>
+                                    <p:set>
+                                      <p:cBhvr>
+                                        <p:cTn id="15" dur="1" fill="hold">
+                                          <p:stCondLst>
+                                            <p:cond delay="0"/>
+                                          </p:stCondLst>
+                                        </p:cTn>
+                                        <p:tgtEl>
+                                          <p:spTgt spid="10"/>
+                                        </p:tgtEl>
+                                        <p:attrNameLst>
+                                          <p:attrName>style.visibility</p:attrName>
+                                        </p:attrNameLst>
+                                      </p:cBhvr>
+                                      <p:to>
+                                        <p:strVal val="visible"/>
+                                      </p:to>
+                                    </p:set>
+                                    <p:animEffect transition="in" filter="wipe(down)">
+                                      <p:cBhvr>
+                                        <p:cTn id="16" dur="500"/>
+                                        <p:tgtEl>
+                                          <p:spTgt spid="10"/>
+                                        </p:tgtEl>
+                                      </p:cBhvr>
+                                    </p:animEffect>
+                                  </p:childTnLst>
+                                </p:cTn>
+                              </p:par>
+                            </p:childTnLst>
+                          </p:cTn>
+                        </p:par>
+                      </p:childTnLst>
+                    </p:cTn>
+                  </p:par>
+                  <p:par>
+                    <p:cTn id="17" fill="hold">
+                      <p:stCondLst>
+                        <p:cond delay="indefinite"/>
+                      </p:stCondLst>
+                      <p:childTnLst>
+                        <p:par>
+                          <p:cTn id="18" fill="hold">
+                            <p:stCondLst>
+                              <p:cond delay="0"/>
+                            </p:stCondLst>
+                            <p:childTnLst>
+                              <p:par>
+                                <p:cTn id="19" presetID="22" presetClass="entr" presetSubtype="4" fill="hold" nodeType="clickEffect">
+                                  <p:stCondLst>
+                                    <p:cond delay="0"/>
+                                  </p:stCondLst>
+                                  <p:childTnLst>
+                                    <p:set>
+                                      <p:cBhvr>
+                                        <p:cTn id="20" dur="1" fill="hold">
+                                          <p:stCondLst>
+                                            <p:cond delay="0"/>
+                                          </p:stCondLst>
+                                        </p:cTn>
+                                        <p:tgtEl>
+                                          <p:spTgt spid="11"/>
+                                        </p:tgtEl>
+                                        <p:attrNameLst>
+                                          <p:attrName>style.visibility</p:attrName>
+                                        </p:attrNameLst>
+                                      </p:cBhvr>
+                                      <p:to>
+                                        <p:strVal val="visible"/>
+                                      </p:to>
+                                    </p:set>
+                                    <p:animEffect transition="in" filter="wipe(down)">
+                                      <p:cBhvr>
+                                        <p:cTn id="21" dur="500"/>
+                                        <p:tgtEl>
+                                          <p:spTgt spid="11"/>
+                                        </p:tgtEl>
+                                      </p:cBhvr>
+                                    </p:animEffect>
+                                  </p:childTnLst>
+                                </p:cTn>
+                              </p:par>
+                            </p:childTnLst>
+                          </p:cTn>
+                        </p:par>
+                      </p:childTnLst>
+                    </p:cTn>
+                  </p:par>
+                </p:childTnLst>
+              </p:cTn>
+              <p:prevCondLst>
+                <p:cond evt="onPrev" delay="0">
+                  <p:tgtEl>
+                    <p:sldTgt/>
+                  </p:tgtEl>
+                </p:cond>
+              </p:prevCondLst>
+              <p:nextCondLst>
+                <p:cond evt="onNext" delay="0">
+                  <p:tgtEl>
+                    <p:sldTgt/>
+                  </p:tgtEl>
+                </p:cond>
+              </p:nextCondLst>
+            </p:seq>
+          </p:childTnLst>
+        </p:cTn>
       </p:par>
     </p:tnLst>
   </p:timing>
@@ -7023,7 +7726,7 @@
 </file>
 
 <file path=ppt/slides/slide8.xml><?xml version="1.0" encoding="utf-8"?>
-<p:sld xmlns:a="http://schemas.openxmlformats.org/drawingml/2006/main" xmlns:r="http://schemas.openxmlformats.org/officeDocument/2006/relationships" xmlns:mc="http://schemas.openxmlformats.org/markup-compatibility/2006" xmlns:mv="urn:schemas-microsoft-com:mac:vml" xmlns:p="http://schemas.openxmlformats.org/presentationml/2006/main" mc:Ignorable="mv" mc:PreserveAttributes="mv:*">
+<p:sld xmlns:a="http://schemas.openxmlformats.org/drawingml/2006/main" xmlns:r="http://schemas.openxmlformats.org/officeDocument/2006/relationships" xmlns:p="http://schemas.openxmlformats.org/presentationml/2006/main">
   <p:cSld>
     <p:spTree>
       <p:nvGrpSpPr>
@@ -7201,7 +7904,7 @@
 </file>
 
 <file path=ppt/slides/slide9.xml><?xml version="1.0" encoding="utf-8"?>
-<p:sld xmlns:a="http://schemas.openxmlformats.org/drawingml/2006/main" xmlns:r="http://schemas.openxmlformats.org/officeDocument/2006/relationships" xmlns:mc="http://schemas.openxmlformats.org/markup-compatibility/2006" xmlns:mv="urn:schemas-microsoft-com:mac:vml" xmlns:p="http://schemas.openxmlformats.org/presentationml/2006/main" mc:Ignorable="mv" mc:PreserveAttributes="mv:*">
+<p:sld xmlns:a="http://schemas.openxmlformats.org/drawingml/2006/main" xmlns:r="http://schemas.openxmlformats.org/officeDocument/2006/relationships" xmlns:p="http://schemas.openxmlformats.org/presentationml/2006/main">
   <p:cSld>
     <p:spTree>
       <p:nvGrpSpPr>
@@ -7431,7 +8134,7 @@
           <a:blip r:embed="rId3" cstate="print">
             <a:extLst>
               <a:ext uri="{28A0092B-C50C-407E-A947-70E740481C1C}">
-                <a14:useLocalDpi xmlns:mc="http://schemas.openxmlformats.org/markup-compatibility/2006" xmlns:mv="urn:schemas-microsoft-com:mac:vml" xmlns:a14="http://schemas.microsoft.com/office/drawing/2010/main" xmlns="" xmlns:p="http://schemas.openxmlformats.org/presentationml/2006/main" xmlns:r="http://schemas.openxmlformats.org/officeDocument/2006/relationships" xmlns:a="http://schemas.openxmlformats.org/drawingml/2006/main" val="0"/>
+                <a14:useLocalDpi xmlns="" xmlns:a14="http://schemas.microsoft.com/office/drawing/2010/main" xmlns:mv="urn:schemas-microsoft-com:mac:vml" xmlns:mc="http://schemas.openxmlformats.org/markup-compatibility/2006" val="0"/>
               </a:ext>
             </a:extLst>
           </a:blip>
@@ -7458,14 +8161,14 @@
           <a:effectLst/>
           <a:extLst>
             <a:ext uri="{909E8E84-426E-40DD-AFC4-6F175D3DCCD1}">
-              <a14:hiddenFill xmlns:mc="http://schemas.openxmlformats.org/markup-compatibility/2006" xmlns:mv="urn:schemas-microsoft-com:mac:vml" xmlns:a14="http://schemas.microsoft.com/office/drawing/2010/main" xmlns="" xmlns:p="http://schemas.openxmlformats.org/presentationml/2006/main" xmlns:r="http://schemas.openxmlformats.org/officeDocument/2006/relationships" xmlns:a="http://schemas.openxmlformats.org/drawingml/2006/main">
+              <a14:hiddenFill xmlns="" xmlns:a14="http://schemas.microsoft.com/office/drawing/2010/main" xmlns:mv="urn:schemas-microsoft-com:mac:vml" xmlns:mc="http://schemas.openxmlformats.org/markup-compatibility/2006">
                 <a:solidFill>
                   <a:schemeClr val="accent1"/>
                 </a:solidFill>
               </a14:hiddenFill>
             </a:ext>
             <a:ext uri="{AF507438-7753-43E0-B8FC-AC1667EBCBE1}">
-              <a14:hiddenEffects xmlns:mc="http://schemas.openxmlformats.org/markup-compatibility/2006" xmlns:mv="urn:schemas-microsoft-com:mac:vml" xmlns:a14="http://schemas.microsoft.com/office/drawing/2010/main" xmlns="" xmlns:p="http://schemas.openxmlformats.org/presentationml/2006/main" xmlns:r="http://schemas.openxmlformats.org/officeDocument/2006/relationships" xmlns:a="http://schemas.openxmlformats.org/drawingml/2006/main">
+              <a14:hiddenEffects xmlns="" xmlns:a14="http://schemas.microsoft.com/office/drawing/2010/main" xmlns:mv="urn:schemas-microsoft-com:mac:vml" xmlns:mc="http://schemas.openxmlformats.org/markup-compatibility/2006">
                 <a:effectLst>
                   <a:outerShdw dist="35921" dir="2700000" algn="ctr" rotWithShape="0">
                     <a:schemeClr val="bg2"/>
@@ -7488,7 +8191,7 @@
           <a:blip r:embed="rId3" cstate="print">
             <a:extLst>
               <a:ext uri="{28A0092B-C50C-407E-A947-70E740481C1C}">
-                <a14:useLocalDpi xmlns:mc="http://schemas.openxmlformats.org/markup-compatibility/2006" xmlns:mv="urn:schemas-microsoft-com:mac:vml" xmlns:a14="http://schemas.microsoft.com/office/drawing/2010/main" xmlns="" xmlns:p="http://schemas.openxmlformats.org/presentationml/2006/main" xmlns:r="http://schemas.openxmlformats.org/officeDocument/2006/relationships" xmlns:a="http://schemas.openxmlformats.org/drawingml/2006/main" val="0"/>
+                <a14:useLocalDpi xmlns="" xmlns:a14="http://schemas.microsoft.com/office/drawing/2010/main" xmlns:mv="urn:schemas-microsoft-com:mac:vml" xmlns:mc="http://schemas.openxmlformats.org/markup-compatibility/2006" val="0"/>
               </a:ext>
             </a:extLst>
           </a:blip>
@@ -7510,14 +8213,14 @@
           <a:effectLst/>
           <a:extLst>
             <a:ext uri="{909E8E84-426E-40DD-AFC4-6F175D3DCCD1}">
-              <a14:hiddenFill xmlns:mc="http://schemas.openxmlformats.org/markup-compatibility/2006" xmlns:mv="urn:schemas-microsoft-com:mac:vml" xmlns:a14="http://schemas.microsoft.com/office/drawing/2010/main" xmlns="" xmlns:p="http://schemas.openxmlformats.org/presentationml/2006/main" xmlns:r="http://schemas.openxmlformats.org/officeDocument/2006/relationships" xmlns:a="http://schemas.openxmlformats.org/drawingml/2006/main">
+              <a14:hiddenFill xmlns="" xmlns:a14="http://schemas.microsoft.com/office/drawing/2010/main" xmlns:mv="urn:schemas-microsoft-com:mac:vml" xmlns:mc="http://schemas.openxmlformats.org/markup-compatibility/2006">
                 <a:solidFill>
                   <a:schemeClr val="accent1"/>
                 </a:solidFill>
               </a14:hiddenFill>
             </a:ext>
             <a:ext uri="{91240B29-F687-4F45-9708-019B960494DF}">
-              <a14:hiddenLine xmlns:mc="http://schemas.openxmlformats.org/markup-compatibility/2006" xmlns:mv="urn:schemas-microsoft-com:mac:vml" xmlns:a14="http://schemas.microsoft.com/office/drawing/2010/main" xmlns="" xmlns:p="http://schemas.openxmlformats.org/presentationml/2006/main" xmlns:r="http://schemas.openxmlformats.org/officeDocument/2006/relationships" xmlns:a="http://schemas.openxmlformats.org/drawingml/2006/main" w="9525">
+              <a14:hiddenLine xmlns="" xmlns:a14="http://schemas.microsoft.com/office/drawing/2010/main" xmlns:mv="urn:schemas-microsoft-com:mac:vml" xmlns:mc="http://schemas.openxmlformats.org/markup-compatibility/2006" w="9525">
                 <a:solidFill>
                   <a:schemeClr val="tx1"/>
                 </a:solidFill>
@@ -7527,7 +8230,7 @@
               </a14:hiddenLine>
             </a:ext>
             <a:ext uri="{AF507438-7753-43E0-B8FC-AC1667EBCBE1}">
-              <a14:hiddenEffects xmlns:mc="http://schemas.openxmlformats.org/markup-compatibility/2006" xmlns:mv="urn:schemas-microsoft-com:mac:vml" xmlns:a14="http://schemas.microsoft.com/office/drawing/2010/main" xmlns="" xmlns:p="http://schemas.openxmlformats.org/presentationml/2006/main" xmlns:r="http://schemas.openxmlformats.org/officeDocument/2006/relationships" xmlns:a="http://schemas.openxmlformats.org/drawingml/2006/main">
+              <a14:hiddenEffects xmlns="" xmlns:a14="http://schemas.microsoft.com/office/drawing/2010/main" xmlns:mv="urn:schemas-microsoft-com:mac:vml" xmlns:mc="http://schemas.openxmlformats.org/markup-compatibility/2006">
                 <a:effectLst>
                   <a:outerShdw dist="35921" dir="2700000" algn="ctr" rotWithShape="0">
                     <a:schemeClr val="bg2"/>

</xml_diff>

<commit_message>
Corrected typos, clarified some points, added citation to paper, removed 'easy to use' - let people decide that themselves, adjusted acknowlegements, changed 'all axioms' to 'axioms', removed science commons logo
</commit_message>
<xml_diff>
--- a/docs/presentations/OBI tutorial July 2011 ICBO/MIREOT-View.pptx
+++ b/docs/presentations/OBI tutorial July 2011 ICBO/MIREOT-View.pptx
@@ -2877,15 +2877,20 @@
       </p:sp>
       <p:pic>
         <p:nvPicPr>
-          <p:cNvPr id="1032" name="Picture 8" descr="Picture 3.png"/>
+          <p:cNvPr id="1032" name="Picture 8"/>
           <p:cNvPicPr>
             <a:picLocks noChangeAspect="1"/>
           </p:cNvPicPr>
           <p:nvPr userDrawn="1"/>
         </p:nvPicPr>
         <p:blipFill>
-          <a:blip r:embed="rId13"/>
-          <a:srcRect t="16833" r="1106" b="73853"/>
+          <a:blip r:embed="rId13">
+            <a:extLst>
+              <a:ext uri="{28A0092B-C50C-407E-A947-70E740481C1C}">
+                <a14:useLocalDpi xmlns:a14="http://schemas.microsoft.com/office/drawing/2010/main" val="0"/>
+              </a:ext>
+            </a:extLst>
+          </a:blip>
           <a:stretch>
             <a:fillRect/>
           </a:stretch>
@@ -2893,7 +2898,7 @@
         <p:spPr bwMode="auto">
           <a:xfrm>
             <a:off x="0" y="6324600"/>
-            <a:ext cx="9144000" cy="533400"/>
+            <a:ext cx="9143391" cy="536412"/>
           </a:xfrm>
           <a:prstGeom prst="rect">
             <a:avLst/>
@@ -3496,7 +3501,7 @@
         <p:spPr bwMode="auto">
           <a:xfrm>
             <a:off x="457200" y="1600200"/>
-            <a:ext cx="4038600" cy="2286000"/>
+            <a:ext cx="6553200" cy="2286000"/>
           </a:xfrm>
           <a:prstGeom prst="rect">
             <a:avLst/>
@@ -3525,23 +3530,6 @@
               <a:buFontTx/>
               <a:buChar char="•"/>
             </a:pPr>
-            <a:r>
-              <a:rPr kumimoji="0" lang="en-US" sz="3000" b="0" i="0" u="none" strike="noStrike" kern="0" cap="none" spc="0" normalizeH="0" baseline="0" noProof="0" dirty="0" err="1" smtClean="0">
-                <a:ln>
-                  <a:noFill/>
-                </a:ln>
-                <a:solidFill>
-                  <a:schemeClr val="tx1"/>
-                </a:solidFill>
-                <a:effectLst/>
-                <a:uLnTx/>
-                <a:uFillTx/>
-                <a:latin typeface="+mn-lt"/>
-                <a:ea typeface="ＭＳ Ｐゴシック" pitchFamily="34" charset="-128"/>
-                <a:cs typeface="+mn-cs"/>
-              </a:rPr>
-              <a:t>Mélanie</a:t>
-            </a:r>
             <a:r>
               <a:rPr kumimoji="0" lang="en-US" sz="3000" b="0" i="0" u="none" strike="noStrike" kern="0" cap="none" spc="0" normalizeH="0" baseline="0" noProof="0" dirty="0" smtClean="0">
                 <a:ln>
@@ -3557,27 +3545,25 @@
                 <a:ea typeface="ＭＳ Ｐゴシック" pitchFamily="34" charset="-128"/>
                 <a:cs typeface="+mn-cs"/>
               </a:rPr>
-              <a:t>Courtot </a:t>
-            </a:r>
-          </a:p>
-          <a:p>
-            <a:pPr marL="342900" marR="0" lvl="0" indent="-342900" algn="l" defTabSz="914400" rtl="0" eaLnBrk="1" fontAlgn="base" latinLnBrk="0" hangingPunct="1">
-              <a:lnSpc>
-                <a:spcPct val="100000"/>
-              </a:lnSpc>
+              <a:t>Mélanie Courtot</a:t>
+            </a:r>
+          </a:p>
+          <a:p>
+            <a:pPr marL="342900" lvl="0" indent="-342900">
               <a:spcBef>
                 <a:spcPct val="20000"/>
               </a:spcBef>
-              <a:spcAft>
-                <a:spcPct val="0"/>
-              </a:spcAft>
-              <a:buClrTx/>
-              <a:buSzTx/>
               <a:buFontTx/>
               <a:buChar char="•"/>
-              <a:tabLst/>
-              <a:defRPr/>
             </a:pPr>
+            <a:r>
+              <a:rPr lang="en-US" sz="3000" kern="0" dirty="0" smtClean="0">
+                <a:latin typeface="+mn-lt"/>
+                <a:ea typeface="ＭＳ Ｐゴシック" pitchFamily="34" charset="-128"/>
+                <a:cs typeface="+mn-cs"/>
+              </a:rPr>
+              <a:t>Alan Ruttenberg</a:t>
+            </a:r>
             <a:r>
               <a:rPr kumimoji="0" lang="en-US" sz="3000" b="0" i="0" u="none" strike="noStrike" kern="0" cap="none" spc="0" normalizeH="0" baseline="0" noProof="0" dirty="0" smtClean="0">
                 <a:ln>
@@ -3593,272 +3579,35 @@
                 <a:ea typeface="ＭＳ Ｐゴシック" pitchFamily="34" charset="-128"/>
                 <a:cs typeface="+mn-cs"/>
               </a:rPr>
-              <a:t>Frank Gibson</a:t>
-            </a:r>
-          </a:p>
-          <a:p>
-            <a:pPr marL="342900" marR="0" lvl="0" indent="-342900" algn="l" defTabSz="914400" rtl="0" eaLnBrk="1" fontAlgn="base" latinLnBrk="0" hangingPunct="1">
-              <a:lnSpc>
-                <a:spcPct val="100000"/>
-              </a:lnSpc>
+              <a:t> </a:t>
+            </a:r>
+          </a:p>
+          <a:p>
+            <a:pPr marL="342900" indent="-342900">
               <a:spcBef>
                 <a:spcPct val="20000"/>
               </a:spcBef>
-              <a:spcAft>
-                <a:spcPct val="0"/>
-              </a:spcAft>
-              <a:buClrTx/>
-              <a:buSzTx/>
               <a:buFontTx/>
               <a:buChar char="•"/>
-              <a:tabLst/>
-              <a:defRPr/>
             </a:pPr>
             <a:r>
-              <a:rPr kumimoji="0" lang="en-US" sz="3000" b="0" i="0" u="none" strike="noStrike" kern="0" cap="none" spc="0" normalizeH="0" baseline="0" noProof="0" dirty="0" smtClean="0">
-                <a:ln>
-                  <a:noFill/>
-                </a:ln>
-                <a:solidFill>
-                  <a:schemeClr val="tx1"/>
-                </a:solidFill>
-                <a:effectLst/>
-                <a:uLnTx/>
-                <a:uFillTx/>
-                <a:latin typeface="+mn-lt"/>
+              <a:rPr lang="en-US" sz="3000" kern="0" dirty="0" err="1">
                 <a:ea typeface="ＭＳ Ｐゴシック" pitchFamily="34" charset="-128"/>
-                <a:cs typeface="+mn-cs"/>
               </a:rPr>
-              <a:t>Allyson L. Lister</a:t>
-            </a:r>
-          </a:p>
-          <a:p>
-            <a:pPr marL="342900" marR="0" lvl="0" indent="-342900" algn="l" defTabSz="914400" rtl="0" eaLnBrk="1" fontAlgn="base" latinLnBrk="0" hangingPunct="1">
-              <a:lnSpc>
-                <a:spcPct val="100000"/>
-              </a:lnSpc>
-              <a:spcBef>
-                <a:spcPct val="20000"/>
-              </a:spcBef>
-              <a:spcAft>
-                <a:spcPct val="0"/>
-              </a:spcAft>
-              <a:buClrTx/>
-              <a:buSzTx/>
-              <a:buFontTx/>
-              <a:buChar char="•"/>
-              <a:tabLst/>
-              <a:defRPr/>
-            </a:pPr>
-            <a:r>
-              <a:rPr kumimoji="0" lang="en-US" sz="3000" b="0" i="0" u="none" strike="noStrike" kern="0" cap="none" spc="0" normalizeH="0" baseline="0" noProof="0" dirty="0" smtClean="0">
-                <a:ln>
-                  <a:noFill/>
-                </a:ln>
-                <a:solidFill>
-                  <a:schemeClr val="tx1"/>
-                </a:solidFill>
-                <a:effectLst/>
-                <a:uLnTx/>
-                <a:uFillTx/>
-                <a:latin typeface="+mn-lt"/>
+              <a:t>Zuoshuang</a:t>
+            </a:r>
+            <a:r>
+              <a:rPr lang="en-US" sz="3000" kern="0" dirty="0">
                 <a:ea typeface="ＭＳ Ｐゴシック" pitchFamily="34" charset="-128"/>
-                <a:cs typeface="+mn-cs"/>
               </a:rPr>
-              <a:t>James Malone </a:t>
-            </a:r>
-          </a:p>
-        </p:txBody>
-      </p:sp>
-      <p:sp>
-        <p:nvSpPr>
-          <p:cNvPr id="5" name="Content Placeholder 4"/>
-          <p:cNvSpPr txBox="1">
-            <a:spLocks/>
-          </p:cNvSpPr>
-          <p:nvPr/>
-        </p:nvSpPr>
-        <p:spPr>
-          <a:xfrm>
-            <a:off x="4343400" y="1600200"/>
-            <a:ext cx="4572000" cy="2209800"/>
-          </a:xfrm>
-          <a:prstGeom prst="rect">
-            <a:avLst/>
-          </a:prstGeom>
-        </p:spPr>
-        <p:txBody>
-          <a:bodyPr/>
-          <a:lstStyle/>
-          <a:p>
-            <a:pPr marL="342900" marR="0" lvl="0" indent="-342900" algn="l" defTabSz="914400" rtl="0" eaLnBrk="1" fontAlgn="base" latinLnBrk="0" hangingPunct="1">
-              <a:lnSpc>
-                <a:spcPct val="100000"/>
-              </a:lnSpc>
-              <a:spcBef>
-                <a:spcPct val="20000"/>
-              </a:spcBef>
-              <a:spcAft>
-                <a:spcPct val="0"/>
-              </a:spcAft>
-              <a:buClrTx/>
-              <a:buSzTx/>
-              <a:buFontTx/>
-              <a:buChar char="•"/>
-              <a:tabLst/>
-              <a:defRPr/>
-            </a:pPr>
-            <a:r>
-              <a:rPr kumimoji="0" lang="en-US" sz="3000" b="0" i="0" u="none" strike="noStrike" kern="0" cap="none" spc="0" normalizeH="0" baseline="0" noProof="0" dirty="0" smtClean="0">
-                <a:ln>
-                  <a:noFill/>
-                </a:ln>
-                <a:solidFill>
-                  <a:schemeClr val="tx1"/>
-                </a:solidFill>
-                <a:effectLst/>
-                <a:uLnTx/>
-                <a:uFillTx/>
-                <a:latin typeface="+mn-lt"/>
+              <a:t>(</a:t>
+            </a:r>
+            <a:r>
+              <a:rPr lang="en-US" sz="3000" kern="0" dirty="0">
                 <a:ea typeface="ＭＳ Ｐゴシック" pitchFamily="34" charset="-128"/>
-                <a:cs typeface="+mn-cs"/>
               </a:rPr>
-              <a:t>Daniel </a:t>
-            </a:r>
-            <a:r>
-              <a:rPr kumimoji="0" lang="en-US" sz="3000" b="0" i="0" u="none" strike="noStrike" kern="0" cap="none" spc="0" normalizeH="0" baseline="0" noProof="0" dirty="0" err="1" smtClean="0">
-                <a:ln>
-                  <a:noFill/>
-                </a:ln>
-                <a:solidFill>
-                  <a:schemeClr val="tx1"/>
-                </a:solidFill>
-                <a:effectLst/>
-                <a:uLnTx/>
-                <a:uFillTx/>
-                <a:latin typeface="+mn-lt"/>
-                <a:ea typeface="ＭＳ Ｐゴシック" pitchFamily="34" charset="-128"/>
-                <a:cs typeface="+mn-cs"/>
-              </a:rPr>
-              <a:t>Schober</a:t>
-            </a:r>
-            <a:endParaRPr kumimoji="0" lang="en-US" sz="3000" b="0" i="0" u="none" strike="noStrike" kern="0" cap="none" spc="0" normalizeH="0" baseline="0" noProof="0" dirty="0" smtClean="0">
-              <a:ln>
-                <a:noFill/>
-              </a:ln>
-              <a:solidFill>
-                <a:schemeClr val="tx1"/>
-              </a:solidFill>
-              <a:effectLst/>
-              <a:uLnTx/>
-              <a:uFillTx/>
-              <a:latin typeface="+mn-lt"/>
-              <a:ea typeface="ＭＳ Ｐゴシック" pitchFamily="34" charset="-128"/>
-              <a:cs typeface="+mn-cs"/>
-            </a:endParaRPr>
-          </a:p>
-          <a:p>
-            <a:pPr marL="342900" marR="0" lvl="0" indent="-342900" algn="l" defTabSz="914400" rtl="0" eaLnBrk="1" fontAlgn="base" latinLnBrk="0" hangingPunct="1">
-              <a:lnSpc>
-                <a:spcPct val="100000"/>
-              </a:lnSpc>
-              <a:spcBef>
-                <a:spcPct val="20000"/>
-              </a:spcBef>
-              <a:spcAft>
-                <a:spcPct val="0"/>
-              </a:spcAft>
-              <a:buClrTx/>
-              <a:buSzTx/>
-              <a:buFontTx/>
-              <a:buChar char="•"/>
-              <a:tabLst/>
-              <a:defRPr/>
-            </a:pPr>
-            <a:r>
-              <a:rPr kumimoji="0" lang="en-US" sz="3000" b="0" i="0" u="none" strike="noStrike" kern="0" cap="none" spc="0" normalizeH="0" baseline="0" noProof="0" dirty="0" smtClean="0">
-                <a:ln>
-                  <a:noFill/>
-                </a:ln>
-                <a:solidFill>
-                  <a:schemeClr val="tx1"/>
-                </a:solidFill>
-                <a:effectLst/>
-                <a:uLnTx/>
-                <a:uFillTx/>
-                <a:latin typeface="+mn-lt"/>
-                <a:ea typeface="ＭＳ Ｐゴシック" pitchFamily="34" charset="-128"/>
-                <a:cs typeface="+mn-cs"/>
-              </a:rPr>
-              <a:t>Ryan R. Brinkman</a:t>
-            </a:r>
-          </a:p>
-          <a:p>
-            <a:pPr marL="342900" marR="0" lvl="0" indent="-342900" algn="l" defTabSz="914400" rtl="0" eaLnBrk="1" fontAlgn="base" latinLnBrk="0" hangingPunct="1">
-              <a:lnSpc>
-                <a:spcPct val="100000"/>
-              </a:lnSpc>
-              <a:spcBef>
-                <a:spcPct val="20000"/>
-              </a:spcBef>
-              <a:spcAft>
-                <a:spcPct val="0"/>
-              </a:spcAft>
-              <a:buClrTx/>
-              <a:buSzTx/>
-              <a:buFontTx/>
-              <a:buChar char="•"/>
-              <a:tabLst/>
-              <a:defRPr/>
-            </a:pPr>
-            <a:r>
-              <a:rPr kumimoji="0" lang="en-US" sz="3000" b="0" i="0" u="none" strike="noStrike" kern="0" cap="none" spc="0" normalizeH="0" baseline="0" noProof="0" dirty="0" smtClean="0">
-                <a:ln>
-                  <a:noFill/>
-                </a:ln>
-                <a:solidFill>
-                  <a:schemeClr val="tx1"/>
-                </a:solidFill>
-                <a:effectLst/>
-                <a:uLnTx/>
-                <a:uFillTx/>
-                <a:latin typeface="+mn-lt"/>
-                <a:ea typeface="ＭＳ Ｐゴシック" pitchFamily="34" charset="-128"/>
-                <a:cs typeface="+mn-cs"/>
-              </a:rPr>
-              <a:t>Alan </a:t>
-            </a:r>
-            <a:r>
-              <a:rPr kumimoji="0" lang="en-US" sz="3000" b="0" i="0" u="none" strike="noStrike" kern="0" cap="none" spc="0" normalizeH="0" baseline="0" noProof="0" dirty="0" err="1" smtClean="0">
-                <a:ln>
-                  <a:noFill/>
-                </a:ln>
-                <a:solidFill>
-                  <a:schemeClr val="tx1"/>
-                </a:solidFill>
-                <a:effectLst/>
-                <a:uLnTx/>
-                <a:uFillTx/>
-                <a:latin typeface="+mn-lt"/>
-                <a:ea typeface="ＭＳ Ｐゴシック" pitchFamily="34" charset="-128"/>
-                <a:cs typeface="+mn-cs"/>
-              </a:rPr>
-              <a:t>Ruttenberg</a:t>
-            </a:r>
-            <a:endParaRPr kumimoji="0" lang="en-US" sz="3000" b="0" i="0" u="none" strike="noStrike" kern="0" cap="none" spc="0" normalizeH="0" baseline="0" noProof="0" dirty="0" smtClean="0">
-              <a:ln>
-                <a:noFill/>
-              </a:ln>
-              <a:solidFill>
-                <a:schemeClr val="tx1"/>
-              </a:solidFill>
-              <a:effectLst/>
-              <a:uLnTx/>
-              <a:uFillTx/>
-              <a:latin typeface="+mn-lt"/>
-              <a:ea typeface="ＭＳ Ｐゴシック" pitchFamily="34" charset="-128"/>
-              <a:cs typeface="+mn-cs"/>
-            </a:endParaRPr>
+              <a:t>Allen) Xiang</a:t>
+            </a:r>
           </a:p>
           <a:p>
             <a:pPr marL="342900" lvl="0" indent="-342900">
@@ -3868,60 +3617,7 @@
               <a:buFontTx/>
               <a:buChar char="•"/>
             </a:pPr>
-            <a:r>
-              <a:rPr lang="en-US" sz="3000" kern="0" dirty="0" err="1">
-                <a:ea typeface="ＭＳ Ｐゴシック" pitchFamily="34" charset="-128"/>
-              </a:rPr>
-              <a:t>Zuoshuang</a:t>
-            </a:r>
-            <a:r>
-              <a:rPr lang="en-US" sz="3000" kern="0" dirty="0" smtClean="0">
-                <a:ea typeface="ＭＳ Ｐゴシック" pitchFamily="34" charset="-128"/>
-              </a:rPr>
-              <a:t>(</a:t>
-            </a:r>
-            <a:r>
-              <a:rPr lang="en-US" sz="3000" kern="0" dirty="0" smtClean="0">
-                <a:latin typeface="+mn-lt"/>
-                <a:ea typeface="ＭＳ Ｐゴシック" pitchFamily="34" charset="-128"/>
-                <a:cs typeface="+mn-cs"/>
-              </a:rPr>
-              <a:t>Allen) Xiang</a:t>
-            </a:r>
             <a:endParaRPr kumimoji="0" lang="en-US" sz="3000" b="0" i="0" u="none" strike="noStrike" kern="0" cap="none" spc="0" normalizeH="0" baseline="0" noProof="0" dirty="0" smtClean="0">
-              <a:ln>
-                <a:noFill/>
-              </a:ln>
-              <a:solidFill>
-                <a:schemeClr val="tx1"/>
-              </a:solidFill>
-              <a:effectLst/>
-              <a:uLnTx/>
-              <a:uFillTx/>
-              <a:latin typeface="+mn-lt"/>
-              <a:ea typeface="ＭＳ Ｐゴシック" pitchFamily="34" charset="-128"/>
-              <a:cs typeface="+mn-cs"/>
-            </a:endParaRPr>
-          </a:p>
-          <a:p>
-            <a:pPr marL="342900" marR="0" lvl="0" indent="-342900" algn="l" defTabSz="914400" rtl="0" eaLnBrk="1" fontAlgn="base" latinLnBrk="0" hangingPunct="1">
-              <a:lnSpc>
-                <a:spcPct val="100000"/>
-              </a:lnSpc>
-              <a:spcBef>
-                <a:spcPct val="20000"/>
-              </a:spcBef>
-              <a:spcAft>
-                <a:spcPct val="0"/>
-              </a:spcAft>
-              <a:buClrTx/>
-              <a:buSzTx/>
-              <a:buFontTx/>
-              <a:buChar char="•"/>
-              <a:tabLst/>
-              <a:defRPr/>
-            </a:pPr>
-            <a:endParaRPr kumimoji="0" lang="en-US" sz="3200" b="0" i="0" u="none" strike="noStrike" kern="0" cap="none" spc="0" normalizeH="0" baseline="0" noProof="0" dirty="0" smtClean="0">
               <a:ln>
                 <a:noFill/>
               </a:ln>
@@ -3986,7 +3682,7 @@
   <p:timing>
     <p:tnLst>
       <p:par>
-        <p:cTn id="1" dur="indefinite" restart="never" nodeType="tmRoot"/>
+        <p:cTn xmlns:p14="http://schemas.microsoft.com/office/powerpoint/2010/main" id="1" dur="indefinite" restart="never" nodeType="tmRoot"/>
       </p:par>
     </p:tnLst>
   </p:timing>
@@ -4233,7 +3929,11 @@
             </a:r>
             <a:r>
               <a:rPr lang="en-US" dirty="0" smtClean="0"/>
-              <a:t>ag the termsforwhich </a:t>
+              <a:t>ag the </a:t>
+            </a:r>
+            <a:r>
+              <a:rPr lang="en-US" dirty="0" smtClean="0"/>
+              <a:t>terms for which </a:t>
             </a:r>
             <a:r>
               <a:rPr lang="en-US" dirty="0"/>
@@ -4373,8 +4073,21 @@
           <a:p>
             <a:r>
               <a:rPr lang="en-US" dirty="0" smtClean="0"/>
-              <a:t>Extract the tagged subset of obi.owl including all related terms and axioms based on community-specific annotation property</a:t>
-            </a:r>
+              <a:t>Extract the tagged subset of obi.owl including </a:t>
+            </a:r>
+            <a:r>
+              <a:rPr lang="en-US" dirty="0" smtClean="0"/>
+              <a:t>related </a:t>
+            </a:r>
+            <a:r>
+              <a:rPr lang="en-US" dirty="0" smtClean="0"/>
+              <a:t>terms and axioms based on </a:t>
+            </a:r>
+            <a:r>
+              <a:rPr lang="en-US" dirty="0" smtClean="0"/>
+              <a:t>annotation property specifying community</a:t>
+            </a:r>
+            <a:endParaRPr lang="en-US" dirty="0" smtClean="0"/>
           </a:p>
           <a:p>
             <a:r>
@@ -4416,7 +4129,7 @@
   <p:timing>
     <p:tnLst>
       <p:par>
-        <p:cTn id="1" dur="indefinite" restart="never" nodeType="tmRoot"/>
+        <p:cTn xmlns:p14="http://schemas.microsoft.com/office/powerpoint/2010/main" id="1" dur="indefinite" restart="never" nodeType="tmRoot"/>
       </p:par>
     </p:tnLst>
   </p:timing>
@@ -4723,7 +4436,11 @@
             <a:p>
               <a:r>
                 <a:rPr lang="en-US" sz="1800" dirty="0" smtClean="0"/>
-                <a:t>all the axioms related to them</a:t>
+                <a:t>the </a:t>
+              </a:r>
+              <a:r>
+                <a:rPr lang="en-US" sz="1800" dirty="0" smtClean="0"/>
+                <a:t>axioms related to them</a:t>
               </a:r>
               <a:endParaRPr lang="en-US" sz="1800" dirty="0"/>
             </a:p>
@@ -5022,7 +4739,7 @@
           <a:p>
             <a:r>
               <a:rPr lang="en-US" sz="1800" dirty="0" smtClean="0"/>
-              <a:t>quires</a:t>
+              <a:t>queries</a:t>
             </a:r>
             <a:endParaRPr lang="en-US" sz="1800" dirty="0"/>
           </a:p>
@@ -5066,7 +4783,7 @@
   <p:timing>
     <p:tnLst>
       <p:par>
-        <p:cTn id="1" dur="indefinite" restart="never" nodeType="tmRoot"/>
+        <p:cTn xmlns:p14="http://schemas.microsoft.com/office/powerpoint/2010/main" id="1" dur="indefinite" restart="never" nodeType="tmRoot"/>
       </p:par>
     </p:tnLst>
   </p:timing>
@@ -5270,13 +4987,17 @@
             <a:p>
               <a:r>
                 <a:rPr lang="en-US" sz="1800" dirty="0" smtClean="0"/>
-                <a:t>    alternative term’ property and</a:t>
+                <a:t>    alternative term’ property </a:t>
+              </a:r>
+              <a:r>
+                <a:rPr lang="en-US" sz="1800" dirty="0" smtClean="0"/>
+                <a:t>and</a:t>
               </a:r>
             </a:p>
             <a:p>
               <a:r>
                 <a:rPr lang="en-US" sz="1800" dirty="0" smtClean="0"/>
-                <a:t>    all the axioms related to them</a:t>
+                <a:t>    axioms related to them</a:t>
               </a:r>
               <a:endParaRPr lang="en-US" sz="1800" dirty="0"/>
             </a:p>
@@ -5563,7 +5284,6 @@
               <a:rPr lang="en-US" sz="1800" dirty="0" smtClean="0"/>
               <a:t>SPARQL </a:t>
             </a:r>
-            <a:endParaRPr lang="en-US" sz="1800" dirty="0" smtClean="0"/>
           </a:p>
           <a:p>
             <a:r>
@@ -5700,7 +5420,7 @@
   <p:timing>
     <p:tnLst>
       <p:par>
-        <p:cTn id="1" dur="indefinite" restart="never" nodeType="tmRoot"/>
+        <p:cTn xmlns:p14="http://schemas.microsoft.com/office/powerpoint/2010/main" id="1" dur="indefinite" restart="never" nodeType="tmRoot"/>
       </p:par>
     </p:tnLst>
   </p:timing>
@@ -5855,17 +5575,14 @@
               <a:buChar char="•"/>
             </a:pPr>
             <a:r>
-              <a:rPr lang="en-US" sz="3000" kern="0" smtClean="0">
+              <a:rPr lang="en-US" sz="3000" kern="0" dirty="0" smtClean="0">
                 <a:ea typeface="ＭＳ Ｐゴシック" pitchFamily="34" charset="-128"/>
               </a:rPr>
-              <a:t>Mélanie</a:t>
-            </a:r>
-            <a:r>
-              <a:rPr lang="en-US" sz="3000" kern="0" dirty="0">
-                <a:ea typeface="ＭＳ Ｐゴシック" pitchFamily="34" charset="-128"/>
-              </a:rPr>
-              <a:t>Courtot </a:t>
-            </a:r>
+              <a:t>Mélanie Courtot </a:t>
+            </a:r>
+            <a:endParaRPr lang="en-US" sz="3000" kern="0" dirty="0">
+              <a:ea typeface="ＭＳ Ｐゴシック" pitchFamily="34" charset="-128"/>
+            </a:endParaRPr>
           </a:p>
           <a:p>
             <a:pPr marL="342900" marR="0" lvl="0" indent="-342900" algn="l" defTabSz="914400" rtl="0" eaLnBrk="1" fontAlgn="base" latinLnBrk="0" hangingPunct="1">
@@ -6135,7 +5852,7 @@
   <p:timing>
     <p:tnLst>
       <p:par>
-        <p:cTn id="1" dur="indefinite" restart="never" nodeType="tmRoot"/>
+        <p:cTn xmlns:p14="http://schemas.microsoft.com/office/powerpoint/2010/main" id="1" dur="indefinite" restart="never" nodeType="tmRoot"/>
       </p:par>
     </p:tnLst>
   </p:timing>
@@ -6255,16 +5972,21 @@
           <a:p>
             <a:r>
               <a:rPr lang="en-US" dirty="0"/>
-              <a:t>A mechanism to import terms of interest from an external resource</a:t>
+              <a:t>A mechanism to </a:t>
             </a:r>
             <a:r>
               <a:rPr lang="en-US" dirty="0" smtClean="0"/>
-              <a:t> to </a:t>
-            </a:r>
-            <a:r>
-              <a:rPr lang="en-US" dirty="0"/>
-              <a:t>a target ontology</a:t>
-            </a:r>
+              <a:t>specify, in your ontology, individual terms </a:t>
+            </a:r>
+            <a:r>
+              <a:rPr lang="en-US" dirty="0" smtClean="0"/>
+              <a:t>you want to use from another </a:t>
+            </a:r>
+            <a:r>
+              <a:rPr lang="en-US" dirty="0" smtClean="0"/>
+              <a:t>ontology</a:t>
+            </a:r>
+            <a:endParaRPr lang="en-US" dirty="0"/>
           </a:p>
         </p:txBody>
       </p:sp>
@@ -6336,40 +6058,8 @@
               </a:lnSpc>
             </a:pPr>
             <a:r>
-              <a:rPr lang="en-US" dirty="0" smtClean="0"/>
-              <a:t>Creating </a:t>
-            </a:r>
-            <a:r>
               <a:rPr lang="en-US" dirty="0"/>
-              <a:t>new </a:t>
-            </a:r>
-            <a:r>
-              <a:rPr lang="en-US" dirty="0" smtClean="0"/>
-              <a:t>terms </a:t>
-            </a:r>
-            <a:r>
-              <a:rPr lang="en-US" dirty="0"/>
-              <a:t>in the target ontology and </a:t>
-            </a:r>
-            <a:r>
-              <a:rPr lang="en-US" dirty="0" smtClean="0"/>
-              <a:t>referring back </a:t>
-            </a:r>
-            <a:r>
-              <a:rPr lang="en-US" dirty="0"/>
-              <a:t>to</a:t>
-            </a:r>
-            <a:r>
-              <a:rPr lang="en-US" dirty="0" smtClean="0"/>
-              <a:t> an external </a:t>
-            </a:r>
-            <a:r>
-              <a:rPr lang="en-US" dirty="0"/>
-              <a:t>resource</a:t>
-            </a:r>
-            <a:r>
-              <a:rPr lang="en-US" dirty="0" smtClean="0"/>
-              <a:t> leads to redundant effort and terms.</a:t>
+              <a:t>Import of a whole ontology may have too much overhead or may cause inconsistencies and unexpected inferences.</a:t>
             </a:r>
           </a:p>
           <a:p>
@@ -6380,16 +6070,21 @@
             </a:pPr>
             <a:r>
               <a:rPr lang="en-US" dirty="0" smtClean="0"/>
-              <a:t>Extracting and importing modules </a:t>
+              <a:t>Creating new terms that replicate those in other ontologies is redundant and makes data integration harder, even if you cross-reference back </a:t>
             </a:r>
             <a:r>
               <a:rPr lang="en-US" dirty="0"/>
-              <a:t>(including axioms)</a:t>
+              <a:t>to</a:t>
             </a:r>
             <a:r>
               <a:rPr lang="en-US" dirty="0" smtClean="0"/>
-              <a:t> is difficult.</a:t>
-            </a:r>
+              <a:t> </a:t>
+            </a:r>
+            <a:r>
+              <a:rPr lang="en-US" dirty="0" smtClean="0"/>
+              <a:t>the original resource.</a:t>
+            </a:r>
+            <a:endParaRPr lang="en-US" dirty="0" smtClean="0"/>
           </a:p>
           <a:p>
             <a:pPr>
@@ -6398,45 +6093,17 @@
               </a:lnSpc>
             </a:pPr>
             <a:r>
-              <a:rPr lang="en-US" dirty="0"/>
-              <a:t>Import</a:t>
-            </a:r>
-            <a:r>
               <a:rPr lang="en-US" dirty="0" smtClean="0"/>
-              <a:t> of a whole </a:t>
-            </a:r>
-            <a:r>
-              <a:rPr lang="en-US" dirty="0"/>
-              <a:t>ontology</a:t>
-            </a:r>
-            <a:r>
-              <a:rPr lang="en-US" dirty="0" smtClean="0"/>
-              <a:t> has a </a:t>
-            </a:r>
-            <a:r>
-              <a:rPr lang="en-US" dirty="0"/>
-              <a:t>huge </a:t>
-            </a:r>
-            <a:r>
-              <a:rPr lang="en-US" dirty="0" smtClean="0"/>
-              <a:t>overhead and </a:t>
-            </a:r>
-            <a:r>
-              <a:rPr lang="en-US" dirty="0"/>
-              <a:t>may cause </a:t>
-            </a:r>
-            <a:r>
-              <a:rPr lang="en-US" dirty="0" smtClean="0"/>
-              <a:t>inconsistencies </a:t>
-            </a:r>
-            <a:r>
-              <a:rPr lang="en-US" dirty="0"/>
-              <a:t>and unexpected </a:t>
-            </a:r>
-            <a:r>
-              <a:rPr lang="en-US" dirty="0" smtClean="0"/>
-              <a:t>inferences.</a:t>
-            </a:r>
+              <a:t>If we specify terms of interest, tools can use that information to manage importing needed information to our ontology</a:t>
+            </a:r>
+          </a:p>
+          <a:p>
+            <a:pPr marL="0" indent="0">
+              <a:lnSpc>
+                <a:spcPct val="90000"/>
+              </a:lnSpc>
+              <a:buNone/>
+            </a:pPr>
             <a:endParaRPr lang="en-US" dirty="0"/>
           </a:p>
         </p:txBody>
@@ -6500,23 +6167,11 @@
             </a:r>
             <a:r>
               <a:rPr lang="en-US" sz="4000" dirty="0" smtClean="0"/>
-              <a:t> required to refer toa</a:t>
-            </a:r>
-            <a:r>
-              <a:rPr lang="en-US" sz="4000" dirty="0"/>
-              <a:t>term in</a:t>
+              <a:t> required to refer </a:t>
             </a:r>
             <a:r>
               <a:rPr lang="en-US" sz="4000" dirty="0" smtClean="0"/>
-              <a:t>an</a:t>
-            </a:r>
-            <a:r>
-              <a:rPr lang="en-US" sz="4000" dirty="0"/>
-              <a:t>external resource</a:t>
-            </a:r>
-            <a:r>
-              <a:rPr lang="en-US" sz="4000" dirty="0" smtClean="0"/>
-              <a:t>?</a:t>
+              <a:t>to another ontology’s term?</a:t>
             </a:r>
             <a:endParaRPr lang="en-US" sz="4000" dirty="0"/>
           </a:p>
@@ -6543,21 +6198,39 @@
           <a:lstStyle/>
           <a:p>
             <a:r>
+              <a:rPr lang="en-US" dirty="0" smtClean="0"/>
+              <a:t>IRI </a:t>
+            </a:r>
+            <a:r>
               <a:rPr lang="en-US" dirty="0"/>
-              <a:t>URI of the class </a:t>
-            </a:r>
-          </a:p>
-          <a:p>
+              <a:t>of the class </a:t>
+            </a:r>
+          </a:p>
+          <a:p>
+            <a:r>
+              <a:rPr lang="en-US" dirty="0" smtClean="0"/>
+              <a:t>IRI </a:t>
+            </a:r>
             <a:r>
               <a:rPr lang="en-US" dirty="0"/>
-              <a:t>URI of the source ontology</a:t>
-            </a:r>
-          </a:p>
-          <a:p>
-            <a:r>
-              <a:rPr lang="en-US" dirty="0"/>
-              <a:t>Position in the target ontology</a:t>
-            </a:r>
+              <a:t>of the </a:t>
+            </a:r>
+            <a:r>
+              <a:rPr lang="en-US" dirty="0" smtClean="0"/>
+              <a:t>other </a:t>
+            </a:r>
+            <a:r>
+              <a:rPr lang="en-US" dirty="0" smtClean="0"/>
+              <a:t>ontology</a:t>
+            </a:r>
+            <a:endParaRPr lang="en-US" dirty="0"/>
+          </a:p>
+          <a:p>
+            <a:r>
+              <a:rPr lang="en-US" dirty="0" smtClean="0"/>
+              <a:t>Superclass of the class in your ontology</a:t>
+            </a:r>
+            <a:endParaRPr lang="en-US" dirty="0"/>
           </a:p>
           <a:p>
             <a:pPr>
@@ -6589,8 +6262,13 @@
             </a:r>
             <a:r>
               <a:rPr lang="en-US" dirty="0"/>
-              <a:t>a term</a:t>
-            </a:r>
+              <a:t>a </a:t>
+            </a:r>
+            <a:r>
+              <a:rPr lang="en-US" dirty="0" smtClean="0"/>
+              <a:t>term. Based on this, additional information related to the term can be accessed by tools.</a:t>
+            </a:r>
+            <a:endParaRPr lang="en-US" dirty="0"/>
           </a:p>
           <a:p>
             <a:pPr>
@@ -6642,8 +6320,12 @@
           <a:lstStyle/>
           <a:p>
             <a:r>
-              <a:rPr lang="en-US"/>
-              <a:t>Additional information</a:t>
+              <a:rPr lang="en-US" dirty="0" smtClean="0"/>
+              <a:t>Desirable additional </a:t>
+            </a:r>
+            <a:r>
+              <a:rPr lang="en-US" dirty="0"/>
+              <a:t>information</a:t>
             </a:r>
           </a:p>
         </p:txBody>
@@ -6665,17 +6347,26 @@
           <a:p>
             <a:r>
               <a:rPr lang="en-US" dirty="0" smtClean="0"/>
+              <a:t>Annotations, such as:</a:t>
+            </a:r>
+          </a:p>
+          <a:p>
+            <a:pPr lvl="1"/>
+            <a:r>
+              <a:rPr lang="en-US" dirty="0" smtClean="0"/>
               <a:t>Label</a:t>
             </a:r>
             <a:endParaRPr lang="en-US" dirty="0"/>
           </a:p>
           <a:p>
+            <a:pPr lvl="1"/>
             <a:r>
               <a:rPr lang="en-US" dirty="0"/>
               <a:t>Definition</a:t>
             </a:r>
           </a:p>
           <a:p>
+            <a:pPr lvl="1"/>
             <a:r>
               <a:rPr lang="en-US" dirty="0"/>
               <a:t>Synonym</a:t>
@@ -6683,9 +6374,18 @@
           </a:p>
           <a:p>
             <a:r>
+              <a:rPr lang="en-US" dirty="0" smtClean="0"/>
+              <a:t>Axioms</a:t>
+            </a:r>
+            <a:r>
               <a:rPr lang="en-US" dirty="0"/>
-              <a:t>Other annotations</a:t>
-            </a:r>
+              <a:t> </a:t>
+            </a:r>
+            <a:r>
+              <a:rPr lang="en-US" dirty="0" smtClean="0"/>
+              <a:t>(but this may be tricky)</a:t>
+            </a:r>
+            <a:endParaRPr lang="en-US" dirty="0" smtClean="0"/>
           </a:p>
         </p:txBody>
       </p:sp>
@@ -6734,9 +6434,10 @@
               <a:t>MIREOTing</a:t>
             </a:r>
             <a:r>
-              <a:rPr lang="en-US" dirty="0"/>
-              <a:t>automatically</a:t>
-            </a:r>
+              <a:rPr lang="en-US" dirty="0" smtClean="0"/>
+              <a:t> automatically</a:t>
+            </a:r>
+            <a:endParaRPr lang="en-US" dirty="0"/>
           </a:p>
         </p:txBody>
       </p:sp>
@@ -6757,15 +6458,31 @@
           <a:p>
             <a:r>
               <a:rPr lang="en-US" dirty="0" smtClean="0"/>
-              <a:t>Perl + Lisp scripts </a:t>
+              <a:t>Perl + </a:t>
+            </a:r>
+            <a:r>
+              <a:rPr lang="en-US" dirty="0" smtClean="0"/>
+              <a:t>Lisp(java) </a:t>
+            </a:r>
+            <a:r>
+              <a:rPr lang="en-US" dirty="0" smtClean="0"/>
+              <a:t>scripts </a:t>
             </a:r>
           </a:p>
           <a:p>
             <a:pPr lvl="1"/>
             <a:r>
               <a:rPr lang="en-US" dirty="0" smtClean="0"/>
-              <a:t>used by OBI developers</a:t>
-            </a:r>
+              <a:t>Used for OBI development</a:t>
+            </a:r>
+          </a:p>
+          <a:p>
+            <a:pPr lvl="1"/>
+            <a:r>
+              <a:rPr lang="en-US" dirty="0" smtClean="0"/>
+              <a:t>Needs to be customized for each ontology</a:t>
+            </a:r>
+            <a:endParaRPr lang="en-US" dirty="0" smtClean="0"/>
           </a:p>
           <a:p>
             <a:r>
@@ -6778,7 +6495,32 @@
             <a:pPr lvl="1"/>
             <a:r>
               <a:rPr lang="en-US" dirty="0" smtClean="0"/>
-              <a:t>Web-based tool that can be easily used by all developers (compare to OBI implementation)</a:t>
+              <a:t>Web-based tool </a:t>
+            </a:r>
+            <a:r>
+              <a:rPr lang="en-US" dirty="0" smtClean="0"/>
+              <a:t>aimed to be </a:t>
+            </a:r>
+            <a:r>
+              <a:rPr lang="en-US" dirty="0" smtClean="0"/>
+              <a:t>easily used by all </a:t>
+            </a:r>
+            <a:r>
+              <a:rPr lang="en-US" dirty="0" smtClean="0"/>
+              <a:t>developers</a:t>
+            </a:r>
+          </a:p>
+          <a:p>
+            <a:r>
+              <a:rPr lang="en-US" dirty="0" smtClean="0"/>
+              <a:t>Modularization algorithms</a:t>
+            </a:r>
+          </a:p>
+          <a:p>
+            <a:pPr lvl="1"/>
+            <a:r>
+              <a:rPr lang="en-US" dirty="0" smtClean="0"/>
+              <a:t>In research stages. Hard to use.</a:t>
             </a:r>
             <a:endParaRPr lang="en-US" dirty="0"/>
           </a:p>
@@ -7572,7 +7314,7 @@
   <p:timing>
     <p:tnLst>
       <p:par>
-        <p:cTn id="1" dur="indefinite" restart="never" nodeType="tmRoot">
+        <p:cTn xmlns:p14="http://schemas.microsoft.com/office/powerpoint/2010/main" id="1" dur="indefinite" restart="never" nodeType="tmRoot">
           <p:childTnLst>
             <p:seq concurrent="1" nextAc="seek">
               <p:cTn id="2" dur="indefinite" nodeType="mainSeq">
@@ -7857,7 +7599,7 @@
         </p:nvSpPr>
         <p:spPr>
           <a:xfrm>
-            <a:off x="381000" y="1447800"/>
+            <a:off x="381000" y="1295400"/>
             <a:ext cx="8458200" cy="4724400"/>
           </a:xfrm>
         </p:spPr>
@@ -7884,7 +7626,7 @@
               </a:lnSpc>
             </a:pPr>
             <a:r>
-              <a:rPr lang="en-US" sz="2800" dirty="0">
+              <a:rPr lang="en-US" sz="2000" dirty="0">
                 <a:solidFill>
                   <a:schemeClr val="accent2"/>
                 </a:solidFill>
@@ -7899,7 +7641,7 @@
               </a:lnSpc>
             </a:pPr>
             <a:r>
-              <a:rPr lang="en-US" sz="2800" dirty="0"/>
+              <a:rPr lang="en-US" dirty="0"/>
               <a:t>add-to-external.pl</a:t>
             </a:r>
           </a:p>
@@ -7910,7 +7652,7 @@
               </a:lnSpc>
             </a:pPr>
             <a:r>
-              <a:rPr lang="en-US" sz="2400" dirty="0">
+              <a:rPr lang="en-US" sz="2000" dirty="0">
                 <a:solidFill>
                   <a:srgbClr val="3333CC"/>
                 </a:solidFill>
@@ -7925,27 +7667,36 @@
               </a:lnSpc>
             </a:pPr>
             <a:r>
-              <a:rPr lang="en-US" sz="2800" dirty="0"/>
+              <a:rPr lang="en-US" dirty="0"/>
               <a:t>create-external-</a:t>
             </a:r>
             <a:r>
-              <a:rPr lang="en-US" sz="2800" dirty="0" err="1"/>
+              <a:rPr lang="en-US" dirty="0" err="1" smtClean="0"/>
               <a:t>derived.lisp</a:t>
             </a:r>
-            <a:endParaRPr lang="en-US" sz="2800" dirty="0"/>
+            <a:endParaRPr lang="en-US" dirty="0" smtClean="0"/>
+          </a:p>
+          <a:p>
+            <a:pPr lvl="2">
+              <a:lnSpc>
+                <a:spcPct val="90000"/>
+              </a:lnSpc>
+            </a:pPr>
+            <a:r>
+              <a:rPr lang="en-US" dirty="0" smtClean="0"/>
+              <a:t>external-</a:t>
+            </a:r>
+            <a:r>
+              <a:rPr lang="en-US" dirty="0" err="1" smtClean="0"/>
+              <a:t>templates.txt</a:t>
+            </a:r>
+            <a:endParaRPr lang="en-US" sz="2000" dirty="0"/>
           </a:p>
           <a:p>
             <a:pPr>
               <a:buFontTx/>
               <a:buNone/>
             </a:pPr>
-            <a:endParaRPr lang="en-US" sz="2400" dirty="0"/>
-          </a:p>
-          <a:p>
-            <a:pPr>
-              <a:buFontTx/>
-              <a:buNone/>
-            </a:pPr>
             <a:r>
               <a:rPr lang="en-US" dirty="0"/>
               <a:t>Detailed tutorial of the scripts:</a:t>
@@ -7953,18 +7704,73 @@
           </a:p>
           <a:p>
             <a:r>
-              <a:rPr lang="en-US" sz="2400" dirty="0">
+              <a:rPr lang="en-US" sz="2000" dirty="0">
+                <a:solidFill>
+                  <a:srgbClr val="3333CC"/>
+                </a:solidFill>
+                <a:hlinkClick r:id="rId2"/>
+              </a:rPr>
+              <a:t>http://obi-ontology.org/page/Tutorials#</a:t>
+            </a:r>
+            <a:r>
+              <a:rPr lang="en-US" sz="2000" dirty="0" smtClean="0">
+                <a:solidFill>
+                  <a:srgbClr val="3333CC"/>
+                </a:solidFill>
+                <a:hlinkClick r:id="rId2"/>
+              </a:rPr>
+              <a:t>MIREOT</a:t>
+            </a:r>
+            <a:r>
+              <a:rPr lang="en-US" sz="2000" dirty="0">
                 <a:solidFill>
                   <a:srgbClr val="3333CC"/>
                 </a:solidFill>
               </a:rPr>
-              <a:t>http://obi-ontology.org/page/Tutorials#MIREOT</a:t>
-            </a:r>
-            <a:endParaRPr lang="en-US" sz="2400" dirty="0">
+              <a:t/>
+            </a:r>
+            <a:br>
+              <a:rPr lang="en-US" sz="2000" dirty="0">
+                <a:solidFill>
+                  <a:srgbClr val="3333CC"/>
+                </a:solidFill>
+              </a:rPr>
+            </a:br>
+            <a:endParaRPr lang="en-US" sz="2000" dirty="0" smtClean="0">
               <a:solidFill>
                 <a:srgbClr val="3333CC"/>
               </a:solidFill>
-              <a:hlinkClick r:id="rId2"/>
+            </a:endParaRPr>
+          </a:p>
+          <a:p>
+            <a:pPr marL="0" indent="0">
+              <a:buNone/>
+            </a:pPr>
+            <a:r>
+              <a:rPr lang="en-US" sz="2000" dirty="0" smtClean="0"/>
+              <a:t>Mélanie Courtot, Frank Gibson, Allyson L. Lister, James Malone, Daniel </a:t>
+            </a:r>
+            <a:r>
+              <a:rPr lang="en-US" sz="2000" dirty="0" err="1" smtClean="0"/>
+              <a:t>Schober</a:t>
+            </a:r>
+            <a:r>
+              <a:rPr lang="en-US" sz="2000" dirty="0" smtClean="0"/>
+              <a:t>, Ryan R. Brinkman, and Alan Ruttenberg, </a:t>
+            </a:r>
+            <a:r>
+              <a:rPr lang="en-US" sz="2000" b="1" dirty="0" smtClean="0"/>
+              <a:t>MIREOT: The minimum information to reference an external ontology term</a:t>
+            </a:r>
+            <a:r>
+              <a:rPr lang="en-US" sz="2000" dirty="0" smtClean="0"/>
+              <a:t>. Applied Ontology, Vol. 6, Nr. 1 (2011) , p. 23-33</a:t>
+            </a:r>
+            <a:endParaRPr lang="en-US" sz="2000" dirty="0">
+              <a:solidFill>
+                <a:srgbClr val="3333CC"/>
+              </a:solidFill>
+              <a:hlinkClick r:id="rId3"/>
             </a:endParaRPr>
           </a:p>
         </p:txBody>
@@ -7977,7 +7783,7 @@
   <p:timing>
     <p:tnLst>
       <p:par>
-        <p:cTn id="1" dur="indefinite" restart="never" nodeType="tmRoot"/>
+        <p:cTn xmlns:p14="http://schemas.microsoft.com/office/powerpoint/2010/main" id="1" dur="indefinite" restart="never" nodeType="tmRoot"/>
       </p:par>
     </p:tnLst>
   </p:timing>
@@ -8022,18 +7828,18 @@
           <a:lstStyle/>
           <a:p>
             <a:r>
-              <a:rPr lang="en-US" sz="4000" dirty="0" err="1" smtClean="0"/>
-              <a:t>OntoFox</a:t>
-            </a:r>
-            <a:r>
-              <a:rPr lang="en-US" sz="4000" dirty="0" smtClean="0"/>
-              <a:t>: a Web Server for </a:t>
-            </a:r>
-            <a:r>
-              <a:rPr lang="en-US" sz="4000" dirty="0" err="1" smtClean="0"/>
+              <a:rPr lang="en-US" sz="3600" dirty="0" smtClean="0"/>
+              <a:t>OntoFox: </a:t>
+            </a:r>
+            <a:r>
+              <a:rPr lang="en-US" sz="3600" dirty="0" smtClean="0"/>
+              <a:t>A web application for </a:t>
+            </a:r>
+            <a:r>
+              <a:rPr lang="en-US" sz="3600" dirty="0" err="1" smtClean="0"/>
               <a:t>MIREOTing</a:t>
             </a:r>
-            <a:endParaRPr lang="en-US" sz="4000" dirty="0"/>
+            <a:endParaRPr lang="en-US" sz="3600" dirty="0"/>
           </a:p>
         </p:txBody>
       </p:sp>
@@ -8068,8 +7874,11 @@
               <a:rPr lang="en-US" sz="2800" dirty="0" smtClean="0">
                 <a:latin typeface="Calibri" pitchFamily="34" charset="0"/>
               </a:rPr>
-              <a:t>Based on the MIREOT principle</a:t>
-            </a:r>
+              <a:t>Adds MIREOT specifications and imports a variety of term-related information</a:t>
+            </a:r>
+            <a:endParaRPr lang="en-US" sz="2800" dirty="0" smtClean="0">
+              <a:latin typeface="Calibri" pitchFamily="34" charset="0"/>
+            </a:endParaRPr>
           </a:p>
           <a:p>
             <a:pPr>
@@ -8117,22 +7926,13 @@
               <a:rPr lang="en-US" sz="2800" dirty="0" smtClean="0">
                 <a:latin typeface="Calibri" pitchFamily="34" charset="0"/>
               </a:rPr>
-              <a:t>Easy to use</a:t>
-            </a:r>
-          </a:p>
-          <a:p>
-            <a:pPr>
-              <a:lnSpc>
-                <a:spcPct val="90000"/>
-              </a:lnSpc>
-              <a:buFont typeface="Wingdings" pitchFamily="-112" charset="2"/>
-              <a:buChar char="ü"/>
-            </a:pPr>
+              <a:t>No </a:t>
+            </a:r>
             <a:r>
               <a:rPr lang="en-US" sz="2800" dirty="0" smtClean="0">
                 <a:latin typeface="Calibri" pitchFamily="34" charset="0"/>
               </a:rPr>
-              <a:t>No programming needed for users</a:t>
+              <a:t>programming needed for users</a:t>
             </a:r>
           </a:p>
         </p:txBody>
@@ -8215,7 +8015,7 @@
           <a:blip r:embed="rId3" cstate="print">
             <a:extLst>
               <a:ext uri="{28A0092B-C50C-407E-A947-70E740481C1C}">
-                <a14:useLocalDpi xmlns:mc="http://schemas.openxmlformats.org/markup-compatibility/2006" xmlns:mv="urn:schemas-microsoft-com:mac:vml" xmlns:a14="http://schemas.microsoft.com/office/drawing/2010/main" xmlns="" val="0"/>
+                <a14:useLocalDpi xmlns:a14="http://schemas.microsoft.com/office/drawing/2010/main" val="0"/>
               </a:ext>
             </a:extLst>
           </a:blip>
@@ -8241,15 +8041,15 @@
           </a:ln>
           <a:effectLst/>
           <a:extLst>
-            <a:ext uri="{909E8E84-426E-40DD-AFC4-6F175D3DCCD1}">
-              <a14:hiddenFill xmlns:mc="http://schemas.openxmlformats.org/markup-compatibility/2006" xmlns:mv="urn:schemas-microsoft-com:mac:vml" xmlns:a14="http://schemas.microsoft.com/office/drawing/2010/main" xmlns="">
+            <a:ext uri="{909E8E84-426E-40dd-AFC4-6F175D3DCCD1}">
+              <a14:hiddenFill xmlns:a14="http://schemas.microsoft.com/office/drawing/2010/main">
                 <a:solidFill>
                   <a:schemeClr val="accent1"/>
                 </a:solidFill>
               </a14:hiddenFill>
             </a:ext>
-            <a:ext uri="{AF507438-7753-43E0-B8FC-AC1667EBCBE1}">
-              <a14:hiddenEffects xmlns:mc="http://schemas.openxmlformats.org/markup-compatibility/2006" xmlns:mv="urn:schemas-microsoft-com:mac:vml" xmlns:a14="http://schemas.microsoft.com/office/drawing/2010/main" xmlns="">
+            <a:ext uri="{AF507438-7753-43e0-B8FC-AC1667EBCBE1}">
+              <a14:hiddenEffects xmlns:a14="http://schemas.microsoft.com/office/drawing/2010/main">
                 <a:effectLst>
                   <a:outerShdw dist="35921" dir="2700000" algn="ctr" rotWithShape="0">
                     <a:schemeClr val="bg2"/>
@@ -8272,7 +8072,7 @@
           <a:blip r:embed="rId3" cstate="print">
             <a:extLst>
               <a:ext uri="{28A0092B-C50C-407E-A947-70E740481C1C}">
-                <a14:useLocalDpi xmlns:mc="http://schemas.openxmlformats.org/markup-compatibility/2006" xmlns:mv="urn:schemas-microsoft-com:mac:vml" xmlns:a14="http://schemas.microsoft.com/office/drawing/2010/main" xmlns="" val="0"/>
+                <a14:useLocalDpi xmlns:a14="http://schemas.microsoft.com/office/drawing/2010/main" val="0"/>
               </a:ext>
             </a:extLst>
           </a:blip>
@@ -8293,15 +8093,15 @@
           </a:ln>
           <a:effectLst/>
           <a:extLst>
-            <a:ext uri="{909E8E84-426E-40DD-AFC4-6F175D3DCCD1}">
-              <a14:hiddenFill xmlns:mc="http://schemas.openxmlformats.org/markup-compatibility/2006" xmlns:mv="urn:schemas-microsoft-com:mac:vml" xmlns:a14="http://schemas.microsoft.com/office/drawing/2010/main" xmlns="">
+            <a:ext uri="{909E8E84-426E-40dd-AFC4-6F175D3DCCD1}">
+              <a14:hiddenFill xmlns:a14="http://schemas.microsoft.com/office/drawing/2010/main">
                 <a:solidFill>
                   <a:schemeClr val="accent1"/>
                 </a:solidFill>
               </a14:hiddenFill>
             </a:ext>
-            <a:ext uri="{91240B29-F687-4F45-9708-019B960494DF}">
-              <a14:hiddenLine xmlns:mc="http://schemas.openxmlformats.org/markup-compatibility/2006" xmlns:mv="urn:schemas-microsoft-com:mac:vml" xmlns:a14="http://schemas.microsoft.com/office/drawing/2010/main" xmlns="" w="9525">
+            <a:ext uri="{91240B29-F687-4f45-9708-019B960494DF}">
+              <a14:hiddenLine xmlns:a14="http://schemas.microsoft.com/office/drawing/2010/main" w="9525">
                 <a:solidFill>
                   <a:schemeClr val="tx1"/>
                 </a:solidFill>
@@ -8310,8 +8110,8 @@
                 <a:tailEnd/>
               </a14:hiddenLine>
             </a:ext>
-            <a:ext uri="{AF507438-7753-43E0-B8FC-AC1667EBCBE1}">
-              <a14:hiddenEffects xmlns:mc="http://schemas.openxmlformats.org/markup-compatibility/2006" xmlns:mv="urn:schemas-microsoft-com:mac:vml" xmlns:a14="http://schemas.microsoft.com/office/drawing/2010/main" xmlns="">
+            <a:ext uri="{AF507438-7753-43e0-B8FC-AC1667EBCBE1}">
+              <a14:hiddenEffects xmlns:a14="http://schemas.microsoft.com/office/drawing/2010/main">
                 <a:effectLst>
                   <a:outerShdw dist="35921" dir="2700000" algn="ctr" rotWithShape="0">
                     <a:schemeClr val="bg2"/>

</xml_diff>

<commit_message>
made some changes based on today's discussion
</commit_message>
<xml_diff>
--- a/docs/presentations/OBI tutorial July 2011 ICBO/MIREOT-View.pptx
+++ b/docs/presentations/OBI tutorial July 2011 ICBO/MIREOT-View.pptx
@@ -240,6 +240,7 @@
           <a:p>
             <a:fld id="{CFB105CA-0A4D-47B7-B640-04DED94D16E1}" type="datetimeFigureOut">
               <a:rPr lang="en-US" smtClean="0"/>
+              <a:pPr/>
               <a:t>7/25/2011</a:t>
             </a:fld>
             <a:endParaRPr lang="en-US"/>
@@ -401,6 +402,7 @@
           <a:p>
             <a:fld id="{8136CA31-5C79-4D56-BCE3-4411BF836B65}" type="slidenum">
               <a:rPr lang="en-US" smtClean="0"/>
+              <a:pPr/>
               <a:t>‹#›</a:t>
             </a:fld>
             <a:endParaRPr lang="en-US"/>
@@ -572,6 +574,7 @@
           <a:p>
             <a:fld id="{8136CA31-5C79-4D56-BCE3-4411BF836B65}" type="slidenum">
               <a:rPr lang="en-US" smtClean="0"/>
+              <a:pPr/>
               <a:t>1</a:t>
             </a:fld>
             <a:endParaRPr lang="en-US"/>
@@ -653,6 +656,7 @@
           <a:p>
             <a:fld id="{8136CA31-5C79-4D56-BCE3-4411BF836B65}" type="slidenum">
               <a:rPr lang="en-US" smtClean="0"/>
+              <a:pPr/>
               <a:t>10</a:t>
             </a:fld>
             <a:endParaRPr lang="en-US"/>
@@ -734,6 +738,7 @@
           <a:p>
             <a:fld id="{8136CA31-5C79-4D56-BCE3-4411BF836B65}" type="slidenum">
               <a:rPr lang="en-US" smtClean="0"/>
+              <a:pPr/>
               <a:t>11</a:t>
             </a:fld>
             <a:endParaRPr lang="en-US"/>
@@ -815,6 +820,7 @@
           <a:p>
             <a:fld id="{8136CA31-5C79-4D56-BCE3-4411BF836B65}" type="slidenum">
               <a:rPr lang="en-US" smtClean="0"/>
+              <a:pPr/>
               <a:t>12</a:t>
             </a:fld>
             <a:endParaRPr lang="en-US"/>
@@ -896,6 +902,7 @@
           <a:p>
             <a:fld id="{8136CA31-5C79-4D56-BCE3-4411BF836B65}" type="slidenum">
               <a:rPr lang="en-US" smtClean="0"/>
+              <a:pPr/>
               <a:t>13</a:t>
             </a:fld>
             <a:endParaRPr lang="en-US"/>
@@ -977,6 +984,7 @@
           <a:p>
             <a:fld id="{8136CA31-5C79-4D56-BCE3-4411BF836B65}" type="slidenum">
               <a:rPr lang="en-US" smtClean="0"/>
+              <a:pPr/>
               <a:t>14</a:t>
             </a:fld>
             <a:endParaRPr lang="en-US"/>
@@ -1058,6 +1066,7 @@
           <a:p>
             <a:fld id="{8136CA31-5C79-4D56-BCE3-4411BF836B65}" type="slidenum">
               <a:rPr lang="en-US" smtClean="0"/>
+              <a:pPr/>
               <a:t>15</a:t>
             </a:fld>
             <a:endParaRPr lang="en-US"/>
@@ -1139,6 +1148,7 @@
           <a:p>
             <a:fld id="{8136CA31-5C79-4D56-BCE3-4411BF836B65}" type="slidenum">
               <a:rPr lang="en-US" smtClean="0"/>
+              <a:pPr/>
               <a:t>16</a:t>
             </a:fld>
             <a:endParaRPr lang="en-US"/>
@@ -1220,6 +1230,7 @@
           <a:p>
             <a:fld id="{8136CA31-5C79-4D56-BCE3-4411BF836B65}" type="slidenum">
               <a:rPr lang="en-US" smtClean="0"/>
+              <a:pPr/>
               <a:t>17</a:t>
             </a:fld>
             <a:endParaRPr lang="en-US"/>
@@ -1301,6 +1312,7 @@
           <a:p>
             <a:fld id="{8136CA31-5C79-4D56-BCE3-4411BF836B65}" type="slidenum">
               <a:rPr lang="en-US" smtClean="0"/>
+              <a:pPr/>
               <a:t>18</a:t>
             </a:fld>
             <a:endParaRPr lang="en-US"/>
@@ -1382,6 +1394,7 @@
           <a:p>
             <a:fld id="{8136CA31-5C79-4D56-BCE3-4411BF836B65}" type="slidenum">
               <a:rPr lang="en-US" smtClean="0"/>
+              <a:pPr/>
               <a:t>19</a:t>
             </a:fld>
             <a:endParaRPr lang="en-US"/>
@@ -1463,6 +1476,7 @@
           <a:p>
             <a:fld id="{8136CA31-5C79-4D56-BCE3-4411BF836B65}" type="slidenum">
               <a:rPr lang="en-US" smtClean="0"/>
+              <a:pPr/>
               <a:t>2</a:t>
             </a:fld>
             <a:endParaRPr lang="en-US"/>
@@ -1544,6 +1558,7 @@
           <a:p>
             <a:fld id="{8136CA31-5C79-4D56-BCE3-4411BF836B65}" type="slidenum">
               <a:rPr lang="en-US" smtClean="0"/>
+              <a:pPr/>
               <a:t>3</a:t>
             </a:fld>
             <a:endParaRPr lang="en-US"/>
@@ -1625,6 +1640,7 @@
           <a:p>
             <a:fld id="{8136CA31-5C79-4D56-BCE3-4411BF836B65}" type="slidenum">
               <a:rPr lang="en-US" smtClean="0"/>
+              <a:pPr/>
               <a:t>4</a:t>
             </a:fld>
             <a:endParaRPr lang="en-US"/>
@@ -1706,6 +1722,7 @@
           <a:p>
             <a:fld id="{8136CA31-5C79-4D56-BCE3-4411BF836B65}" type="slidenum">
               <a:rPr lang="en-US" smtClean="0"/>
+              <a:pPr/>
               <a:t>5</a:t>
             </a:fld>
             <a:endParaRPr lang="en-US"/>
@@ -1787,6 +1804,7 @@
           <a:p>
             <a:fld id="{8136CA31-5C79-4D56-BCE3-4411BF836B65}" type="slidenum">
               <a:rPr lang="en-US" smtClean="0"/>
+              <a:pPr/>
               <a:t>6</a:t>
             </a:fld>
             <a:endParaRPr lang="en-US"/>
@@ -1868,6 +1886,7 @@
           <a:p>
             <a:fld id="{8136CA31-5C79-4D56-BCE3-4411BF836B65}" type="slidenum">
               <a:rPr lang="en-US" smtClean="0"/>
+              <a:pPr/>
               <a:t>7</a:t>
             </a:fld>
             <a:endParaRPr lang="en-US"/>
@@ -1949,6 +1968,7 @@
           <a:p>
             <a:fld id="{8136CA31-5C79-4D56-BCE3-4411BF836B65}" type="slidenum">
               <a:rPr lang="en-US" smtClean="0"/>
+              <a:pPr/>
               <a:t>8</a:t>
             </a:fld>
             <a:endParaRPr lang="en-US"/>
@@ -2030,6 +2050,7 @@
           <a:p>
             <a:fld id="{8136CA31-5C79-4D56-BCE3-4411BF836B65}" type="slidenum">
               <a:rPr lang="en-US" smtClean="0"/>
+              <a:pPr/>
               <a:t>9</a:t>
             </a:fld>
             <a:endParaRPr lang="en-US"/>
@@ -4778,7 +4799,7 @@
           <a:blip r:embed="rId13" cstate="print">
             <a:extLst>
               <a:ext uri="{28A0092B-C50C-407E-A947-70E740481C1C}">
-                <a14:useLocalDpi xmlns="" xmlns:a14="http://schemas.microsoft.com/office/drawing/2010/main" val="0"/>
+                <a14:useLocalDpi xmlns:a14="http://schemas.microsoft.com/office/drawing/2010/main" xmlns="" val="0"/>
               </a:ext>
             </a:extLst>
           </a:blip>
@@ -6209,107 +6230,13 @@
       </p:sp>
       <p:grpSp>
         <p:nvGrpSpPr>
-          <p:cNvPr id="12" name="Group 11"/>
-          <p:cNvGrpSpPr/>
-          <p:nvPr/>
-        </p:nvGrpSpPr>
-        <p:grpSpPr>
-          <a:xfrm>
-            <a:off x="0" y="1752600"/>
-            <a:ext cx="3590636" cy="3505200"/>
-            <a:chOff x="76200" y="2819400"/>
-            <a:chExt cx="3590636" cy="3505200"/>
-          </a:xfrm>
-        </p:grpSpPr>
-        <p:pic>
-          <p:nvPicPr>
-            <p:cNvPr id="12290" name="Picture 2"/>
-            <p:cNvPicPr>
-              <a:picLocks noChangeAspect="1" noChangeArrowheads="1"/>
-            </p:cNvPicPr>
-            <p:nvPr/>
-          </p:nvPicPr>
-          <p:blipFill>
-            <a:blip r:embed="rId3" cstate="print"/>
-            <a:srcRect/>
-            <a:stretch>
-              <a:fillRect/>
-            </a:stretch>
-          </p:blipFill>
-          <p:spPr bwMode="auto">
-            <a:xfrm>
-              <a:off x="76200" y="2819400"/>
-              <a:ext cx="3570413" cy="3505200"/>
-            </a:xfrm>
-            <a:prstGeom prst="rect">
-              <a:avLst/>
-            </a:prstGeom>
-            <a:noFill/>
-            <a:ln w="9525">
-              <a:noFill/>
-              <a:miter lim="800000"/>
-              <a:headEnd/>
-              <a:tailEnd/>
-            </a:ln>
-            <a:effectLst/>
-          </p:spPr>
-        </p:pic>
-        <p:sp>
-          <p:nvSpPr>
-            <p:cNvPr id="6" name="Rectangle 5"/>
-            <p:cNvSpPr/>
-            <p:nvPr/>
-          </p:nvSpPr>
-          <p:spPr>
-            <a:xfrm>
-              <a:off x="2142836" y="3382820"/>
-              <a:ext cx="1524000" cy="381000"/>
-            </a:xfrm>
-            <a:prstGeom prst="rect">
-              <a:avLst/>
-            </a:prstGeom>
-            <a:noFill/>
-            <a:ln>
-              <a:solidFill>
-                <a:srgbClr val="FF0000"/>
-              </a:solidFill>
-            </a:ln>
-          </p:spPr>
-          <p:style>
-            <a:lnRef idx="2">
-              <a:schemeClr val="accent1">
-                <a:shade val="50000"/>
-              </a:schemeClr>
-            </a:lnRef>
-            <a:fillRef idx="1">
-              <a:schemeClr val="accent1"/>
-            </a:fillRef>
-            <a:effectRef idx="0">
-              <a:schemeClr val="accent1"/>
-            </a:effectRef>
-            <a:fontRef idx="minor">
-              <a:schemeClr val="lt1"/>
-            </a:fontRef>
-          </p:style>
-          <p:txBody>
-            <a:bodyPr rtlCol="0" anchor="ctr"/>
-            <a:lstStyle/>
-            <a:p>
-              <a:pPr algn="ctr"/>
-              <a:endParaRPr lang="en-US"/>
-            </a:p>
-          </p:txBody>
-        </p:sp>
-      </p:grpSp>
-      <p:grpSp>
-        <p:nvGrpSpPr>
           <p:cNvPr id="19" name="Group 18"/>
           <p:cNvGrpSpPr/>
           <p:nvPr/>
         </p:nvGrpSpPr>
         <p:grpSpPr>
           <a:xfrm>
-            <a:off x="3657600" y="4969133"/>
+            <a:off x="3698277" y="4969133"/>
             <a:ext cx="2931123" cy="1279267"/>
             <a:chOff x="3810000" y="5029200"/>
             <a:chExt cx="2931123" cy="1279267"/>
@@ -6427,16 +6354,13 @@
       <p:cxnSp>
         <p:nvCxnSpPr>
           <p:cNvPr id="37" name="Straight Arrow Connector 36"/>
-          <p:cNvCxnSpPr>
-            <a:stCxn id="7" idx="0"/>
-            <a:endCxn id="4" idx="2"/>
-          </p:cNvCxnSpPr>
+          <p:cNvCxnSpPr/>
           <p:nvPr/>
         </p:nvCxnSpPr>
         <p:spPr>
           <a:xfrm rot="16200000" flipV="1">
-            <a:off x="4330815" y="4318908"/>
-            <a:ext cx="1295400" cy="5049"/>
+            <a:off x="4314537" y="4323770"/>
+            <a:ext cx="1295401" cy="4"/>
           </a:xfrm>
           <a:prstGeom prst="straightConnector1">
             <a:avLst/>
@@ -6544,7 +6468,6 @@
         <p:nvCxnSpPr>
           <p:cNvPr id="43" name="Elbow Connector 42"/>
           <p:cNvCxnSpPr>
-            <a:stCxn id="12290" idx="0"/>
             <a:endCxn id="41" idx="0"/>
           </p:cNvCxnSpPr>
           <p:nvPr/>
@@ -6589,7 +6512,7 @@
         </p:nvSpPr>
         <p:spPr>
           <a:xfrm>
-            <a:off x="3124200" y="1230868"/>
+            <a:off x="3124200" y="1258576"/>
             <a:ext cx="582211" cy="369332"/>
           </a:xfrm>
           <a:prstGeom prst="rect">
@@ -6694,7 +6617,7 @@
         </p:nvSpPr>
         <p:spPr>
           <a:xfrm>
-            <a:off x="1219200" y="5334000"/>
+            <a:off x="1371600" y="5715000"/>
             <a:ext cx="1116011" cy="461665"/>
           </a:xfrm>
           <a:prstGeom prst="rect">
@@ -6742,7 +6665,7 @@
           <a:p>
             <a:r>
               <a:rPr lang="en-US" sz="1800" dirty="0" smtClean="0">
-                <a:hlinkClick r:id="rId4"/>
+                <a:hlinkClick r:id="rId3"/>
               </a:rPr>
               <a:t>http://ontofox.hegroup.org/ontofoxview/index2.php</a:t>
             </a:r>
@@ -6751,6 +6674,85 @@
               <a:t> </a:t>
             </a:r>
             <a:endParaRPr lang="en-US" sz="1800" dirty="0"/>
+          </a:p>
+        </p:txBody>
+      </p:sp>
+      <p:pic>
+        <p:nvPicPr>
+          <p:cNvPr id="1027" name="Picture 3"/>
+          <p:cNvPicPr>
+            <a:picLocks noChangeAspect="1" noChangeArrowheads="1"/>
+          </p:cNvPicPr>
+          <p:nvPr/>
+        </p:nvPicPr>
+        <p:blipFill>
+          <a:blip r:embed="rId4"/>
+          <a:srcRect/>
+          <a:stretch>
+            <a:fillRect/>
+          </a:stretch>
+        </p:blipFill>
+        <p:spPr bwMode="auto">
+          <a:xfrm>
+            <a:off x="1" y="1600200"/>
+            <a:ext cx="3782272" cy="4114799"/>
+          </a:xfrm>
+          <a:prstGeom prst="rect">
+            <a:avLst/>
+          </a:prstGeom>
+          <a:noFill/>
+          <a:ln w="9525">
+            <a:noFill/>
+            <a:miter lim="800000"/>
+            <a:headEnd/>
+            <a:tailEnd/>
+          </a:ln>
+          <a:effectLst/>
+        </p:spPr>
+      </p:pic>
+      <p:sp>
+        <p:nvSpPr>
+          <p:cNvPr id="6" name="Rectangle 5"/>
+          <p:cNvSpPr/>
+          <p:nvPr/>
+        </p:nvSpPr>
+        <p:spPr>
+          <a:xfrm>
+            <a:off x="2362200" y="1981200"/>
+            <a:ext cx="1371600" cy="304800"/>
+          </a:xfrm>
+          <a:prstGeom prst="rect">
+            <a:avLst/>
+          </a:prstGeom>
+          <a:noFill/>
+          <a:ln>
+            <a:solidFill>
+              <a:srgbClr val="FF0000"/>
+            </a:solidFill>
+          </a:ln>
+        </p:spPr>
+        <p:style>
+          <a:lnRef idx="2">
+            <a:schemeClr val="accent1">
+              <a:shade val="50000"/>
+            </a:schemeClr>
+          </a:lnRef>
+          <a:fillRef idx="1">
+            <a:schemeClr val="accent1"/>
+          </a:fillRef>
+          <a:effectRef idx="0">
+            <a:schemeClr val="accent1"/>
+          </a:effectRef>
+          <a:fontRef idx="minor">
+            <a:schemeClr val="lt1"/>
+          </a:fontRef>
+        </p:style>
+        <p:txBody>
+          <a:bodyPr rtlCol="0" anchor="ctr"/>
+          <a:lstStyle/>
+          <a:p>
+            <a:pPr algn="ctr"/>
+            <a:endParaRPr lang="en-US"/>
           </a:p>
         </p:txBody>
       </p:sp>
@@ -6803,7 +6805,7 @@
         </p:blipFill>
         <p:spPr bwMode="auto">
           <a:xfrm>
-            <a:off x="1" y="2514601"/>
+            <a:off x="1" y="3780848"/>
             <a:ext cx="4724399" cy="791152"/>
           </a:xfrm>
           <a:prstGeom prst="rect">
@@ -6854,7 +6856,7 @@
         </p:nvSpPr>
         <p:spPr>
           <a:xfrm>
-            <a:off x="3807132" y="3393214"/>
+            <a:off x="3807132" y="3200400"/>
             <a:ext cx="2104872" cy="461665"/>
           </a:xfrm>
           <a:prstGeom prst="rect">
@@ -6888,7 +6890,7 @@
         </p:nvGrpSpPr>
         <p:grpSpPr>
           <a:xfrm>
-            <a:off x="1981200" y="4343400"/>
+            <a:off x="2248244" y="4567535"/>
             <a:ext cx="3161956" cy="1833265"/>
             <a:chOff x="3810000" y="5029200"/>
             <a:chExt cx="3161956" cy="1833265"/>
@@ -6948,19 +6950,15 @@
             <a:p>
               <a:r>
                 <a:rPr lang="en-US" sz="1800" dirty="0" smtClean="0"/>
-                <a:t>1. Add FGED alternative term</a:t>
+                <a:t>1</a:t>
               </a:r>
-            </a:p>
-            <a:p>
               <a:r>
                 <a:rPr lang="en-US" sz="1800" dirty="0" smtClean="0"/>
-                <a:t>    property to FGED terms</a:t>
+                <a:t>. </a:t>
               </a:r>
-            </a:p>
-            <a:p>
               <a:r>
                 <a:rPr lang="en-US" sz="1800" dirty="0" smtClean="0"/>
-                <a:t>2. Extract terms with ‘FGED </a:t>
+                <a:t>Extract terms with ‘FGED </a:t>
               </a:r>
             </a:p>
             <a:p>
@@ -6972,9 +6970,33 @@
             <a:p>
               <a:r>
                 <a:rPr lang="en-US" sz="1800" dirty="0" smtClean="0"/>
-                <a:t>    axioms related to them</a:t>
+                <a:t>    axioms related to </a:t>
               </a:r>
-              <a:endParaRPr lang="en-US" sz="1800" dirty="0"/>
+              <a:r>
+                <a:rPr lang="en-US" sz="1800" dirty="0" smtClean="0"/>
+                <a:t>them</a:t>
+              </a:r>
+            </a:p>
+            <a:p>
+              <a:r>
+                <a:rPr lang="en-US" sz="1800" dirty="0" smtClean="0"/>
+                <a:t>2. </a:t>
+              </a:r>
+              <a:r>
+                <a:rPr lang="en-US" sz="1800" dirty="0" smtClean="0"/>
+                <a:t>Add FGED alternative term</a:t>
+              </a:r>
+            </a:p>
+            <a:p>
+              <a:r>
+                <a:rPr lang="en-US" sz="1800" dirty="0" smtClean="0"/>
+                <a:t>    property to FGED </a:t>
+              </a:r>
+              <a:r>
+                <a:rPr lang="en-US" sz="1800" dirty="0" smtClean="0"/>
+                <a:t>terms</a:t>
+              </a:r>
+              <a:endParaRPr lang="en-US" sz="1800" dirty="0" smtClean="0"/>
             </a:p>
           </p:txBody>
         </p:sp>
@@ -7017,45 +7039,6 @@
       </p:sp>
       <p:cxnSp>
         <p:nvCxnSpPr>
-          <p:cNvPr id="37" name="Straight Arrow Connector 36"/>
-          <p:cNvCxnSpPr>
-            <a:stCxn id="7" idx="0"/>
-            <a:endCxn id="4" idx="2"/>
-          </p:cNvCxnSpPr>
-          <p:nvPr/>
-        </p:nvCxnSpPr>
-        <p:spPr>
-          <a:xfrm rot="5400000" flipH="1" flipV="1">
-            <a:off x="3859083" y="3342916"/>
-            <a:ext cx="488521" cy="1512449"/>
-          </a:xfrm>
-          <a:prstGeom prst="straightConnector1">
-            <a:avLst/>
-          </a:prstGeom>
-          <a:ln w="19050">
-            <a:solidFill>
-              <a:schemeClr val="accent4"/>
-            </a:solidFill>
-            <a:tailEnd type="arrow"/>
-          </a:ln>
-        </p:spPr>
-        <p:style>
-          <a:lnRef idx="1">
-            <a:schemeClr val="accent1"/>
-          </a:lnRef>
-          <a:fillRef idx="0">
-            <a:schemeClr val="accent1"/>
-          </a:fillRef>
-          <a:effectRef idx="0">
-            <a:schemeClr val="accent1"/>
-          </a:effectRef>
-          <a:fontRef idx="minor">
-            <a:schemeClr val="tx1"/>
-          </a:fontRef>
-        </p:style>
-      </p:cxnSp>
-      <p:cxnSp>
-        <p:nvCxnSpPr>
           <p:cNvPr id="39" name="Straight Arrow Connector 38"/>
           <p:cNvCxnSpPr>
             <a:stCxn id="4" idx="3"/>
@@ -7064,9 +7047,9 @@
           <p:nvPr/>
         </p:nvCxnSpPr>
         <p:spPr>
-          <a:xfrm flipV="1">
-            <a:off x="5912004" y="3623096"/>
-            <a:ext cx="148058" cy="951"/>
+          <a:xfrm>
+            <a:off x="5912004" y="3431233"/>
+            <a:ext cx="148058" cy="191863"/>
           </a:xfrm>
           <a:prstGeom prst="straightConnector1">
             <a:avLst/>
@@ -7163,7 +7146,7 @@
           </p:nvSpPr>
           <p:spPr>
             <a:xfrm>
-              <a:off x="4249172" y="1820174"/>
+              <a:off x="4249172" y="1752600"/>
               <a:ext cx="1245854" cy="707886"/>
             </a:xfrm>
             <a:prstGeom prst="rect">
@@ -7205,8 +7188,8 @@
         </p:nvCxnSpPr>
         <p:spPr>
           <a:xfrm rot="16200000" flipV="1">
-            <a:off x="4441099" y="2974745"/>
-            <a:ext cx="836918" cy="20"/>
+            <a:off x="4537506" y="2878338"/>
+            <a:ext cx="644104" cy="20"/>
           </a:xfrm>
           <a:prstGeom prst="straightConnector1">
             <a:avLst/>
@@ -7241,7 +7224,7 @@
         </p:nvSpPr>
         <p:spPr>
           <a:xfrm>
-            <a:off x="4922320" y="2678668"/>
+            <a:off x="4922320" y="2554069"/>
             <a:ext cx="1097480" cy="646331"/>
           </a:xfrm>
           <a:prstGeom prst="rect">
@@ -7273,14 +7256,15 @@
         <p:nvCxnSpPr>
           <p:cNvPr id="22" name="Shape 21"/>
           <p:cNvCxnSpPr>
+            <a:stCxn id="3" idx="0"/>
             <a:endCxn id="4" idx="1"/>
           </p:cNvCxnSpPr>
           <p:nvPr/>
         </p:nvCxnSpPr>
         <p:spPr>
-          <a:xfrm rot="16200000" flipH="1">
-            <a:off x="2934755" y="2751669"/>
-            <a:ext cx="271247" cy="1473507"/>
+          <a:xfrm rot="5400000" flipH="1" flipV="1">
+            <a:off x="2909859" y="2883576"/>
+            <a:ext cx="349615" cy="1444931"/>
           </a:xfrm>
           <a:prstGeom prst="bentConnector2">
             <a:avLst/>
@@ -7394,7 +7378,7 @@
         </p:nvSpPr>
         <p:spPr>
           <a:xfrm>
-            <a:off x="5486400" y="5257800"/>
+            <a:off x="6324600" y="5410200"/>
             <a:ext cx="2743200" cy="646331"/>
           </a:xfrm>
           <a:prstGeom prst="rect">
@@ -7424,6 +7408,143 @@
           </a:p>
         </p:txBody>
       </p:sp>
+      <p:pic>
+        <p:nvPicPr>
+          <p:cNvPr id="23" name="Picture 2"/>
+          <p:cNvPicPr>
+            <a:picLocks noChangeAspect="1" noChangeArrowheads="1"/>
+          </p:cNvPicPr>
+          <p:nvPr/>
+        </p:nvPicPr>
+        <p:blipFill>
+          <a:blip r:embed="rId6" cstate="print"/>
+          <a:srcRect/>
+          <a:stretch>
+            <a:fillRect/>
+          </a:stretch>
+        </p:blipFill>
+        <p:spPr bwMode="auto">
+          <a:xfrm>
+            <a:off x="0" y="990600"/>
+            <a:ext cx="2286000" cy="2590800"/>
+          </a:xfrm>
+          <a:prstGeom prst="rect">
+            <a:avLst/>
+          </a:prstGeom>
+          <a:noFill/>
+          <a:ln w="9525">
+            <a:noFill/>
+            <a:miter lim="800000"/>
+            <a:headEnd/>
+            <a:tailEnd/>
+          </a:ln>
+          <a:effectLst/>
+        </p:spPr>
+      </p:pic>
+      <p:sp>
+        <p:nvSpPr>
+          <p:cNvPr id="26" name="TextBox 25"/>
+          <p:cNvSpPr txBox="1"/>
+          <p:nvPr/>
+        </p:nvSpPr>
+        <p:spPr>
+          <a:xfrm>
+            <a:off x="3017661" y="1884216"/>
+            <a:ext cx="582211" cy="369332"/>
+          </a:xfrm>
+          <a:prstGeom prst="rect">
+            <a:avLst/>
+          </a:prstGeom>
+          <a:noFill/>
+        </p:spPr>
+        <p:txBody>
+          <a:bodyPr wrap="square" rtlCol="0">
+            <a:spAutoFit/>
+          </a:bodyPr>
+          <a:lstStyle/>
+          <a:p>
+            <a:r>
+              <a:rPr lang="en-US" sz="1800" dirty="0" smtClean="0"/>
+              <a:t>load</a:t>
+            </a:r>
+            <a:endParaRPr lang="en-US" sz="1800" dirty="0"/>
+          </a:p>
+        </p:txBody>
+      </p:sp>
+      <p:cxnSp>
+        <p:nvCxnSpPr>
+          <p:cNvPr id="29" name="Shape 28"/>
+          <p:cNvCxnSpPr>
+            <a:stCxn id="11" idx="3"/>
+          </p:cNvCxnSpPr>
+          <p:nvPr/>
+        </p:nvCxnSpPr>
+        <p:spPr>
+          <a:xfrm flipV="1">
+            <a:off x="5410200" y="3657601"/>
+            <a:ext cx="76200" cy="2004535"/>
+          </a:xfrm>
+          <a:prstGeom prst="bentConnector2">
+            <a:avLst/>
+          </a:prstGeom>
+          <a:ln w="19050">
+            <a:solidFill>
+              <a:schemeClr val="tx1"/>
+            </a:solidFill>
+            <a:tailEnd type="arrow"/>
+          </a:ln>
+        </p:spPr>
+        <p:style>
+          <a:lnRef idx="1">
+            <a:schemeClr val="accent1"/>
+          </a:lnRef>
+          <a:fillRef idx="0">
+            <a:schemeClr val="accent1"/>
+          </a:fillRef>
+          <a:effectRef idx="0">
+            <a:schemeClr val="accent1"/>
+          </a:effectRef>
+          <a:fontRef idx="minor">
+            <a:schemeClr val="tx1"/>
+          </a:fontRef>
+        </p:style>
+      </p:cxnSp>
+      <p:cxnSp>
+        <p:nvCxnSpPr>
+          <p:cNvPr id="32" name="Straight Arrow Connector 31"/>
+          <p:cNvCxnSpPr/>
+          <p:nvPr/>
+        </p:nvCxnSpPr>
+        <p:spPr>
+          <a:xfrm>
+            <a:off x="2276764" y="2209800"/>
+            <a:ext cx="2057400" cy="1588"/>
+          </a:xfrm>
+          <a:prstGeom prst="straightConnector1">
+            <a:avLst/>
+          </a:prstGeom>
+          <a:ln w="19050">
+            <a:solidFill>
+              <a:schemeClr val="tx1"/>
+            </a:solidFill>
+            <a:tailEnd type="arrow"/>
+          </a:ln>
+        </p:spPr>
+        <p:style>
+          <a:lnRef idx="1">
+            <a:schemeClr val="accent1"/>
+          </a:lnRef>
+          <a:fillRef idx="0">
+            <a:schemeClr val="accent1"/>
+          </a:fillRef>
+          <a:effectRef idx="0">
+            <a:schemeClr val="accent1"/>
+          </a:effectRef>
+          <a:fontRef idx="minor">
+            <a:schemeClr val="tx1"/>
+          </a:fontRef>
+        </p:style>
+      </p:cxnSp>
     </p:spTree>
   </p:cSld>
   <p:clrMapOvr>
@@ -7509,7 +7630,11 @@
             <a:pPr lvl="1"/>
             <a:r>
               <a:rPr lang="en-US" dirty="0" smtClean="0"/>
-              <a:t>keep information in obi.owl</a:t>
+              <a:t>Keep </a:t>
+            </a:r>
+            <a:r>
+              <a:rPr lang="en-US" dirty="0" smtClean="0"/>
+              <a:t>information in obi.owl</a:t>
             </a:r>
           </a:p>
           <a:p>
@@ -7527,6 +7652,13 @@
   <p:clrMapOvr>
     <a:masterClrMapping/>
   </p:clrMapOvr>
+  <p:timing>
+    <p:tnLst>
+      <p:par>
+        <p:cTn id="1" dur="indefinite" restart="never" nodeType="tmRoot"/>
+      </p:par>
+    </p:tnLst>
+  </p:timing>
 </p:sld>
 </file>
 
@@ -8308,14 +8440,22 @@
             </a:r>
             <a:r>
               <a:rPr lang="en-US" dirty="0" smtClean="0"/>
-              <a:t>other ontology</a:t>
+              <a:t>source </a:t>
+            </a:r>
+            <a:r>
+              <a:rPr lang="en-US" dirty="0" smtClean="0"/>
+              <a:t>ontology</a:t>
             </a:r>
             <a:endParaRPr lang="en-US" dirty="0"/>
           </a:p>
           <a:p>
             <a:r>
               <a:rPr lang="en-US" dirty="0" smtClean="0"/>
-              <a:t>Superclass of the class in your ontology</a:t>
+              <a:t>Superclass of the class in your </a:t>
+            </a:r>
+            <a:r>
+              <a:rPr lang="en-US" dirty="0" smtClean="0"/>
+              <a:t>ontology</a:t>
             </a:r>
             <a:endParaRPr lang="en-US" dirty="0"/>
           </a:p>
@@ -8572,13 +8712,8 @@
             <a:pPr lvl="1"/>
             <a:r>
               <a:rPr lang="en-US" dirty="0" smtClean="0"/>
-              <a:t>Web-based tool aimed to be easily used by all </a:t>
-            </a:r>
-            <a:r>
-              <a:rPr lang="en-US" dirty="0" smtClean="0"/>
-              <a:t>developers</a:t>
-            </a:r>
-            <a:endParaRPr lang="en-US" dirty="0" smtClean="0"/>
+              <a:t>Web-based tool aimed to be easily used by all developers</a:t>
+            </a:r>
           </a:p>
         </p:txBody>
       </p:sp>
@@ -10056,7 +10191,7 @@
           <a:blip r:embed="rId4" cstate="print">
             <a:extLst>
               <a:ext uri="{28A0092B-C50C-407E-A947-70E740481C1C}">
-                <a14:useLocalDpi xmlns="" xmlns:a14="http://schemas.microsoft.com/office/drawing/2010/main" val="0"/>
+                <a14:useLocalDpi xmlns:a14="http://schemas.microsoft.com/office/drawing/2010/main" xmlns="" val="0"/>
               </a:ext>
             </a:extLst>
           </a:blip>
@@ -10083,14 +10218,14 @@
           <a:effectLst/>
           <a:extLst>
             <a:ext uri="{909E8E84-426E-40dd-AFC4-6F175D3DCCD1}">
-              <a14:hiddenFill xmlns="" xmlns:a14="http://schemas.microsoft.com/office/drawing/2010/main">
+              <a14:hiddenFill xmlns:a14="http://schemas.microsoft.com/office/drawing/2010/main" xmlns="">
                 <a:solidFill>
                   <a:schemeClr val="accent1"/>
                 </a:solidFill>
               </a14:hiddenFill>
             </a:ext>
             <a:ext uri="{AF507438-7753-43e0-B8FC-AC1667EBCBE1}">
-              <a14:hiddenEffects xmlns="" xmlns:a14="http://schemas.microsoft.com/office/drawing/2010/main">
+              <a14:hiddenEffects xmlns:a14="http://schemas.microsoft.com/office/drawing/2010/main" xmlns="">
                 <a:effectLst>
                   <a:outerShdw dist="35921" dir="2700000" algn="ctr" rotWithShape="0">
                     <a:schemeClr val="bg2"/>
@@ -10113,7 +10248,7 @@
           <a:blip r:embed="rId4" cstate="print">
             <a:extLst>
               <a:ext uri="{28A0092B-C50C-407E-A947-70E740481C1C}">
-                <a14:useLocalDpi xmlns="" xmlns:a14="http://schemas.microsoft.com/office/drawing/2010/main" val="0"/>
+                <a14:useLocalDpi xmlns:a14="http://schemas.microsoft.com/office/drawing/2010/main" xmlns="" val="0"/>
               </a:ext>
             </a:extLst>
           </a:blip>
@@ -10135,14 +10270,14 @@
           <a:effectLst/>
           <a:extLst>
             <a:ext uri="{909E8E84-426E-40dd-AFC4-6F175D3DCCD1}">
-              <a14:hiddenFill xmlns="" xmlns:a14="http://schemas.microsoft.com/office/drawing/2010/main">
+              <a14:hiddenFill xmlns:a14="http://schemas.microsoft.com/office/drawing/2010/main" xmlns="">
                 <a:solidFill>
                   <a:schemeClr val="accent1"/>
                 </a:solidFill>
               </a14:hiddenFill>
             </a:ext>
             <a:ext uri="{91240B29-F687-4f45-9708-019B960494DF}">
-              <a14:hiddenLine xmlns="" xmlns:a14="http://schemas.microsoft.com/office/drawing/2010/main" w="9525">
+              <a14:hiddenLine xmlns:a14="http://schemas.microsoft.com/office/drawing/2010/main" xmlns="" w="9525">
                 <a:solidFill>
                   <a:schemeClr val="tx1"/>
                 </a:solidFill>
@@ -10152,7 +10287,7 @@
               </a14:hiddenLine>
             </a:ext>
             <a:ext uri="{AF507438-7753-43e0-B8FC-AC1667EBCBE1}">
-              <a14:hiddenEffects xmlns="" xmlns:a14="http://schemas.microsoft.com/office/drawing/2010/main">
+              <a14:hiddenEffects xmlns:a14="http://schemas.microsoft.com/office/drawing/2010/main" xmlns="">
                 <a:effectLst>
                   <a:outerShdw dist="35921" dir="2700000" algn="ctr" rotWithShape="0">
                     <a:schemeClr val="bg2"/>

</xml_diff>